<commit_message>
update script 06 with eparses
</commit_message>
<xml_diff>
--- a/outputs/06_diversity_partitioning/schema_partition.pptx
+++ b/outputs/06_diversity_partitioning/schema_partition.pptx
@@ -243,7 +243,7 @@
           <a:p>
             <a:fld id="{1DD5E214-71AE-49E0-8511-3FE919ED9730}" type="datetimeFigureOut">
               <a:rPr lang="fr-FR" smtClean="0"/>
-              <a:t>04/05/2020</a:t>
+              <a:t>06/05/2020</a:t>
             </a:fld>
             <a:endParaRPr lang="fr-FR"/>
           </a:p>
@@ -413,7 +413,7 @@
           <a:p>
             <a:fld id="{1DD5E214-71AE-49E0-8511-3FE919ED9730}" type="datetimeFigureOut">
               <a:rPr lang="fr-FR" smtClean="0"/>
-              <a:t>04/05/2020</a:t>
+              <a:t>06/05/2020</a:t>
             </a:fld>
             <a:endParaRPr lang="fr-FR"/>
           </a:p>
@@ -593,7 +593,7 @@
           <a:p>
             <a:fld id="{1DD5E214-71AE-49E0-8511-3FE919ED9730}" type="datetimeFigureOut">
               <a:rPr lang="fr-FR" smtClean="0"/>
-              <a:t>04/05/2020</a:t>
+              <a:t>06/05/2020</a:t>
             </a:fld>
             <a:endParaRPr lang="fr-FR"/>
           </a:p>
@@ -763,7 +763,7 @@
           <a:p>
             <a:fld id="{1DD5E214-71AE-49E0-8511-3FE919ED9730}" type="datetimeFigureOut">
               <a:rPr lang="fr-FR" smtClean="0"/>
-              <a:t>04/05/2020</a:t>
+              <a:t>06/05/2020</a:t>
             </a:fld>
             <a:endParaRPr lang="fr-FR"/>
           </a:p>
@@ -1007,7 +1007,7 @@
           <a:p>
             <a:fld id="{1DD5E214-71AE-49E0-8511-3FE919ED9730}" type="datetimeFigureOut">
               <a:rPr lang="fr-FR" smtClean="0"/>
-              <a:t>04/05/2020</a:t>
+              <a:t>06/05/2020</a:t>
             </a:fld>
             <a:endParaRPr lang="fr-FR"/>
           </a:p>
@@ -1239,7 +1239,7 @@
           <a:p>
             <a:fld id="{1DD5E214-71AE-49E0-8511-3FE919ED9730}" type="datetimeFigureOut">
               <a:rPr lang="fr-FR" smtClean="0"/>
-              <a:t>04/05/2020</a:t>
+              <a:t>06/05/2020</a:t>
             </a:fld>
             <a:endParaRPr lang="fr-FR"/>
           </a:p>
@@ -1606,7 +1606,7 @@
           <a:p>
             <a:fld id="{1DD5E214-71AE-49E0-8511-3FE919ED9730}" type="datetimeFigureOut">
               <a:rPr lang="fr-FR" smtClean="0"/>
-              <a:t>04/05/2020</a:t>
+              <a:t>06/05/2020</a:t>
             </a:fld>
             <a:endParaRPr lang="fr-FR"/>
           </a:p>
@@ -1724,7 +1724,7 @@
           <a:p>
             <a:fld id="{1DD5E214-71AE-49E0-8511-3FE919ED9730}" type="datetimeFigureOut">
               <a:rPr lang="fr-FR" smtClean="0"/>
-              <a:t>04/05/2020</a:t>
+              <a:t>06/05/2020</a:t>
             </a:fld>
             <a:endParaRPr lang="fr-FR"/>
           </a:p>
@@ -1819,7 +1819,7 @@
           <a:p>
             <a:fld id="{1DD5E214-71AE-49E0-8511-3FE919ED9730}" type="datetimeFigureOut">
               <a:rPr lang="fr-FR" smtClean="0"/>
-              <a:t>04/05/2020</a:t>
+              <a:t>06/05/2020</a:t>
             </a:fld>
             <a:endParaRPr lang="fr-FR"/>
           </a:p>
@@ -2096,7 +2096,7 @@
           <a:p>
             <a:fld id="{1DD5E214-71AE-49E0-8511-3FE919ED9730}" type="datetimeFigureOut">
               <a:rPr lang="fr-FR" smtClean="0"/>
-              <a:t>04/05/2020</a:t>
+              <a:t>06/05/2020</a:t>
             </a:fld>
             <a:endParaRPr lang="fr-FR"/>
           </a:p>
@@ -2353,7 +2353,7 @@
           <a:p>
             <a:fld id="{1DD5E214-71AE-49E0-8511-3FE919ED9730}" type="datetimeFigureOut">
               <a:rPr lang="fr-FR" smtClean="0"/>
-              <a:t>04/05/2020</a:t>
+              <a:t>06/05/2020</a:t>
             </a:fld>
             <a:endParaRPr lang="fr-FR"/>
           </a:p>
@@ -2566,7 +2566,7 @@
           <a:p>
             <a:fld id="{1DD5E214-71AE-49E0-8511-3FE919ED9730}" type="datetimeFigureOut">
               <a:rPr lang="fr-FR" smtClean="0"/>
-              <a:t>04/05/2020</a:t>
+              <a:t>06/05/2020</a:t>
             </a:fld>
             <a:endParaRPr lang="fr-FR"/>
           </a:p>
@@ -2980,9 +2980,9 @@
         <p:grpSpPr>
           <a:xfrm>
             <a:off x="47112" y="468748"/>
-            <a:ext cx="6639106" cy="6551438"/>
+            <a:ext cx="6693321" cy="6551438"/>
             <a:chOff x="36226" y="468748"/>
-            <a:chExt cx="6639106" cy="6551438"/>
+            <a:chExt cx="6693321" cy="6551438"/>
           </a:xfrm>
         </p:grpSpPr>
         <p:pic>
@@ -3139,8 +3139,8 @@
             </a:p>
           </p:txBody>
         </p:sp>
-        <mc:AlternateContent xmlns:mc="http://schemas.openxmlformats.org/markup-compatibility/2006" xmlns:a14="http://schemas.microsoft.com/office/drawing/2010/main">
-          <mc:Choice Requires="a14">
+        <mc:AlternateContent xmlns:mc="http://schemas.openxmlformats.org/markup-compatibility/2006">
+          <mc:Choice xmlns:a14="http://schemas.microsoft.com/office/drawing/2010/main" Requires="a14">
             <p:sp>
               <p:nvSpPr>
                 <p:cNvPr id="4" name="ZoneTexte 3"/>
@@ -3217,8 +3217,8 @@
                 <a:p>
                   <a:pPr algn="ctr"/>
                   <a:r>
-                    <a:rPr lang="fr-FR" sz="1013" dirty="0"/>
-                    <a:t>XX </a:t>
+                    <a:rPr lang="fr-FR" sz="1013" dirty="0" smtClean="0"/>
+                    <a:t>1713 </a:t>
                   </a:r>
                   <a:r>
                     <a:rPr lang="en-US" sz="1013" dirty="0"/>
@@ -3228,7 +3228,7 @@
               </p:txBody>
             </p:sp>
           </mc:Choice>
-          <mc:Fallback xmlns="">
+          <mc:Fallback>
             <p:sp>
               <p:nvSpPr>
                 <p:cNvPr id="4" name="ZoneTexte 3"/>
@@ -3366,7 +3366,7 @@
           </p:nvSpPr>
           <p:spPr>
             <a:xfrm>
-              <a:off x="5414495" y="1587567"/>
+              <a:off x="5449331" y="1587567"/>
               <a:ext cx="1260837" cy="248209"/>
             </a:xfrm>
             <a:prstGeom prst="rect">
@@ -3387,8 +3387,8 @@
             </a:p>
           </p:txBody>
         </p:sp>
-        <mc:AlternateContent xmlns:mc="http://schemas.openxmlformats.org/markup-compatibility/2006" xmlns:a14="http://schemas.microsoft.com/office/drawing/2010/main">
-          <mc:Choice Requires="a14">
+        <mc:AlternateContent xmlns:mc="http://schemas.openxmlformats.org/markup-compatibility/2006">
+          <mc:Choice xmlns:a14="http://schemas.microsoft.com/office/drawing/2010/main" Requires="a14">
             <p:sp>
               <p:nvSpPr>
                 <p:cNvPr id="9" name="ZoneTexte 8"/>
@@ -3466,13 +3466,22 @@
                   </a14:m>
                   <a:r>
                     <a:rPr lang="fr-FR" sz="1013" dirty="0"/>
-                    <a:t>= xx%</a:t>
-                  </a:r>
+                    <a:t>= </a:t>
+                  </a:r>
+                  <a:r>
+                    <a:rPr lang="fr-FR" sz="1013" dirty="0" smtClean="0"/>
+                    <a:t>11</a:t>
+                  </a:r>
+                  <a:r>
+                    <a:rPr lang="fr-FR" sz="1013" dirty="0" smtClean="0"/>
+                    <a:t>%</a:t>
+                  </a:r>
+                  <a:endParaRPr lang="fr-FR" sz="1013" dirty="0"/>
                 </a:p>
               </p:txBody>
             </p:sp>
           </mc:Choice>
-          <mc:Fallback xmlns="">
+          <mc:Fallback>
             <p:sp>
               <p:nvSpPr>
                 <p:cNvPr id="9" name="ZoneTexte 8"/>
@@ -3662,7 +3671,15 @@
                   <a:pPr algn="ctr"/>
                   <a:r>
                     <a:rPr lang="fr-FR" sz="1013" dirty="0"/>
-                    <a:t>XX sites</a:t>
+                    <a:t>4</a:t>
+                  </a:r>
+                  <a:r>
+                    <a:rPr lang="fr-FR" sz="1013" dirty="0" smtClean="0"/>
+                    <a:t> </a:t>
+                  </a:r>
+                  <a:r>
+                    <a:rPr lang="fr-FR" sz="1013" dirty="0"/>
+                    <a:t>sites</a:t>
                   </a:r>
                 </a:p>
                 <a:p>
@@ -3714,8 +3731,17 @@
                   </a14:m>
                   <a:r>
                     <a:rPr lang="fr-FR" sz="1013" dirty="0"/>
-                    <a:t>= xx%</a:t>
-                  </a:r>
+                    <a:t>= </a:t>
+                  </a:r>
+                  <a:r>
+                    <a:rPr lang="fr-FR" sz="1013" dirty="0" smtClean="0"/>
+                    <a:t>11</a:t>
+                  </a:r>
+                  <a:r>
+                    <a:rPr lang="fr-FR" sz="1013" dirty="0" smtClean="0"/>
+                    <a:t>%</a:t>
+                  </a:r>
+                  <a:endParaRPr lang="fr-FR" sz="1013" dirty="0"/>
                 </a:p>
               </p:txBody>
             </p:sp>
@@ -3759,8 +3785,8 @@
             </p:sp>
           </mc:Fallback>
         </mc:AlternateContent>
-        <mc:AlternateContent xmlns:mc="http://schemas.openxmlformats.org/markup-compatibility/2006" xmlns:a14="http://schemas.microsoft.com/office/drawing/2010/main">
-          <mc:Choice Requires="a14">
+        <mc:AlternateContent xmlns:mc="http://schemas.openxmlformats.org/markup-compatibility/2006">
+          <mc:Choice xmlns:a14="http://schemas.microsoft.com/office/drawing/2010/main" Requires="a14">
             <p:sp>
               <p:nvSpPr>
                 <p:cNvPr id="12" name="ZoneTexte 11"/>
@@ -3769,7 +3795,7 @@
               </p:nvSpPr>
               <p:spPr>
                 <a:xfrm>
-                  <a:off x="5471005" y="3150670"/>
+                  <a:off x="5523259" y="3150670"/>
                   <a:ext cx="1105042" cy="404085"/>
                 </a:xfrm>
                 <a:prstGeom prst="rect">
@@ -3838,13 +3864,22 @@
                   </a14:m>
                   <a:r>
                     <a:rPr lang="fr-FR" sz="1013" dirty="0"/>
-                    <a:t>= xx%</a:t>
-                  </a:r>
+                    <a:t>= </a:t>
+                  </a:r>
+                  <a:r>
+                    <a:rPr lang="fr-FR" sz="1013" dirty="0" smtClean="0"/>
+                    <a:t>46</a:t>
+                  </a:r>
+                  <a:r>
+                    <a:rPr lang="fr-FR" sz="1013" dirty="0" smtClean="0"/>
+                    <a:t>%</a:t>
+                  </a:r>
+                  <a:endParaRPr lang="fr-FR" sz="1013" dirty="0"/>
                 </a:p>
               </p:txBody>
             </p:sp>
           </mc:Choice>
-          <mc:Fallback xmlns="">
+          <mc:Fallback>
             <p:sp>
               <p:nvSpPr>
                 <p:cNvPr id="12" name="ZoneTexte 11"/>
@@ -3855,7 +3890,7 @@
               </p:nvSpPr>
               <p:spPr>
                 <a:xfrm>
-                  <a:off x="5471005" y="3150670"/>
+                  <a:off x="5523259" y="3150670"/>
                   <a:ext cx="1105042" cy="404085"/>
                 </a:xfrm>
                 <a:prstGeom prst="rect">
@@ -3883,8 +3918,8 @@
             </p:sp>
           </mc:Fallback>
         </mc:AlternateContent>
-        <mc:AlternateContent xmlns:mc="http://schemas.openxmlformats.org/markup-compatibility/2006" xmlns:a14="http://schemas.microsoft.com/office/drawing/2010/main">
-          <mc:Choice Requires="a14">
+        <mc:AlternateContent xmlns:mc="http://schemas.openxmlformats.org/markup-compatibility/2006">
+          <mc:Choice xmlns:a14="http://schemas.microsoft.com/office/drawing/2010/main" Requires="a14">
             <p:sp>
               <p:nvSpPr>
                 <p:cNvPr id="13" name="ZoneTexte 12"/>
@@ -3893,8 +3928,8 @@
               </p:nvSpPr>
               <p:spPr>
                 <a:xfrm>
-                  <a:off x="1440425" y="4081026"/>
-                  <a:ext cx="1226239" cy="563488"/>
+                  <a:off x="1407683" y="4081026"/>
+                  <a:ext cx="1293817" cy="563488"/>
                 </a:xfrm>
                 <a:prstGeom prst="rect">
                   <a:avLst/>
@@ -3970,9 +4005,10 @@
                     </m:oMath>
                   </a14:m>
                   <a:r>
-                    <a:rPr lang="fr-FR" sz="1013" dirty="0"/>
-                    <a:t>=xx%</a:t>
-                  </a:r>
+                    <a:rPr lang="fr-FR" sz="1013" dirty="0" smtClean="0"/>
+                    <a:t>= 6.3%</a:t>
+                  </a:r>
+                  <a:endParaRPr lang="fr-FR" sz="1013" dirty="0"/>
                 </a:p>
                 <a:p>
                   <a:pPr algn="ctr"/>
@@ -4020,13 +4056,18 @@
                   </a14:m>
                   <a:r>
                     <a:rPr lang="fr-FR" sz="1013" dirty="0"/>
-                    <a:t>= xx%</a:t>
-                  </a:r>
+                    <a:t>= </a:t>
+                  </a:r>
+                  <a:r>
+                    <a:rPr lang="fr-FR" sz="1013" dirty="0" smtClean="0"/>
+                    <a:t>4.1%</a:t>
+                  </a:r>
+                  <a:endParaRPr lang="fr-FR" sz="1013" dirty="0"/>
                 </a:p>
               </p:txBody>
             </p:sp>
           </mc:Choice>
-          <mc:Fallback xmlns="">
+          <mc:Fallback>
             <p:sp>
               <p:nvSpPr>
                 <p:cNvPr id="13" name="ZoneTexte 12"/>
@@ -4037,8 +4078,8 @@
               </p:nvSpPr>
               <p:spPr>
                 <a:xfrm>
-                  <a:off x="1440425" y="4081026"/>
-                  <a:ext cx="1226239" cy="563488"/>
+                  <a:off x="1407683" y="4081026"/>
+                  <a:ext cx="1293817" cy="563488"/>
                 </a:xfrm>
                 <a:prstGeom prst="rect">
                   <a:avLst/>
@@ -4065,8 +4106,8 @@
             </p:sp>
           </mc:Fallback>
         </mc:AlternateContent>
-        <mc:AlternateContent xmlns:mc="http://schemas.openxmlformats.org/markup-compatibility/2006" xmlns:a14="http://schemas.microsoft.com/office/drawing/2010/main">
-          <mc:Choice Requires="a14">
+        <mc:AlternateContent xmlns:mc="http://schemas.openxmlformats.org/markup-compatibility/2006">
+          <mc:Choice xmlns:a14="http://schemas.microsoft.com/office/drawing/2010/main" Requires="a14">
             <p:sp>
               <p:nvSpPr>
                 <p:cNvPr id="14" name="ZoneTexte 13"/>
@@ -4075,8 +4116,8 @@
               </p:nvSpPr>
               <p:spPr>
                 <a:xfrm>
-                  <a:off x="2748419" y="4081026"/>
-                  <a:ext cx="1226239" cy="563488"/>
+                  <a:off x="2713583" y="4081026"/>
+                  <a:ext cx="1289426" cy="563488"/>
                 </a:xfrm>
                 <a:prstGeom prst="rect">
                   <a:avLst/>
@@ -4152,9 +4193,10 @@
                     </m:oMath>
                   </a14:m>
                   <a:r>
-                    <a:rPr lang="fr-FR" sz="1013" dirty="0"/>
-                    <a:t>=xx%</a:t>
-                  </a:r>
+                    <a:rPr lang="fr-FR" sz="1013" dirty="0" smtClean="0"/>
+                    <a:t>= 4.3%</a:t>
+                  </a:r>
+                  <a:endParaRPr lang="fr-FR" sz="1013" dirty="0"/>
                 </a:p>
                 <a:p>
                   <a:pPr algn="ctr"/>
@@ -4202,13 +4244,18 @@
                   </a14:m>
                   <a:r>
                     <a:rPr lang="fr-FR" sz="1013" dirty="0"/>
-                    <a:t>= xx%</a:t>
-                  </a:r>
+                    <a:t>= </a:t>
+                  </a:r>
+                  <a:r>
+                    <a:rPr lang="fr-FR" sz="1013" dirty="0" smtClean="0"/>
+                    <a:t>4.3%</a:t>
+                  </a:r>
+                  <a:endParaRPr lang="fr-FR" sz="1013" dirty="0"/>
                 </a:p>
               </p:txBody>
             </p:sp>
           </mc:Choice>
-          <mc:Fallback xmlns="">
+          <mc:Fallback>
             <p:sp>
               <p:nvSpPr>
                 <p:cNvPr id="14" name="ZoneTexte 13"/>
@@ -4219,8 +4266,8 @@
               </p:nvSpPr>
               <p:spPr>
                 <a:xfrm>
-                  <a:off x="2748419" y="4081026"/>
-                  <a:ext cx="1226239" cy="563488"/>
+                  <a:off x="2713583" y="4081026"/>
+                  <a:ext cx="1289426" cy="563488"/>
                 </a:xfrm>
                 <a:prstGeom prst="rect">
                   <a:avLst/>
@@ -4334,9 +4381,10 @@
                     </m:oMath>
                   </a14:m>
                   <a:r>
-                    <a:rPr lang="fr-FR" sz="1013" dirty="0"/>
-                    <a:t>=xx%</a:t>
-                  </a:r>
+                    <a:rPr lang="fr-FR" sz="1013" dirty="0" smtClean="0"/>
+                    <a:t>= 5%</a:t>
+                  </a:r>
+                  <a:endParaRPr lang="fr-FR" sz="1013" dirty="0"/>
                 </a:p>
                 <a:p>
                   <a:pPr algn="ctr"/>
@@ -4384,8 +4432,13 @@
                   </a14:m>
                   <a:r>
                     <a:rPr lang="fr-FR" sz="1013" dirty="0"/>
-                    <a:t>= xx%</a:t>
-                  </a:r>
+                    <a:t>= </a:t>
+                  </a:r>
+                  <a:r>
+                    <a:rPr lang="fr-FR" sz="1013" dirty="0" smtClean="0"/>
+                    <a:t>5%</a:t>
+                  </a:r>
+                  <a:endParaRPr lang="fr-FR" sz="1013" dirty="0"/>
                 </a:p>
               </p:txBody>
             </p:sp>
@@ -4429,8 +4482,8 @@
             </p:sp>
           </mc:Fallback>
         </mc:AlternateContent>
-        <mc:AlternateContent xmlns:mc="http://schemas.openxmlformats.org/markup-compatibility/2006" xmlns:a14="http://schemas.microsoft.com/office/drawing/2010/main">
-          <mc:Choice Requires="a14">
+        <mc:AlternateContent xmlns:mc="http://schemas.openxmlformats.org/markup-compatibility/2006">
+          <mc:Choice xmlns:a14="http://schemas.microsoft.com/office/drawing/2010/main" Requires="a14">
             <p:sp>
               <p:nvSpPr>
                 <p:cNvPr id="16" name="ZoneTexte 15"/>
@@ -4439,8 +4492,8 @@
               </p:nvSpPr>
               <p:spPr>
                 <a:xfrm>
-                  <a:off x="5431795" y="4081026"/>
-                  <a:ext cx="1226239" cy="563488"/>
+                  <a:off x="5405295" y="4081026"/>
+                  <a:ext cx="1324252" cy="563488"/>
                 </a:xfrm>
                 <a:prstGeom prst="rect">
                   <a:avLst/>
@@ -4516,9 +4569,10 @@
                     </m:oMath>
                   </a14:m>
                   <a:r>
-                    <a:rPr lang="fr-FR" sz="1013" dirty="0"/>
-                    <a:t>=xx%</a:t>
-                  </a:r>
+                    <a:rPr lang="fr-FR" sz="1013" dirty="0" smtClean="0"/>
+                    <a:t>= 10.6%</a:t>
+                  </a:r>
+                  <a:endParaRPr lang="fr-FR" sz="1013" dirty="0"/>
                 </a:p>
                 <a:p>
                   <a:pPr algn="ctr"/>
@@ -4566,13 +4620,18 @@
                   </a14:m>
                   <a:r>
                     <a:rPr lang="fr-FR" sz="1013" dirty="0"/>
-                    <a:t>= xx%</a:t>
-                  </a:r>
+                    <a:t>= </a:t>
+                  </a:r>
+                  <a:r>
+                    <a:rPr lang="fr-FR" sz="1013" dirty="0" smtClean="0"/>
+                    <a:t>7.3%</a:t>
+                  </a:r>
+                  <a:endParaRPr lang="fr-FR" sz="1013" dirty="0"/>
                 </a:p>
               </p:txBody>
             </p:sp>
           </mc:Choice>
-          <mc:Fallback xmlns="">
+          <mc:Fallback>
             <p:sp>
               <p:nvSpPr>
                 <p:cNvPr id="16" name="ZoneTexte 15"/>
@@ -4583,8 +4642,8 @@
               </p:nvSpPr>
               <p:spPr>
                 <a:xfrm>
-                  <a:off x="5431795" y="4081026"/>
-                  <a:ext cx="1226239" cy="563488"/>
+                  <a:off x="5405295" y="4081026"/>
+                  <a:ext cx="1324252" cy="563488"/>
                 </a:xfrm>
                 <a:prstGeom prst="rect">
                   <a:avLst/>
@@ -4611,8 +4670,8 @@
             </p:sp>
           </mc:Fallback>
         </mc:AlternateContent>
-        <mc:AlternateContent xmlns:mc="http://schemas.openxmlformats.org/markup-compatibility/2006" xmlns:a14="http://schemas.microsoft.com/office/drawing/2010/main">
-          <mc:Choice Requires="a14">
+        <mc:AlternateContent xmlns:mc="http://schemas.openxmlformats.org/markup-compatibility/2006">
+          <mc:Choice xmlns:a14="http://schemas.microsoft.com/office/drawing/2010/main" Requires="a14">
             <p:sp>
               <p:nvSpPr>
                 <p:cNvPr id="17" name="ZoneTexte 16"/>
@@ -4621,7 +4680,7 @@
               </p:nvSpPr>
               <p:spPr>
                 <a:xfrm>
-                  <a:off x="3534352" y="4721586"/>
+                  <a:off x="3535976" y="4709858"/>
                   <a:ext cx="1055136" cy="265457"/>
                 </a:xfrm>
                 <a:prstGeom prst="rect">
@@ -4695,13 +4754,26 @@
                         <a:srgbClr val="FF0000"/>
                       </a:solidFill>
                     </a:rPr>
-                    <a:t>= xx%</a:t>
-                  </a:r>
+                    <a:t>= </a:t>
+                  </a:r>
+                  <a:r>
+                    <a:rPr lang="fr-FR" sz="1125" b="1" dirty="0" smtClean="0">
+                      <a:solidFill>
+                        <a:srgbClr val="FF0000"/>
+                      </a:solidFill>
+                    </a:rPr>
+                    <a:t>5%</a:t>
+                  </a:r>
+                  <a:endParaRPr lang="fr-FR" sz="1125" b="1" dirty="0">
+                    <a:solidFill>
+                      <a:srgbClr val="FF0000"/>
+                    </a:solidFill>
+                  </a:endParaRPr>
                 </a:p>
               </p:txBody>
             </p:sp>
           </mc:Choice>
-          <mc:Fallback xmlns="">
+          <mc:Fallback>
             <p:sp>
               <p:nvSpPr>
                 <p:cNvPr id="17" name="ZoneTexte 16"/>
@@ -4712,7 +4784,7 @@
               </p:nvSpPr>
               <p:spPr>
                 <a:xfrm>
-                  <a:off x="3534352" y="4721586"/>
+                  <a:off x="3535976" y="4709858"/>
                   <a:ext cx="1055136" cy="265457"/>
                 </a:xfrm>
                 <a:prstGeom prst="rect">
@@ -4740,8 +4812,8 @@
             </p:sp>
           </mc:Fallback>
         </mc:AlternateContent>
-        <mc:AlternateContent xmlns:mc="http://schemas.openxmlformats.org/markup-compatibility/2006" xmlns:a14="http://schemas.microsoft.com/office/drawing/2010/main">
-          <mc:Choice Requires="a14">
+        <mc:AlternateContent xmlns:mc="http://schemas.openxmlformats.org/markup-compatibility/2006">
+          <mc:Choice xmlns:a14="http://schemas.microsoft.com/office/drawing/2010/main" Requires="a14">
             <p:sp>
               <p:nvSpPr>
                 <p:cNvPr id="18" name="ZoneTexte 17"/>
@@ -4750,7 +4822,7 @@
               </p:nvSpPr>
               <p:spPr>
                 <a:xfrm>
-                  <a:off x="3451653" y="3691620"/>
+                  <a:off x="3337489" y="3685425"/>
                   <a:ext cx="1497152" cy="269433"/>
                 </a:xfrm>
                 <a:prstGeom prst="rect">
@@ -4841,13 +4913,26 @@
                         <a:srgbClr val="FF0000"/>
                       </a:solidFill>
                     </a:rPr>
-                    <a:t>= xx%</a:t>
-                  </a:r>
+                    <a:t>= </a:t>
+                  </a:r>
+                  <a:r>
+                    <a:rPr lang="fr-FR" sz="1125" b="1" dirty="0" smtClean="0">
+                      <a:solidFill>
+                        <a:srgbClr val="FF0000"/>
+                      </a:solidFill>
+                    </a:rPr>
+                    <a:t>6.5%</a:t>
+                  </a:r>
+                  <a:endParaRPr lang="fr-FR" sz="1125" b="1" dirty="0">
+                    <a:solidFill>
+                      <a:srgbClr val="FF0000"/>
+                    </a:solidFill>
+                  </a:endParaRPr>
                 </a:p>
               </p:txBody>
             </p:sp>
           </mc:Choice>
-          <mc:Fallback xmlns="">
+          <mc:Fallback>
             <p:sp>
               <p:nvSpPr>
                 <p:cNvPr id="18" name="ZoneTexte 17"/>
@@ -4858,7 +4943,7 @@
               </p:nvSpPr>
               <p:spPr>
                 <a:xfrm>
-                  <a:off x="3451653" y="3691620"/>
+                  <a:off x="3337489" y="3685425"/>
                   <a:ext cx="1497152" cy="269433"/>
                 </a:xfrm>
                 <a:prstGeom prst="rect">
@@ -4886,8 +4971,8 @@
             </p:sp>
           </mc:Fallback>
         </mc:AlternateContent>
-        <mc:AlternateContent xmlns:mc="http://schemas.openxmlformats.org/markup-compatibility/2006" xmlns:a14="http://schemas.microsoft.com/office/drawing/2010/main">
-          <mc:Choice Requires="a14">
+        <mc:AlternateContent xmlns:mc="http://schemas.openxmlformats.org/markup-compatibility/2006">
+          <mc:Choice xmlns:a14="http://schemas.microsoft.com/office/drawing/2010/main" Requires="a14">
             <p:sp>
               <p:nvSpPr>
                 <p:cNvPr id="19" name="ZoneTexte 18"/>
@@ -4896,7 +4981,7 @@
               </p:nvSpPr>
               <p:spPr>
                 <a:xfrm>
-                  <a:off x="3518662" y="2799598"/>
+                  <a:off x="3448671" y="2791930"/>
                   <a:ext cx="1276144" cy="269433"/>
                 </a:xfrm>
                 <a:prstGeom prst="rect">
@@ -4996,13 +5081,26 @@
                         <a:srgbClr val="FF0000"/>
                       </a:solidFill>
                     </a:rPr>
-                    <a:t>= xx%</a:t>
-                  </a:r>
+                    <a:t>= </a:t>
+                  </a:r>
+                  <a:r>
+                    <a:rPr lang="fr-FR" sz="1125" b="1" dirty="0" smtClean="0">
+                      <a:solidFill>
+                        <a:srgbClr val="FF0000"/>
+                      </a:solidFill>
+                    </a:rPr>
+                    <a:t>17%</a:t>
+                  </a:r>
+                  <a:endParaRPr lang="fr-FR" sz="1125" b="1" dirty="0">
+                    <a:solidFill>
+                      <a:srgbClr val="FF0000"/>
+                    </a:solidFill>
+                  </a:endParaRPr>
                 </a:p>
               </p:txBody>
             </p:sp>
           </mc:Choice>
-          <mc:Fallback xmlns="">
+          <mc:Fallback>
             <p:sp>
               <p:nvSpPr>
                 <p:cNvPr id="19" name="ZoneTexte 18"/>
@@ -5013,7 +5111,7 @@
               </p:nvSpPr>
               <p:spPr>
                 <a:xfrm>
-                  <a:off x="3518662" y="2799598"/>
+                  <a:off x="3448671" y="2791930"/>
                   <a:ext cx="1276144" cy="269433"/>
                 </a:xfrm>
                 <a:prstGeom prst="rect">
@@ -5160,8 +5258,8 @@
           </p:nvCxnSpPr>
           <p:spPr>
             <a:xfrm flipH="1">
-              <a:off x="6023526" y="2695236"/>
-              <a:ext cx="12151" cy="485261"/>
+              <a:off x="6067071" y="2695236"/>
+              <a:ext cx="3442" cy="485261"/>
             </a:xfrm>
             <a:prstGeom prst="straightConnector1">
               <a:avLst/>
@@ -5304,44 +5402,8 @@
           </p:nvCxnSpPr>
           <p:spPr>
             <a:xfrm>
-              <a:off x="6023526" y="3617654"/>
-              <a:ext cx="4451" cy="448606"/>
-            </a:xfrm>
-            <a:prstGeom prst="straightConnector1">
-              <a:avLst/>
-            </a:prstGeom>
-            <a:ln>
-              <a:tailEnd type="triangle"/>
-            </a:ln>
-          </p:spPr>
-          <p:style>
-            <a:lnRef idx="1">
-              <a:schemeClr val="dk1"/>
-            </a:lnRef>
-            <a:fillRef idx="0">
-              <a:schemeClr val="dk1"/>
-            </a:fillRef>
-            <a:effectRef idx="0">
-              <a:schemeClr val="dk1"/>
-            </a:effectRef>
-            <a:fontRef idx="minor">
-              <a:schemeClr val="tx1"/>
-            </a:fontRef>
-          </p:style>
-        </p:cxnSp>
-        <p:cxnSp>
-          <p:nvCxnSpPr>
-            <p:cNvPr id="39" name="Connecteur droit avec flèche 38"/>
-            <p:cNvCxnSpPr>
-              <a:stCxn id="46" idx="4"/>
-              <a:endCxn id="5" idx="0"/>
-            </p:cNvCxnSpPr>
-            <p:nvPr/>
-          </p:nvCxnSpPr>
-          <p:spPr>
-            <a:xfrm flipH="1">
-              <a:off x="2055364" y="962295"/>
-              <a:ext cx="1996214" cy="615950"/>
+              <a:off x="6067071" y="3617654"/>
+              <a:ext cx="1771" cy="448606"/>
             </a:xfrm>
             <a:prstGeom prst="straightConnector1">
               <a:avLst/>
@@ -5437,44 +5499,8 @@
             </a:fontRef>
           </p:style>
         </p:cxnSp>
-        <p:cxnSp>
-          <p:nvCxnSpPr>
-            <p:cNvPr id="45" name="Connecteur droit avec flèche 44"/>
-            <p:cNvCxnSpPr>
-              <a:stCxn id="46" idx="4"/>
-              <a:endCxn id="8" idx="0"/>
-            </p:cNvCxnSpPr>
-            <p:nvPr/>
-          </p:nvCxnSpPr>
-          <p:spPr>
-            <a:xfrm>
-              <a:off x="4051578" y="962295"/>
-              <a:ext cx="1993336" cy="625272"/>
-            </a:xfrm>
-            <a:prstGeom prst="straightConnector1">
-              <a:avLst/>
-            </a:prstGeom>
-            <a:ln>
-              <a:tailEnd type="triangle"/>
-            </a:ln>
-          </p:spPr>
-          <p:style>
-            <a:lnRef idx="1">
-              <a:schemeClr val="dk1"/>
-            </a:lnRef>
-            <a:fillRef idx="0">
-              <a:schemeClr val="dk1"/>
-            </a:fillRef>
-            <a:effectRef idx="0">
-              <a:schemeClr val="dk1"/>
-            </a:effectRef>
-            <a:fontRef idx="minor">
-              <a:schemeClr val="tx1"/>
-            </a:fontRef>
-          </p:style>
-        </p:cxnSp>
-        <mc:AlternateContent xmlns:mc="http://schemas.openxmlformats.org/markup-compatibility/2006" xmlns:a14="http://schemas.microsoft.com/office/drawing/2010/main">
-          <mc:Choice Requires="a14">
+        <mc:AlternateContent xmlns:mc="http://schemas.openxmlformats.org/markup-compatibility/2006">
+          <mc:Choice xmlns:a14="http://schemas.microsoft.com/office/drawing/2010/main" Requires="a14">
             <p:sp>
               <p:nvSpPr>
                 <p:cNvPr id="20" name="ZoneTexte 19"/>
@@ -5483,8 +5509,8 @@
               </p:nvSpPr>
               <p:spPr>
                 <a:xfrm>
-                  <a:off x="3416833" y="1122550"/>
-                  <a:ext cx="1290174" cy="281872"/>
+                  <a:off x="3358261" y="1131092"/>
+                  <a:ext cx="1420514" cy="281872"/>
                 </a:xfrm>
                 <a:prstGeom prst="rect">
                   <a:avLst/>
@@ -5562,13 +5588,26 @@
                         <a:srgbClr val="FF0000"/>
                       </a:solidFill>
                     </a:rPr>
-                    <a:t>= xx%</a:t>
-                  </a:r>
+                    <a:t>= </a:t>
+                  </a:r>
+                  <a:r>
+                    <a:rPr lang="fr-FR" sz="1125" b="1" dirty="0" smtClean="0">
+                      <a:solidFill>
+                        <a:srgbClr val="FF0000"/>
+                      </a:solidFill>
+                    </a:rPr>
+                    <a:t>71.5%</a:t>
+                  </a:r>
+                  <a:endParaRPr lang="fr-FR" sz="1125" b="1" dirty="0">
+                    <a:solidFill>
+                      <a:srgbClr val="FF0000"/>
+                    </a:solidFill>
+                  </a:endParaRPr>
                 </a:p>
               </p:txBody>
             </p:sp>
           </mc:Choice>
-          <mc:Fallback xmlns="">
+          <mc:Fallback>
             <p:sp>
               <p:nvSpPr>
                 <p:cNvPr id="20" name="ZoneTexte 19"/>
@@ -5579,8 +5618,8 @@
               </p:nvSpPr>
               <p:spPr>
                 <a:xfrm>
-                  <a:off x="3416833" y="1122550"/>
-                  <a:ext cx="1290174" cy="281872"/>
+                  <a:off x="3358261" y="1131092"/>
+                  <a:ext cx="1420514" cy="281872"/>
                 </a:xfrm>
                 <a:prstGeom prst="rect">
                   <a:avLst/>
@@ -5703,7 +5742,7 @@
           </p:nvSpPr>
           <p:spPr>
             <a:xfrm>
-              <a:off x="5554775" y="3180497"/>
+              <a:off x="5598320" y="3180497"/>
               <a:ext cx="937501" cy="437157"/>
             </a:xfrm>
             <a:prstGeom prst="ellipse">
@@ -5880,7 +5919,7 @@
           <p:spPr>
             <a:xfrm>
               <a:off x="5494172" y="4066260"/>
-              <a:ext cx="1067611" cy="664633"/>
+              <a:ext cx="1149340" cy="664633"/>
             </a:xfrm>
             <a:prstGeom prst="ellipse">
               <a:avLst/>
@@ -5951,8 +5990,8 @@
             </a:p>
           </p:txBody>
         </p:sp>
-        <mc:AlternateContent xmlns:mc="http://schemas.openxmlformats.org/markup-compatibility/2006" xmlns:a14="http://schemas.microsoft.com/office/drawing/2010/main">
-          <mc:Choice Requires="a14">
+        <mc:AlternateContent xmlns:mc="http://schemas.openxmlformats.org/markup-compatibility/2006">
+          <mc:Choice xmlns:a14="http://schemas.microsoft.com/office/drawing/2010/main" Requires="a14">
             <p:sp>
               <p:nvSpPr>
                 <p:cNvPr id="3" name="ZoneTexte 2"/>
@@ -5962,7 +6001,7 @@
               <p:spPr>
                 <a:xfrm>
                   <a:off x="356812" y="5346843"/>
-                  <a:ext cx="4817460" cy="1673343"/>
+                  <a:ext cx="5241508" cy="1673343"/>
                 </a:xfrm>
                 <a:prstGeom prst="rect">
                   <a:avLst/>
@@ -6042,7 +6081,11 @@
                   </a14:m>
                   <a:r>
                     <a:rPr lang="fr-FR" sz="1050" b="1" dirty="0"/>
-                    <a:t>= xx%,  </a:t>
+                    <a:t>= </a:t>
+                  </a:r>
+                  <a:r>
+                    <a:rPr lang="fr-FR" sz="1050" b="1" dirty="0" smtClean="0"/>
+                    <a:t>74%,  </a:t>
                   </a:r>
                   <a14:m>
                     <m:oMath xmlns:m="http://schemas.openxmlformats.org/officeDocument/2006/math">
@@ -6105,7 +6148,11 @@
                   </a14:m>
                   <a:r>
                     <a:rPr lang="fr-FR" sz="1050" b="1" dirty="0"/>
-                    <a:t>= xx%,  </a:t>
+                    <a:t>= </a:t>
+                  </a:r>
+                  <a:r>
+                    <a:rPr lang="fr-FR" sz="1050" b="1" dirty="0" smtClean="0"/>
+                    <a:t>18%,  </a:t>
                   </a:r>
                   <a14:m>
                     <m:oMath xmlns:m="http://schemas.openxmlformats.org/officeDocument/2006/math">
@@ -6162,7 +6209,11 @@
                   </a14:m>
                   <a:r>
                     <a:rPr lang="fr-FR" sz="1050" b="1" dirty="0"/>
-                    <a:t>= xx%,  </a:t>
+                    <a:t>= </a:t>
+                  </a:r>
+                  <a:r>
+                    <a:rPr lang="fr-FR" sz="1050" b="1" dirty="0" smtClean="0"/>
+                    <a:t>4.5%,  </a:t>
                   </a:r>
                   <a14:m>
                     <m:oMath xmlns:m="http://schemas.openxmlformats.org/officeDocument/2006/math">
@@ -6208,8 +6259,13 @@
                   </a14:m>
                   <a:r>
                     <a:rPr lang="fr-FR" sz="1050" b="1" dirty="0"/>
-                    <a:t>= xx%</a:t>
-                  </a:r>
+                    <a:t>= </a:t>
+                  </a:r>
+                  <a:r>
+                    <a:rPr lang="fr-FR" sz="1050" b="1" dirty="0" smtClean="0"/>
+                    <a:t>3.5%</a:t>
+                  </a:r>
+                  <a:endParaRPr lang="fr-FR" sz="1050" b="1" dirty="0"/>
                 </a:p>
                 <a:p>
                   <a:r>
@@ -6286,7 +6342,11 @@
                   </a14:m>
                   <a:r>
                     <a:rPr lang="fr-FR" sz="1050" b="1" dirty="0"/>
-                    <a:t>= xx%,  </a:t>
+                    <a:t>= </a:t>
+                  </a:r>
+                  <a:r>
+                    <a:rPr lang="fr-FR" sz="1050" b="1" dirty="0" smtClean="0"/>
+                    <a:t>70.8%,  </a:t>
                   </a:r>
                   <a14:m>
                     <m:oMath xmlns:m="http://schemas.openxmlformats.org/officeDocument/2006/math">
@@ -6349,7 +6409,11 @@
                   </a14:m>
                   <a:r>
                     <a:rPr lang="fr-FR" sz="1050" b="1" dirty="0"/>
-                    <a:t>= xx%,  </a:t>
+                    <a:t>= </a:t>
+                  </a:r>
+                  <a:r>
+                    <a:rPr lang="fr-FR" sz="1050" b="1" dirty="0" smtClean="0"/>
+                    <a:t>15.8%,  </a:t>
                   </a:r>
                   <a14:m>
                     <m:oMath xmlns:m="http://schemas.openxmlformats.org/officeDocument/2006/math">
@@ -6406,7 +6470,11 @@
                   </a14:m>
                   <a:r>
                     <a:rPr lang="fr-FR" sz="1050" b="1" dirty="0"/>
-                    <a:t>= xx%,  </a:t>
+                    <a:t>= </a:t>
+                  </a:r>
+                  <a:r>
+                    <a:rPr lang="fr-FR" sz="1050" b="1" dirty="0" smtClean="0"/>
+                    <a:t>7.8%,  </a:t>
                   </a:r>
                   <a14:m>
                     <m:oMath xmlns:m="http://schemas.openxmlformats.org/officeDocument/2006/math">
@@ -6452,12 +6520,17 @@
                   </a14:m>
                   <a:r>
                     <a:rPr lang="fr-FR" sz="1050" b="1" dirty="0"/>
-                    <a:t>= xx</a:t>
+                    <a:t>= </a:t>
+                  </a:r>
+                  <a:r>
+                    <a:rPr lang="fr-FR" sz="1050" b="1" dirty="0" smtClean="0"/>
+                    <a:t>5.6</a:t>
                   </a:r>
                   <a:r>
                     <a:rPr lang="fr-FR" sz="1050" b="1" dirty="0" smtClean="0"/>
                     <a:t>%</a:t>
                   </a:r>
+                  <a:endParaRPr lang="fr-FR" sz="1050" b="1" dirty="0" smtClean="0"/>
                 </a:p>
                 <a:p>
                   <a:endParaRPr lang="fr-FR" sz="1050" b="1" dirty="0" smtClean="0"/>
@@ -6538,7 +6611,11 @@
                   </a14:m>
                   <a:r>
                     <a:rPr lang="fr-FR" sz="1050" b="1" dirty="0"/>
-                    <a:t>= xx%,  </a:t>
+                    <a:t>= </a:t>
+                  </a:r>
+                  <a:r>
+                    <a:rPr lang="fr-FR" sz="1050" b="1" dirty="0" smtClean="0"/>
+                    <a:t>68%,  </a:t>
                   </a:r>
                   <a14:m>
                     <m:oMath xmlns:m="http://schemas.openxmlformats.org/officeDocument/2006/math">
@@ -6601,7 +6678,11 @@
                   </a14:m>
                   <a:r>
                     <a:rPr lang="fr-FR" sz="1050" b="1" dirty="0"/>
-                    <a:t>= xx%,  </a:t>
+                    <a:t>= </a:t>
+                  </a:r>
+                  <a:r>
+                    <a:rPr lang="fr-FR" sz="1050" b="1" dirty="0" smtClean="0"/>
+                    <a:t>15.7%,  </a:t>
                   </a:r>
                   <a14:m>
                     <m:oMath xmlns:m="http://schemas.openxmlformats.org/officeDocument/2006/math">
@@ -6658,7 +6739,11 @@
                   </a14:m>
                   <a:r>
                     <a:rPr lang="fr-FR" sz="1050" b="1" dirty="0"/>
-                    <a:t>= xx%,  </a:t>
+                    <a:t>= </a:t>
+                  </a:r>
+                  <a:r>
+                    <a:rPr lang="fr-FR" sz="1050" b="1" dirty="0" smtClean="0"/>
+                    <a:t>8.3%,  </a:t>
                   </a:r>
                   <a14:m>
                     <m:oMath xmlns:m="http://schemas.openxmlformats.org/officeDocument/2006/math">
@@ -6704,8 +6789,13 @@
                   </a14:m>
                   <a:r>
                     <a:rPr lang="fr-FR" sz="1050" b="1" dirty="0"/>
-                    <a:t>= xx%</a:t>
-                  </a:r>
+                    <a:t>= </a:t>
+                  </a:r>
+                  <a:r>
+                    <a:rPr lang="fr-FR" sz="1050" b="1" dirty="0" smtClean="0"/>
+                    <a:t>8%</a:t>
+                  </a:r>
+                  <a:endParaRPr lang="fr-FR" sz="1050" b="1" dirty="0"/>
                 </a:p>
                 <a:p>
                   <a:pPr marL="171450" indent="-171450">
@@ -6717,7 +6807,7 @@
               </p:txBody>
             </p:sp>
           </mc:Choice>
-          <mc:Fallback xmlns="">
+          <mc:Fallback>
             <p:sp>
               <p:nvSpPr>
                 <p:cNvPr id="3" name="ZoneTexte 2"/>
@@ -6729,7 +6819,7 @@
               <p:spPr>
                 <a:xfrm>
                   <a:off x="356812" y="5346843"/>
-                  <a:ext cx="4817460" cy="1673343"/>
+                  <a:ext cx="5241508" cy="1673343"/>
                 </a:xfrm>
                 <a:prstGeom prst="rect">
                   <a:avLst/>
@@ -6871,7 +6961,7 @@
           </p:blipFill>
           <p:spPr>
             <a:xfrm>
-              <a:off x="5409140" y="1803302"/>
+              <a:off x="5443976" y="1803302"/>
               <a:ext cx="1253074" cy="891934"/>
             </a:xfrm>
             <a:prstGeom prst="rect">
@@ -6882,6 +6972,78 @@
             </a:ln>
           </p:spPr>
         </p:pic>
+        <p:cxnSp>
+          <p:nvCxnSpPr>
+            <p:cNvPr id="39" name="Connecteur droit avec flèche 38"/>
+            <p:cNvCxnSpPr>
+              <a:stCxn id="46" idx="4"/>
+              <a:endCxn id="5" idx="0"/>
+            </p:cNvCxnSpPr>
+            <p:nvPr/>
+          </p:nvCxnSpPr>
+          <p:spPr>
+            <a:xfrm flipH="1">
+              <a:off x="2055364" y="962295"/>
+              <a:ext cx="1996214" cy="615950"/>
+            </a:xfrm>
+            <a:prstGeom prst="straightConnector1">
+              <a:avLst/>
+            </a:prstGeom>
+            <a:ln>
+              <a:tailEnd type="triangle"/>
+            </a:ln>
+          </p:spPr>
+          <p:style>
+            <a:lnRef idx="1">
+              <a:schemeClr val="dk1"/>
+            </a:lnRef>
+            <a:fillRef idx="0">
+              <a:schemeClr val="dk1"/>
+            </a:fillRef>
+            <a:effectRef idx="0">
+              <a:schemeClr val="dk1"/>
+            </a:effectRef>
+            <a:fontRef idx="minor">
+              <a:schemeClr val="tx1"/>
+            </a:fontRef>
+          </p:style>
+        </p:cxnSp>
+        <p:cxnSp>
+          <p:nvCxnSpPr>
+            <p:cNvPr id="45" name="Connecteur droit avec flèche 44"/>
+            <p:cNvCxnSpPr>
+              <a:stCxn id="46" idx="4"/>
+              <a:endCxn id="8" idx="0"/>
+            </p:cNvCxnSpPr>
+            <p:nvPr/>
+          </p:nvCxnSpPr>
+          <p:spPr>
+            <a:xfrm>
+              <a:off x="4051578" y="962295"/>
+              <a:ext cx="2028172" cy="625272"/>
+            </a:xfrm>
+            <a:prstGeom prst="straightConnector1">
+              <a:avLst/>
+            </a:prstGeom>
+            <a:ln>
+              <a:tailEnd type="triangle"/>
+            </a:ln>
+          </p:spPr>
+          <p:style>
+            <a:lnRef idx="1">
+              <a:schemeClr val="dk1"/>
+            </a:lnRef>
+            <a:fillRef idx="0">
+              <a:schemeClr val="dk1"/>
+            </a:fillRef>
+            <a:effectRef idx="0">
+              <a:schemeClr val="dk1"/>
+            </a:effectRef>
+            <a:fontRef idx="minor">
+              <a:schemeClr val="tx1"/>
+            </a:fontRef>
+          </p:style>
+        </p:cxnSp>
       </p:grpSp>
     </p:spTree>
     <p:extLst>

</xml_diff>

<commit_message>
update plots diversity partitioning with NC
</commit_message>
<xml_diff>
--- a/outputs/06_diversity_partitioning/schema_partition.pptx
+++ b/outputs/06_diversity_partitioning/schema_partition.pptx
@@ -243,7 +243,7 @@
           <a:p>
             <a:fld id="{1DD5E214-71AE-49E0-8511-3FE919ED9730}" type="datetimeFigureOut">
               <a:rPr lang="fr-FR" smtClean="0"/>
-              <a:t>20/05/2020</a:t>
+              <a:t>27/05/2020</a:t>
             </a:fld>
             <a:endParaRPr lang="fr-FR"/>
           </a:p>
@@ -413,7 +413,7 @@
           <a:p>
             <a:fld id="{1DD5E214-71AE-49E0-8511-3FE919ED9730}" type="datetimeFigureOut">
               <a:rPr lang="fr-FR" smtClean="0"/>
-              <a:t>20/05/2020</a:t>
+              <a:t>27/05/2020</a:t>
             </a:fld>
             <a:endParaRPr lang="fr-FR"/>
           </a:p>
@@ -593,7 +593,7 @@
           <a:p>
             <a:fld id="{1DD5E214-71AE-49E0-8511-3FE919ED9730}" type="datetimeFigureOut">
               <a:rPr lang="fr-FR" smtClean="0"/>
-              <a:t>20/05/2020</a:t>
+              <a:t>27/05/2020</a:t>
             </a:fld>
             <a:endParaRPr lang="fr-FR"/>
           </a:p>
@@ -763,7 +763,7 @@
           <a:p>
             <a:fld id="{1DD5E214-71AE-49E0-8511-3FE919ED9730}" type="datetimeFigureOut">
               <a:rPr lang="fr-FR" smtClean="0"/>
-              <a:t>20/05/2020</a:t>
+              <a:t>27/05/2020</a:t>
             </a:fld>
             <a:endParaRPr lang="fr-FR"/>
           </a:p>
@@ -1007,7 +1007,7 @@
           <a:p>
             <a:fld id="{1DD5E214-71AE-49E0-8511-3FE919ED9730}" type="datetimeFigureOut">
               <a:rPr lang="fr-FR" smtClean="0"/>
-              <a:t>20/05/2020</a:t>
+              <a:t>27/05/2020</a:t>
             </a:fld>
             <a:endParaRPr lang="fr-FR"/>
           </a:p>
@@ -1239,7 +1239,7 @@
           <a:p>
             <a:fld id="{1DD5E214-71AE-49E0-8511-3FE919ED9730}" type="datetimeFigureOut">
               <a:rPr lang="fr-FR" smtClean="0"/>
-              <a:t>20/05/2020</a:t>
+              <a:t>27/05/2020</a:t>
             </a:fld>
             <a:endParaRPr lang="fr-FR"/>
           </a:p>
@@ -1606,7 +1606,7 @@
           <a:p>
             <a:fld id="{1DD5E214-71AE-49E0-8511-3FE919ED9730}" type="datetimeFigureOut">
               <a:rPr lang="fr-FR" smtClean="0"/>
-              <a:t>20/05/2020</a:t>
+              <a:t>27/05/2020</a:t>
             </a:fld>
             <a:endParaRPr lang="fr-FR"/>
           </a:p>
@@ -1724,7 +1724,7 @@
           <a:p>
             <a:fld id="{1DD5E214-71AE-49E0-8511-3FE919ED9730}" type="datetimeFigureOut">
               <a:rPr lang="fr-FR" smtClean="0"/>
-              <a:t>20/05/2020</a:t>
+              <a:t>27/05/2020</a:t>
             </a:fld>
             <a:endParaRPr lang="fr-FR"/>
           </a:p>
@@ -1819,7 +1819,7 @@
           <a:p>
             <a:fld id="{1DD5E214-71AE-49E0-8511-3FE919ED9730}" type="datetimeFigureOut">
               <a:rPr lang="fr-FR" smtClean="0"/>
-              <a:t>20/05/2020</a:t>
+              <a:t>27/05/2020</a:t>
             </a:fld>
             <a:endParaRPr lang="fr-FR"/>
           </a:p>
@@ -2096,7 +2096,7 @@
           <a:p>
             <a:fld id="{1DD5E214-71AE-49E0-8511-3FE919ED9730}" type="datetimeFigureOut">
               <a:rPr lang="fr-FR" smtClean="0"/>
-              <a:t>20/05/2020</a:t>
+              <a:t>27/05/2020</a:t>
             </a:fld>
             <a:endParaRPr lang="fr-FR"/>
           </a:p>
@@ -2353,7 +2353,7 @@
           <a:p>
             <a:fld id="{1DD5E214-71AE-49E0-8511-3FE919ED9730}" type="datetimeFigureOut">
               <a:rPr lang="fr-FR" smtClean="0"/>
-              <a:t>20/05/2020</a:t>
+              <a:t>27/05/2020</a:t>
             </a:fld>
             <a:endParaRPr lang="fr-FR"/>
           </a:p>
@@ -2566,7 +2566,7 @@
           <a:p>
             <a:fld id="{1DD5E214-71AE-49E0-8511-3FE919ED9730}" type="datetimeFigureOut">
               <a:rPr lang="fr-FR" smtClean="0"/>
-              <a:t>20/05/2020</a:t>
+              <a:t>27/05/2020</a:t>
             </a:fld>
             <a:endParaRPr lang="fr-FR"/>
           </a:p>
@@ -3203,8 +3203,12 @@
               <a:p>
                 <a:pPr algn="ctr"/>
                 <a:r>
-                  <a:rPr lang="fr-FR" sz="701" dirty="0"/>
-                  <a:t>1713 </a:t>
+                  <a:rPr lang="fr-FR" sz="701" dirty="0" smtClean="0"/>
+                  <a:t>2175</a:t>
+                </a:r>
+                <a:r>
+                  <a:rPr lang="fr-FR" sz="701" dirty="0" smtClean="0"/>
+                  <a:t> </a:t>
                 </a:r>
                 <a:r>
                   <a:rPr lang="en-US" sz="701" dirty="0"/>
@@ -3457,8 +3461,13 @@
                 </a14:m>
                 <a:r>
                   <a:rPr lang="fr-FR" sz="701" dirty="0"/>
-                  <a:t>= 11%</a:t>
+                  <a:t>= </a:t>
                 </a:r>
+                <a:r>
+                  <a:rPr lang="fr-FR" sz="701" dirty="0" smtClean="0"/>
+                  <a:t>8.6%</a:t>
+                </a:r>
+                <a:endParaRPr lang="fr-FR" sz="701" dirty="0"/>
               </a:p>
             </p:txBody>
           </p:sp>
@@ -3502,8 +3511,8 @@
           </p:sp>
         </mc:Fallback>
       </mc:AlternateContent>
-      <mc:AlternateContent xmlns:mc="http://schemas.openxmlformats.org/markup-compatibility/2006">
-        <mc:Choice xmlns:a14="http://schemas.microsoft.com/office/drawing/2010/main" Requires="a14">
+      <mc:AlternateContent xmlns:mc="http://schemas.openxmlformats.org/markup-compatibility/2006" xmlns:a14="http://schemas.microsoft.com/office/drawing/2010/main">
+        <mc:Choice Requires="a14">
           <p:sp>
             <p:nvSpPr>
               <p:cNvPr id="10" name="ZoneTexte 9"/>
@@ -3587,7 +3596,7 @@
             </p:txBody>
           </p:sp>
         </mc:Choice>
-        <mc:Fallback>
+        <mc:Fallback xmlns="">
           <p:sp>
             <p:nvSpPr>
               <p:cNvPr id="10" name="ZoneTexte 9"/>
@@ -3636,8 +3645,8 @@
             </p:nvSpPr>
             <p:spPr>
               <a:xfrm>
-                <a:off x="5461362" y="2214394"/>
-                <a:ext cx="790595" cy="308033"/>
+                <a:off x="5444092" y="2207570"/>
+                <a:ext cx="855633" cy="308033"/>
               </a:xfrm>
               <a:prstGeom prst="rect">
                 <a:avLst/>
@@ -3705,8 +3714,13 @@
                 </a14:m>
                 <a:r>
                   <a:rPr lang="fr-FR" sz="701" dirty="0"/>
-                  <a:t>= 11%</a:t>
+                  <a:t>= </a:t>
                 </a:r>
+                <a:r>
+                  <a:rPr lang="fr-FR" sz="701" dirty="0" smtClean="0"/>
+                  <a:t>8.2%</a:t>
+                </a:r>
+                <a:endParaRPr lang="fr-FR" sz="701" dirty="0"/>
               </a:p>
             </p:txBody>
           </p:sp>
@@ -3722,8 +3736,8 @@
             </p:nvSpPr>
             <p:spPr>
               <a:xfrm>
-                <a:off x="5461362" y="2214394"/>
-                <a:ext cx="790595" cy="308033"/>
+                <a:off x="5444092" y="2207570"/>
+                <a:ext cx="855633" cy="308033"/>
               </a:xfrm>
               <a:prstGeom prst="rect">
                 <a:avLst/>
@@ -3760,8 +3774,8 @@
             </p:nvSpPr>
             <p:spPr>
               <a:xfrm>
-                <a:off x="6395295" y="2213431"/>
-                <a:ext cx="835123" cy="308033"/>
+                <a:off x="6354351" y="2206607"/>
+                <a:ext cx="899803" cy="308033"/>
               </a:xfrm>
               <a:prstGeom prst="rect">
                 <a:avLst/>
@@ -3829,8 +3843,17 @@
                 </a14:m>
                 <a:r>
                   <a:rPr lang="fr-FR" sz="701" dirty="0"/>
-                  <a:t>= 46%</a:t>
+                  <a:t>= </a:t>
                 </a:r>
+                <a:r>
+                  <a:rPr lang="fr-FR" sz="701" dirty="0" smtClean="0"/>
+                  <a:t>35.6</a:t>
+                </a:r>
+                <a:r>
+                  <a:rPr lang="fr-FR" sz="701" dirty="0" smtClean="0"/>
+                  <a:t>%</a:t>
+                </a:r>
+                <a:endParaRPr lang="fr-FR" sz="701" dirty="0"/>
               </a:p>
             </p:txBody>
           </p:sp>
@@ -3846,8 +3869,8 @@
             </p:nvSpPr>
             <p:spPr>
               <a:xfrm>
-                <a:off x="6395295" y="2213431"/>
-                <a:ext cx="835123" cy="308033"/>
+                <a:off x="6354351" y="2206607"/>
+                <a:ext cx="899803" cy="308033"/>
               </a:xfrm>
               <a:prstGeom prst="rect">
                 <a:avLst/>
@@ -3962,8 +3985,13 @@
                 </a14:m>
                 <a:r>
                   <a:rPr lang="fr-FR" sz="701" dirty="0"/>
-                  <a:t>= 6.3%</a:t>
+                  <a:t>= </a:t>
                 </a:r>
+                <a:r>
+                  <a:rPr lang="fr-FR" sz="701" dirty="0" smtClean="0"/>
+                  <a:t>5%</a:t>
+                </a:r>
+                <a:endParaRPr lang="fr-FR" sz="701" dirty="0"/>
               </a:p>
               <a:p>
                 <a:pPr algn="ctr"/>
@@ -4011,8 +4039,13 @@
                 </a14:m>
                 <a:r>
                   <a:rPr lang="fr-FR" sz="701" dirty="0"/>
-                  <a:t>= 4.1%</a:t>
+                  <a:t>= </a:t>
                 </a:r>
+                <a:r>
+                  <a:rPr lang="fr-FR" sz="701" dirty="0" smtClean="0"/>
+                  <a:t>4.2%</a:t>
+                </a:r>
+                <a:endParaRPr lang="fr-FR" sz="701" dirty="0"/>
               </a:p>
             </p:txBody>
           </p:sp>
@@ -4110,7 +4143,7 @@
                           </m:accPr>
                           <m:e>
                             <m:r>
-                              <a:rPr lang="fr-FR" sz="701" i="1">
+                              <a:rPr lang="fr-FR" sz="701" i="1" smtClean="0">
                                 <a:latin typeface="Cambria Math" panose="02040503050406030204" pitchFamily="18" charset="0"/>
                                 <a:ea typeface="Cambria Math" panose="02040503050406030204" pitchFamily="18" charset="0"/>
                               </a:rPr>
@@ -4144,8 +4177,13 @@
                 </a14:m>
                 <a:r>
                   <a:rPr lang="fr-FR" sz="701" dirty="0"/>
-                  <a:t>= 4.3%</a:t>
+                  <a:t>= </a:t>
                 </a:r>
+                <a:r>
+                  <a:rPr lang="fr-FR" sz="701" dirty="0" smtClean="0"/>
+                  <a:t>3.4%</a:t>
+                </a:r>
+                <a:endParaRPr lang="fr-FR" sz="701" dirty="0"/>
               </a:p>
               <a:p>
                 <a:pPr algn="ctr"/>
@@ -4193,8 +4231,17 @@
                 </a14:m>
                 <a:r>
                   <a:rPr lang="fr-FR" sz="701" dirty="0"/>
-                  <a:t>= 4.3%</a:t>
+                  <a:t>= </a:t>
                 </a:r>
+                <a:r>
+                  <a:rPr lang="fr-FR" sz="701" dirty="0" smtClean="0"/>
+                  <a:t>3.4</a:t>
+                </a:r>
+                <a:r>
+                  <a:rPr lang="fr-FR" sz="701" dirty="0" smtClean="0"/>
+                  <a:t>%</a:t>
+                </a:r>
+                <a:endParaRPr lang="fr-FR" sz="701" dirty="0"/>
               </a:p>
             </p:txBody>
           </p:sp>
@@ -4326,8 +4373,17 @@
                 </a14:m>
                 <a:r>
                   <a:rPr lang="fr-FR" sz="701" dirty="0"/>
-                  <a:t>= 5%</a:t>
+                  <a:t>= </a:t>
                 </a:r>
+                <a:r>
+                  <a:rPr lang="fr-FR" sz="701" dirty="0"/>
+                  <a:t>4</a:t>
+                </a:r>
+                <a:r>
+                  <a:rPr lang="fr-FR" sz="701" dirty="0" smtClean="0"/>
+                  <a:t>%</a:t>
+                </a:r>
+                <a:endParaRPr lang="fr-FR" sz="701" dirty="0"/>
               </a:p>
               <a:p>
                 <a:pPr algn="ctr"/>
@@ -4375,8 +4431,13 @@
                 </a14:m>
                 <a:r>
                   <a:rPr lang="fr-FR" sz="701" dirty="0"/>
-                  <a:t>= 5%</a:t>
+                  <a:t>= </a:t>
                 </a:r>
+                <a:r>
+                  <a:rPr lang="fr-FR" sz="701" dirty="0" smtClean="0"/>
+                  <a:t>4%</a:t>
+                </a:r>
+                <a:endParaRPr lang="fr-FR" sz="701" dirty="0"/>
               </a:p>
             </p:txBody>
           </p:sp>
@@ -4508,8 +4569,17 @@
                 </a14:m>
                 <a:r>
                   <a:rPr lang="fr-FR" sz="701" dirty="0"/>
-                  <a:t>= 10.6%</a:t>
+                  <a:t>= </a:t>
                 </a:r>
+                <a:r>
+                  <a:rPr lang="fr-FR" sz="701" dirty="0" smtClean="0"/>
+                  <a:t>8.4</a:t>
+                </a:r>
+                <a:r>
+                  <a:rPr lang="fr-FR" sz="701" dirty="0" smtClean="0"/>
+                  <a:t>%</a:t>
+                </a:r>
+                <a:endParaRPr lang="fr-FR" sz="701" dirty="0"/>
               </a:p>
               <a:p>
                 <a:pPr algn="ctr"/>
@@ -4557,8 +4627,17 @@
                 </a14:m>
                 <a:r>
                   <a:rPr lang="fr-FR" sz="701" dirty="0"/>
-                  <a:t>= 7.3%</a:t>
+                  <a:t>= </a:t>
                 </a:r>
+                <a:r>
+                  <a:rPr lang="fr-FR" sz="701" dirty="0"/>
+                  <a:t>5</a:t>
+                </a:r>
+                <a:r>
+                  <a:rPr lang="fr-FR" sz="701" dirty="0" smtClean="0"/>
+                  <a:t>%</a:t>
+                </a:r>
+                <a:endParaRPr lang="fr-FR" sz="701" dirty="0"/>
               </a:p>
             </p:txBody>
           </p:sp>
@@ -4612,8 +4691,8 @@
             </p:nvSpPr>
             <p:spPr>
               <a:xfrm>
-                <a:off x="4553530" y="3407904"/>
-                <a:ext cx="730479" cy="212238"/>
+                <a:off x="4583680" y="3420956"/>
+                <a:ext cx="811350" cy="212238"/>
               </a:xfrm>
               <a:prstGeom prst="rect">
                 <a:avLst/>
@@ -4686,8 +4765,21 @@
                       <a:srgbClr val="FF0000"/>
                     </a:solidFill>
                   </a:rPr>
-                  <a:t>= 5%</a:t>
+                  <a:t>= </a:t>
                 </a:r>
+                <a:r>
+                  <a:rPr lang="fr-FR" sz="779" b="1" dirty="0" smtClean="0">
+                    <a:solidFill>
+                      <a:srgbClr val="FF0000"/>
+                    </a:solidFill>
+                  </a:rPr>
+                  <a:t>4.5%</a:t>
+                </a:r>
+                <a:endParaRPr lang="fr-FR" sz="779" b="1" dirty="0">
+                  <a:solidFill>
+                    <a:srgbClr val="FF0000"/>
+                  </a:solidFill>
+                </a:endParaRPr>
               </a:p>
             </p:txBody>
           </p:sp>
@@ -4703,8 +4795,8 @@
             </p:nvSpPr>
             <p:spPr>
               <a:xfrm>
-                <a:off x="4553530" y="3407904"/>
-                <a:ext cx="730479" cy="212238"/>
+                <a:off x="4583680" y="3420956"/>
+                <a:ext cx="811350" cy="212238"/>
               </a:xfrm>
               <a:prstGeom prst="rect">
                 <a:avLst/>
@@ -5420,16 +5512,19 @@
           </a:bodyPr>
           <a:lstStyle/>
           <a:p>
-            <a:pPr marL="148369" indent="-148369">
-              <a:buFont typeface="Arial" panose="020B0604020202020204" pitchFamily="34" charset="0"/>
-              <a:buChar char="•"/>
-            </a:pPr>
+            <a:r>
+              <a:rPr lang="en-US" sz="779" b="1" dirty="0" smtClean="0">
+                <a:latin typeface="Times New Roman" panose="02020603050405020304" pitchFamily="18" charset="0"/>
+                <a:cs typeface="Times New Roman" panose="02020603050405020304" pitchFamily="18" charset="0"/>
+              </a:rPr>
+              <a:t>A - Diversity </a:t>
+            </a:r>
             <a:r>
               <a:rPr lang="en-US" sz="779" b="1" dirty="0">
                 <a:latin typeface="Times New Roman" panose="02020603050405020304" pitchFamily="18" charset="0"/>
                 <a:cs typeface="Times New Roman" panose="02020603050405020304" pitchFamily="18" charset="0"/>
               </a:rPr>
-              <a:t>Diversity partitioning of all MOTUs</a:t>
+              <a:t>partitioning of all MOTUs</a:t>
             </a:r>
           </a:p>
         </p:txBody>
@@ -5519,7 +5614,7 @@
         </p:blipFill>
         <p:spPr>
           <a:xfrm>
-            <a:off x="1586820" y="2742267"/>
+            <a:off x="1586820" y="2830979"/>
             <a:ext cx="866474" cy="649855"/>
           </a:xfrm>
           <a:prstGeom prst="rect">
@@ -5685,7 +5780,23 @@
                       <a:srgbClr val="FF0000"/>
                     </a:solidFill>
                   </a:rPr>
-                  <a:t>= 71.5%</a:t>
+                  <a:t>= </a:t>
+                </a:r>
+                <a:r>
+                  <a:rPr lang="fr-FR" sz="779" b="1" dirty="0" smtClean="0">
+                    <a:solidFill>
+                      <a:srgbClr val="FF0000"/>
+                    </a:solidFill>
+                  </a:rPr>
+                  <a:t>74.5</a:t>
+                </a:r>
+                <a:r>
+                  <a:rPr lang="fr-FR" sz="779" b="1" dirty="0">
+                    <a:solidFill>
+                      <a:srgbClr val="FF0000"/>
+                    </a:solidFill>
+                  </a:rPr>
+                  <a:t>%</a:t>
                 </a:r>
               </a:p>
             </p:txBody>
@@ -5842,8 +5953,21 @@
                       <a:srgbClr val="FF0000"/>
                     </a:solidFill>
                   </a:rPr>
-                  <a:t>= 17%</a:t>
+                  <a:t>= </a:t>
                 </a:r>
+                <a:r>
+                  <a:rPr lang="fr-FR" sz="779" b="1" dirty="0" smtClean="0">
+                    <a:solidFill>
+                      <a:srgbClr val="FF0000"/>
+                    </a:solidFill>
+                  </a:rPr>
+                  <a:t>14%</a:t>
+                </a:r>
+                <a:endParaRPr lang="fr-FR" sz="779" b="1" dirty="0">
+                  <a:solidFill>
+                    <a:srgbClr val="FF0000"/>
+                  </a:solidFill>
+                </a:endParaRPr>
               </a:p>
             </p:txBody>
           </p:sp>
@@ -5897,8 +6021,8 @@
             </p:nvSpPr>
             <p:spPr>
               <a:xfrm>
-                <a:off x="4392850" y="2591278"/>
-                <a:ext cx="1036490" cy="214995"/>
+                <a:off x="4468367" y="2624432"/>
+                <a:ext cx="992994" cy="214995"/>
               </a:xfrm>
               <a:prstGeom prst="rect">
                 <a:avLst/>
@@ -5990,8 +6114,29 @@
                       <a:srgbClr val="FF0000"/>
                     </a:solidFill>
                   </a:rPr>
-                  <a:t>= 6.5%</a:t>
+                  <a:t>= </a:t>
                 </a:r>
+                <a:r>
+                  <a:rPr lang="fr-FR" sz="779" b="1" dirty="0">
+                    <a:solidFill>
+                      <a:srgbClr val="FF0000"/>
+                    </a:solidFill>
+                  </a:rPr>
+                  <a:t>7</a:t>
+                </a:r>
+                <a:r>
+                  <a:rPr lang="fr-FR" sz="779" b="1" dirty="0" smtClean="0">
+                    <a:solidFill>
+                      <a:srgbClr val="FF0000"/>
+                    </a:solidFill>
+                  </a:rPr>
+                  <a:t>%</a:t>
+                </a:r>
+                <a:endParaRPr lang="fr-FR" sz="779" b="1" dirty="0">
+                  <a:solidFill>
+                    <a:srgbClr val="FF0000"/>
+                  </a:solidFill>
+                </a:endParaRPr>
               </a:p>
             </p:txBody>
           </p:sp>
@@ -6007,8 +6152,8 @@
             </p:nvSpPr>
             <p:spPr>
               <a:xfrm>
-                <a:off x="4392850" y="2591278"/>
-                <a:ext cx="1036490" cy="214995"/>
+                <a:off x="4468367" y="2624432"/>
+                <a:ext cx="992994" cy="214995"/>
               </a:xfrm>
               <a:prstGeom prst="rect">
                 <a:avLst/>
@@ -6016,7 +6161,7 @@
               <a:blipFill>
                 <a:blip r:embed="rId20"/>
                 <a:stretch>
-                  <a:fillRect b="-8571"/>
+                  <a:fillRect b="-5714"/>
                 </a:stretch>
               </a:blipFill>
             </p:spPr>
@@ -6071,8 +6216,8 @@
           </a:fontRef>
         </p:style>
       </p:cxnSp>
-      <mc:AlternateContent xmlns:mc="http://schemas.openxmlformats.org/markup-compatibility/2006" xmlns:a14="http://schemas.microsoft.com/office/drawing/2010/main">
-        <mc:Choice Requires="a14">
+      <mc:AlternateContent xmlns:mc="http://schemas.openxmlformats.org/markup-compatibility/2006">
+        <mc:Choice xmlns:a14="http://schemas.microsoft.com/office/drawing/2010/main" Requires="a14">
           <p:graphicFrame>
             <p:nvGraphicFramePr>
               <p:cNvPr id="2" name="Tableau 1"/>
@@ -6082,14 +6227,14 @@
               <p:nvPr>
                 <p:extLst>
                   <p:ext uri="{D42A27DB-BD31-4B8C-83A1-F6EECF244321}">
-                    <p14:modId xmlns:p14="http://schemas.microsoft.com/office/powerpoint/2010/main" val="2247587491"/>
+                    <p14:modId xmlns:p14="http://schemas.microsoft.com/office/powerpoint/2010/main" val="3529283879"/>
                   </p:ext>
                 </p:extLst>
               </p:nvPr>
             </p:nvGraphicFramePr>
             <p:xfrm>
-              <a:off x="2984031" y="3726210"/>
-              <a:ext cx="3980249" cy="897232"/>
+              <a:off x="2313299" y="3726210"/>
+              <a:ext cx="4650980" cy="976449"/>
             </p:xfrm>
             <a:graphic>
               <a:graphicData uri="http://schemas.openxmlformats.org/drawingml/2006/table">
@@ -6098,35 +6243,42 @@
                     <a:tableStyleId>{5C22544A-7EE6-4342-B048-85BDC9FD1C3A}</a:tableStyleId>
                   </a:tblPr>
                   <a:tblGrid>
-                    <a:gridCol w="1346305">
+                    <a:gridCol w="1349860">
                       <a:extLst>
                         <a:ext uri="{9D8B030D-6E8A-4147-A177-3AD203B41FA5}">
                           <a16:colId xmlns:a16="http://schemas.microsoft.com/office/drawing/2014/main" val="1067048240"/>
                         </a:ext>
                       </a:extLst>
                     </a:gridCol>
-                    <a:gridCol w="658486">
+                    <a:gridCol w="660224">
+                      <a:extLst>
+                        <a:ext uri="{9D8B030D-6E8A-4147-A177-3AD203B41FA5}">
+                          <a16:colId xmlns:a16="http://schemas.microsoft.com/office/drawing/2014/main" val="1671461065"/>
+                        </a:ext>
+                      </a:extLst>
+                    </a:gridCol>
+                    <a:gridCol w="660224">
                       <a:extLst>
                         <a:ext uri="{9D8B030D-6E8A-4147-A177-3AD203B41FA5}">
                           <a16:colId xmlns:a16="http://schemas.microsoft.com/office/drawing/2014/main" val="3084419488"/>
                         </a:ext>
                       </a:extLst>
                     </a:gridCol>
-                    <a:gridCol w="658486">
+                    <a:gridCol w="660224">
                       <a:extLst>
                         <a:ext uri="{9D8B030D-6E8A-4147-A177-3AD203B41FA5}">
                           <a16:colId xmlns:a16="http://schemas.microsoft.com/office/drawing/2014/main" val="3836093460"/>
                         </a:ext>
                       </a:extLst>
                     </a:gridCol>
-                    <a:gridCol w="658486">
+                    <a:gridCol w="660224">
                       <a:extLst>
                         <a:ext uri="{9D8B030D-6E8A-4147-A177-3AD203B41FA5}">
                           <a16:colId xmlns:a16="http://schemas.microsoft.com/office/drawing/2014/main" val="4109928961"/>
                         </a:ext>
                       </a:extLst>
                     </a:gridCol>
-                    <a:gridCol w="658486">
+                    <a:gridCol w="660224">
                       <a:extLst>
                         <a:ext uri="{9D8B030D-6E8A-4147-A177-3AD203B41FA5}">
                           <a16:colId xmlns:a16="http://schemas.microsoft.com/office/drawing/2014/main" val="2333253021"/>
@@ -6140,10 +6292,24 @@
                         <a:bodyPr/>
                         <a:lstStyle/>
                         <a:p>
-                          <a:endParaRPr lang="fr-FR" sz="800" b="0" dirty="0">
+                          <a:r>
+                            <a:rPr lang="fr-FR" sz="800" b="1" i="0" kern="1200" dirty="0" smtClean="0">
+                              <a:solidFill>
+                                <a:schemeClr val="tx1"/>
+                              </a:solidFill>
+                              <a:latin typeface="Cambria Math" panose="02040503050406030204" pitchFamily="18" charset="0"/>
+                              <a:ea typeface="+mn-ea"/>
+                              <a:cs typeface="+mn-cs"/>
+                            </a:rPr>
+                            <a:t>MOTUs assigned to…</a:t>
+                          </a:r>
+                          <a:endParaRPr lang="fr-FR" sz="800" b="1" i="0" kern="1200" dirty="0">
                             <a:solidFill>
                               <a:schemeClr val="tx1"/>
                             </a:solidFill>
+                            <a:latin typeface="Cambria Math" panose="02040503050406030204" pitchFamily="18" charset="0"/>
+                            <a:ea typeface="+mn-ea"/>
+                            <a:cs typeface="+mn-cs"/>
                           </a:endParaRPr>
                         </a:p>
                       </a:txBody>
@@ -6163,6 +6329,133 @@
                           <a:tailEnd type="none" w="med" len="med"/>
                         </a:lnR>
                         <a:lnT w="12700" cap="flat" cmpd="sng" algn="ctr">
+                          <a:noFill/>
+                          <a:prstDash val="solid"/>
+                          <a:round/>
+                          <a:headEnd type="none" w="med" len="med"/>
+                          <a:tailEnd type="none" w="med" len="med"/>
+                        </a:lnT>
+                        <a:lnB w="3175" cap="flat" cmpd="sng" algn="ctr">
+                          <a:solidFill>
+                            <a:schemeClr val="tx1"/>
+                          </a:solidFill>
+                          <a:prstDash val="solid"/>
+                          <a:round/>
+                          <a:headEnd type="none" w="med" len="med"/>
+                          <a:tailEnd type="none" w="med" len="med"/>
+                        </a:lnB>
+                        <a:lnTlToBr w="12700" cmpd="sng">
+                          <a:noFill/>
+                          <a:prstDash val="solid"/>
+                        </a:lnTlToBr>
+                        <a:lnBlToTr w="12700" cmpd="sng">
+                          <a:noFill/>
+                          <a:prstDash val="solid"/>
+                        </a:lnBlToTr>
+                        <a:noFill/>
+                      </a:tcPr>
+                    </a:tc>
+                    <a:tc>
+                      <a:txBody>
+                        <a:bodyPr/>
+                        <a:lstStyle/>
+                        <a:p>
+                          <a:pPr/>
+                          <a14:m>
+                            <m:oMath xmlns:m="http://schemas.openxmlformats.org/officeDocument/2006/math">
+                              <m:sSub>
+                                <m:sSubPr>
+                                  <m:ctrlPr>
+                                    <a:rPr lang="fr-FR" sz="800" b="1" i="1" kern="1200" smtClean="0">
+                                      <a:solidFill>
+                                        <a:schemeClr val="tx1"/>
+                                      </a:solidFill>
+                                      <a:latin typeface="Cambria Math" panose="02040503050406030204" pitchFamily="18" charset="0"/>
+                                      <a:ea typeface="+mn-ea"/>
+                                      <a:cs typeface="+mn-cs"/>
+                                    </a:rPr>
+                                  </m:ctrlPr>
+                                </m:sSubPr>
+                                <m:e>
+                                  <m:r>
+                                    <m:rPr>
+                                      <m:nor/>
+                                    </m:rPr>
+                                    <a:rPr lang="el-GR" sz="800" b="1" i="1" kern="1200" dirty="0">
+                                      <a:solidFill>
+                                        <a:schemeClr val="tx1"/>
+                                      </a:solidFill>
+                                      <a:latin typeface="Cambria Math" panose="02040503050406030204" pitchFamily="18" charset="0"/>
+                                      <a:ea typeface="+mn-ea"/>
+                                      <a:cs typeface="+mn-cs"/>
+                                    </a:rPr>
+                                    <m:t>γ</m:t>
+                                  </m:r>
+                                </m:e>
+                                <m:sub>
+                                  <m:r>
+                                    <a:rPr lang="fr-FR" sz="800" b="1" i="1" kern="1200">
+                                      <a:solidFill>
+                                        <a:schemeClr val="tx1"/>
+                                      </a:solidFill>
+                                      <a:latin typeface="Cambria Math" panose="02040503050406030204" pitchFamily="18" charset="0"/>
+                                      <a:ea typeface="+mn-ea"/>
+                                      <a:cs typeface="+mn-cs"/>
+                                    </a:rPr>
+                                    <m:t>𝒈𝒍𝒐𝒃𝒂𝒍</m:t>
+                                  </m:r>
+                                </m:sub>
+                              </m:sSub>
+                            </m:oMath>
+                          </a14:m>
+                          <a:r>
+                            <a:rPr lang="fr-FR" sz="800" b="1" i="1" kern="1200" dirty="0" smtClean="0">
+                              <a:solidFill>
+                                <a:schemeClr val="tx1"/>
+                              </a:solidFill>
+                              <a:latin typeface="Cambria Math" panose="02040503050406030204" pitchFamily="18" charset="0"/>
+                              <a:ea typeface="+mn-ea"/>
+                              <a:cs typeface="+mn-cs"/>
+                            </a:rPr>
+                            <a:t> </a:t>
+                          </a:r>
+                          <a:r>
+                            <a:rPr lang="fr-FR" sz="700" b="0" i="1" kern="1200" dirty="0" smtClean="0">
+                              <a:solidFill>
+                                <a:schemeClr val="tx1"/>
+                              </a:solidFill>
+                              <a:latin typeface="Cambria Math" panose="02040503050406030204" pitchFamily="18" charset="0"/>
+                              <a:ea typeface="+mn-ea"/>
+                              <a:cs typeface="+mn-cs"/>
+                            </a:rPr>
+                            <a:t>(MOTUs)</a:t>
+                          </a:r>
+                          <a:endParaRPr lang="fr-FR" sz="800" b="0" i="1" kern="1200" dirty="0">
+                            <a:solidFill>
+                              <a:schemeClr val="tx1"/>
+                            </a:solidFill>
+                            <a:latin typeface="Cambria Math" panose="02040503050406030204" pitchFamily="18" charset="0"/>
+                            <a:ea typeface="+mn-ea"/>
+                            <a:cs typeface="+mn-cs"/>
+                          </a:endParaRPr>
+                        </a:p>
+                      </a:txBody>
+                      <a:tcPr marL="63305" marR="63305" marT="31652" marB="31652" anchor="ctr">
+                        <a:lnL w="3175" cap="flat" cmpd="sng" algn="ctr">
+                          <a:noFill/>
+                          <a:prstDash val="solid"/>
+                          <a:round/>
+                          <a:headEnd type="none" w="med" len="med"/>
+                          <a:tailEnd type="none" w="med" len="med"/>
+                        </a:lnL>
+                        <a:lnR w="3175" cap="flat" cmpd="sng" algn="ctr">
+                          <a:noFill/>
+                          <a:prstDash val="solid"/>
+                          <a:round/>
+                          <a:headEnd type="none" w="med" len="med"/>
+                          <a:tailEnd type="none" w="med" len="med"/>
+                        </a:lnR>
+                        <a:lnT w="3175" cap="flat" cmpd="sng" algn="ctr">
                           <a:noFill/>
                           <a:prstDash val="solid"/>
                           <a:round/>
@@ -6765,7 +7058,7 @@
                               <a:ea typeface="+mn-ea"/>
                               <a:cs typeface="Times New Roman" panose="02020603050405020304" pitchFamily="18" charset="0"/>
                             </a:rPr>
-                            <a:t>74%</a:t>
+                            <a:t>275</a:t>
                           </a:r>
                           <a:endParaRPr lang="fr-FR" sz="800" b="0" kern="1200" dirty="0">
                             <a:solidFill>
@@ -6834,7 +7127,7 @@
                               <a:ea typeface="+mn-ea"/>
                               <a:cs typeface="Times New Roman" panose="02020603050405020304" pitchFamily="18" charset="0"/>
                             </a:rPr>
-                            <a:t>18%</a:t>
+                            <a:t>77%</a:t>
                           </a:r>
                           <a:endParaRPr lang="fr-FR" sz="800" b="0" kern="1200" dirty="0">
                             <a:solidFill>
@@ -6865,6 +7158,547 @@
                           <a:solidFill>
                             <a:schemeClr val="tx1"/>
                           </a:solidFill>
+                          <a:prstDash val="solid"/>
+                          <a:round/>
+                          <a:headEnd type="none" w="med" len="med"/>
+                          <a:tailEnd type="none" w="med" len="med"/>
+                        </a:lnT>
+                        <a:lnB w="3175" cap="flat" cmpd="sng" algn="ctr">
+                          <a:noFill/>
+                          <a:prstDash val="solid"/>
+                          <a:round/>
+                          <a:headEnd type="none" w="med" len="med"/>
+                          <a:tailEnd type="none" w="med" len="med"/>
+                        </a:lnB>
+                        <a:lnTlToBr w="12700" cmpd="sng">
+                          <a:noFill/>
+                          <a:prstDash val="solid"/>
+                        </a:lnTlToBr>
+                        <a:lnBlToTr w="12700" cmpd="sng">
+                          <a:noFill/>
+                          <a:prstDash val="solid"/>
+                        </a:lnBlToTr>
+                        <a:noFill/>
+                      </a:tcPr>
+                    </a:tc>
+                    <a:tc>
+                      <a:txBody>
+                        <a:bodyPr/>
+                        <a:lstStyle/>
+                        <a:p>
+                          <a:pPr algn="ctr"/>
+                          <a:r>
+                            <a:rPr lang="fr-FR" sz="800" b="0" kern="1200" dirty="0" smtClean="0">
+                              <a:solidFill>
+                                <a:schemeClr val="dk1"/>
+                              </a:solidFill>
+                              <a:latin typeface="Times New Roman" panose="02020603050405020304" pitchFamily="18" charset="0"/>
+                              <a:ea typeface="+mn-ea"/>
+                              <a:cs typeface="Times New Roman" panose="02020603050405020304" pitchFamily="18" charset="0"/>
+                            </a:rPr>
+                            <a:t>14.7%</a:t>
+                          </a:r>
+                          <a:endParaRPr lang="fr-FR" sz="800" b="0" kern="1200" dirty="0">
+                            <a:solidFill>
+                              <a:schemeClr val="dk1"/>
+                            </a:solidFill>
+                            <a:latin typeface="Times New Roman" panose="02020603050405020304" pitchFamily="18" charset="0"/>
+                            <a:ea typeface="+mn-ea"/>
+                            <a:cs typeface="Times New Roman" panose="02020603050405020304" pitchFamily="18" charset="0"/>
+                          </a:endParaRPr>
+                        </a:p>
+                      </a:txBody>
+                      <a:tcPr marL="63305" marR="63305" marT="31652" marB="31652" anchor="ctr">
+                        <a:lnL w="3175" cap="flat" cmpd="sng" algn="ctr">
+                          <a:noFill/>
+                          <a:prstDash val="solid"/>
+                          <a:round/>
+                          <a:headEnd type="none" w="med" len="med"/>
+                          <a:tailEnd type="none" w="med" len="med"/>
+                        </a:lnL>
+                        <a:lnR w="3175" cap="flat" cmpd="sng" algn="ctr">
+                          <a:noFill/>
+                          <a:prstDash val="solid"/>
+                          <a:round/>
+                          <a:headEnd type="none" w="med" len="med"/>
+                          <a:tailEnd type="none" w="med" len="med"/>
+                        </a:lnR>
+                        <a:lnT w="3175" cap="flat" cmpd="sng" algn="ctr">
+                          <a:solidFill>
+                            <a:schemeClr val="tx1"/>
+                          </a:solidFill>
+                          <a:prstDash val="solid"/>
+                          <a:round/>
+                          <a:headEnd type="none" w="med" len="med"/>
+                          <a:tailEnd type="none" w="med" len="med"/>
+                        </a:lnT>
+                        <a:lnB w="3175" cap="flat" cmpd="sng" algn="ctr">
+                          <a:noFill/>
+                          <a:prstDash val="solid"/>
+                          <a:round/>
+                          <a:headEnd type="none" w="med" len="med"/>
+                          <a:tailEnd type="none" w="med" len="med"/>
+                        </a:lnB>
+                        <a:lnTlToBr w="12700" cmpd="sng">
+                          <a:noFill/>
+                          <a:prstDash val="solid"/>
+                        </a:lnTlToBr>
+                        <a:lnBlToTr w="12700" cmpd="sng">
+                          <a:noFill/>
+                          <a:prstDash val="solid"/>
+                        </a:lnBlToTr>
+                        <a:noFill/>
+                      </a:tcPr>
+                    </a:tc>
+                    <a:tc>
+                      <a:txBody>
+                        <a:bodyPr/>
+                        <a:lstStyle/>
+                        <a:p>
+                          <a:pPr algn="ctr"/>
+                          <a:r>
+                            <a:rPr lang="fr-FR" sz="800" b="0" kern="1200" dirty="0" smtClean="0">
+                              <a:solidFill>
+                                <a:schemeClr val="dk1"/>
+                              </a:solidFill>
+                              <a:latin typeface="Times New Roman" panose="02020603050405020304" pitchFamily="18" charset="0"/>
+                              <a:ea typeface="+mn-ea"/>
+                              <a:cs typeface="Times New Roman" panose="02020603050405020304" pitchFamily="18" charset="0"/>
+                            </a:rPr>
+                            <a:t>5.5%</a:t>
+                          </a:r>
+                          <a:endParaRPr lang="fr-FR" sz="800" b="0" kern="1200" dirty="0">
+                            <a:solidFill>
+                              <a:schemeClr val="dk1"/>
+                            </a:solidFill>
+                            <a:latin typeface="Times New Roman" panose="02020603050405020304" pitchFamily="18" charset="0"/>
+                            <a:ea typeface="+mn-ea"/>
+                            <a:cs typeface="Times New Roman" panose="02020603050405020304" pitchFamily="18" charset="0"/>
+                          </a:endParaRPr>
+                        </a:p>
+                      </a:txBody>
+                      <a:tcPr marL="63305" marR="63305" marT="31652" marB="31652" anchor="ctr">
+                        <a:lnL w="3175" cap="flat" cmpd="sng" algn="ctr">
+                          <a:noFill/>
+                          <a:prstDash val="solid"/>
+                          <a:round/>
+                          <a:headEnd type="none" w="med" len="med"/>
+                          <a:tailEnd type="none" w="med" len="med"/>
+                        </a:lnL>
+                        <a:lnR w="3175" cap="flat" cmpd="sng" algn="ctr">
+                          <a:noFill/>
+                          <a:prstDash val="solid"/>
+                          <a:round/>
+                          <a:headEnd type="none" w="med" len="med"/>
+                          <a:tailEnd type="none" w="med" len="med"/>
+                        </a:lnR>
+                        <a:lnT w="3175" cap="flat" cmpd="sng" algn="ctr">
+                          <a:solidFill>
+                            <a:schemeClr val="tx1"/>
+                          </a:solidFill>
+                          <a:prstDash val="solid"/>
+                          <a:round/>
+                          <a:headEnd type="none" w="med" len="med"/>
+                          <a:tailEnd type="none" w="med" len="med"/>
+                        </a:lnT>
+                        <a:lnB w="3175" cap="flat" cmpd="sng" algn="ctr">
+                          <a:noFill/>
+                          <a:prstDash val="solid"/>
+                          <a:round/>
+                          <a:headEnd type="none" w="med" len="med"/>
+                          <a:tailEnd type="none" w="med" len="med"/>
+                        </a:lnB>
+                        <a:lnTlToBr w="12700" cmpd="sng">
+                          <a:noFill/>
+                          <a:prstDash val="solid"/>
+                        </a:lnTlToBr>
+                        <a:lnBlToTr w="12700" cmpd="sng">
+                          <a:noFill/>
+                          <a:prstDash val="solid"/>
+                        </a:lnBlToTr>
+                        <a:noFill/>
+                      </a:tcPr>
+                    </a:tc>
+                    <a:tc>
+                      <a:txBody>
+                        <a:bodyPr/>
+                        <a:lstStyle/>
+                        <a:p>
+                          <a:pPr algn="ctr"/>
+                          <a:r>
+                            <a:rPr lang="fr-FR" sz="800" b="0" kern="1200" dirty="0" smtClean="0">
+                              <a:solidFill>
+                                <a:schemeClr val="dk1"/>
+                              </a:solidFill>
+                              <a:latin typeface="Times New Roman" panose="02020603050405020304" pitchFamily="18" charset="0"/>
+                              <a:ea typeface="+mn-ea"/>
+                              <a:cs typeface="Times New Roman" panose="02020603050405020304" pitchFamily="18" charset="0"/>
+                            </a:rPr>
+                            <a:t>2.8%</a:t>
+                          </a:r>
+                          <a:endParaRPr lang="fr-FR" sz="800" b="0" kern="1200" dirty="0">
+                            <a:solidFill>
+                              <a:schemeClr val="dk1"/>
+                            </a:solidFill>
+                            <a:latin typeface="Times New Roman" panose="02020603050405020304" pitchFamily="18" charset="0"/>
+                            <a:ea typeface="+mn-ea"/>
+                            <a:cs typeface="Times New Roman" panose="02020603050405020304" pitchFamily="18" charset="0"/>
+                          </a:endParaRPr>
+                        </a:p>
+                      </a:txBody>
+                      <a:tcPr marL="63305" marR="63305" marT="31652" marB="31652" anchor="ctr">
+                        <a:lnL w="3175" cap="flat" cmpd="sng" algn="ctr">
+                          <a:noFill/>
+                          <a:prstDash val="solid"/>
+                          <a:round/>
+                          <a:headEnd type="none" w="med" len="med"/>
+                          <a:tailEnd type="none" w="med" len="med"/>
+                        </a:lnL>
+                        <a:lnR w="3175" cap="flat" cmpd="sng" algn="ctr">
+                          <a:noFill/>
+                          <a:prstDash val="solid"/>
+                          <a:round/>
+                          <a:headEnd type="none" w="med" len="med"/>
+                          <a:tailEnd type="none" w="med" len="med"/>
+                        </a:lnR>
+                        <a:lnT w="3175" cap="flat" cmpd="sng" algn="ctr">
+                          <a:solidFill>
+                            <a:schemeClr val="tx1"/>
+                          </a:solidFill>
+                          <a:prstDash val="solid"/>
+                          <a:round/>
+                          <a:headEnd type="none" w="med" len="med"/>
+                          <a:tailEnd type="none" w="med" len="med"/>
+                        </a:lnT>
+                        <a:lnB w="3175" cap="flat" cmpd="sng" algn="ctr">
+                          <a:noFill/>
+                          <a:prstDash val="solid"/>
+                          <a:round/>
+                          <a:headEnd type="none" w="med" len="med"/>
+                          <a:tailEnd type="none" w="med" len="med"/>
+                        </a:lnB>
+                        <a:lnTlToBr w="12700" cmpd="sng">
+                          <a:noFill/>
+                          <a:prstDash val="solid"/>
+                        </a:lnTlToBr>
+                        <a:lnBlToTr w="12700" cmpd="sng">
+                          <a:noFill/>
+                          <a:prstDash val="solid"/>
+                        </a:lnBlToTr>
+                        <a:noFill/>
+                      </a:tcPr>
+                    </a:tc>
+                    <a:extLst>
+                      <a:ext uri="{0D108BD9-81ED-4DB2-BD59-A6C34878D82A}">
+                        <a16:rowId xmlns:a16="http://schemas.microsoft.com/office/drawing/2014/main" val="901899567"/>
+                      </a:ext>
+                    </a:extLst>
+                  </a:tr>
+                  <a:tr h="224308">
+                    <a:tc>
+                      <a:txBody>
+                        <a:bodyPr/>
+                        <a:lstStyle/>
+                        <a:p>
+                          <a:r>
+                            <a:rPr lang="en-US" sz="800" b="1" dirty="0" smtClean="0">
+                              <a:latin typeface="Times New Roman" panose="02020603050405020304" pitchFamily="18" charset="0"/>
+                              <a:cs typeface="Times New Roman" panose="02020603050405020304" pitchFamily="18" charset="0"/>
+                            </a:rPr>
+                            <a:t>Pelagic families</a:t>
+                          </a:r>
+                          <a:endParaRPr lang="fr-FR" sz="800" b="1" dirty="0">
+                            <a:solidFill>
+                              <a:schemeClr val="tx1"/>
+                            </a:solidFill>
+                          </a:endParaRPr>
+                        </a:p>
+                      </a:txBody>
+                      <a:tcPr marL="63305" marR="63305" marT="31652" marB="31652" anchor="ctr">
+                        <a:lnL w="3175" cap="flat" cmpd="sng" algn="ctr">
+                          <a:noFill/>
+                          <a:prstDash val="solid"/>
+                          <a:round/>
+                          <a:headEnd type="none" w="med" len="med"/>
+                          <a:tailEnd type="none" w="med" len="med"/>
+                        </a:lnL>
+                        <a:lnR w="3175" cap="flat" cmpd="sng" algn="ctr">
+                          <a:noFill/>
+                          <a:prstDash val="solid"/>
+                          <a:round/>
+                          <a:headEnd type="none" w="med" len="med"/>
+                          <a:tailEnd type="none" w="med" len="med"/>
+                        </a:lnR>
+                        <a:lnT w="3175" cap="flat" cmpd="sng" algn="ctr">
+                          <a:noFill/>
+                          <a:prstDash val="solid"/>
+                          <a:round/>
+                          <a:headEnd type="none" w="med" len="med"/>
+                          <a:tailEnd type="none" w="med" len="med"/>
+                        </a:lnT>
+                        <a:lnB w="3175" cap="flat" cmpd="sng" algn="ctr">
+                          <a:noFill/>
+                          <a:prstDash val="solid"/>
+                          <a:round/>
+                          <a:headEnd type="none" w="med" len="med"/>
+                          <a:tailEnd type="none" w="med" len="med"/>
+                        </a:lnB>
+                        <a:lnTlToBr w="12700" cmpd="sng">
+                          <a:noFill/>
+                          <a:prstDash val="solid"/>
+                        </a:lnTlToBr>
+                        <a:lnBlToTr w="12700" cmpd="sng">
+                          <a:noFill/>
+                          <a:prstDash val="solid"/>
+                        </a:lnBlToTr>
+                        <a:noFill/>
+                      </a:tcPr>
+                    </a:tc>
+                    <a:tc>
+                      <a:txBody>
+                        <a:bodyPr/>
+                        <a:lstStyle/>
+                        <a:p>
+                          <a:pPr algn="ctr"/>
+                          <a:r>
+                            <a:rPr lang="fr-FR" sz="800" b="0" kern="1200" dirty="0" smtClean="0">
+                              <a:solidFill>
+                                <a:schemeClr val="dk1"/>
+                              </a:solidFill>
+                              <a:latin typeface="Times New Roman" panose="02020603050405020304" pitchFamily="18" charset="0"/>
+                              <a:ea typeface="+mn-ea"/>
+                              <a:cs typeface="Times New Roman" panose="02020603050405020304" pitchFamily="18" charset="0"/>
+                            </a:rPr>
+                            <a:t>171</a:t>
+                          </a:r>
+                          <a:endParaRPr lang="fr-FR" sz="800" b="0" kern="1200" dirty="0">
+                            <a:solidFill>
+                              <a:schemeClr val="dk1"/>
+                            </a:solidFill>
+                            <a:latin typeface="Times New Roman" panose="02020603050405020304" pitchFamily="18" charset="0"/>
+                            <a:ea typeface="+mn-ea"/>
+                            <a:cs typeface="Times New Roman" panose="02020603050405020304" pitchFamily="18" charset="0"/>
+                          </a:endParaRPr>
+                        </a:p>
+                      </a:txBody>
+                      <a:tcPr marL="63305" marR="63305" marT="31652" marB="31652" anchor="ctr">
+                        <a:lnL w="3175" cap="flat" cmpd="sng" algn="ctr">
+                          <a:noFill/>
+                          <a:prstDash val="solid"/>
+                          <a:round/>
+                          <a:headEnd type="none" w="med" len="med"/>
+                          <a:tailEnd type="none" w="med" len="med"/>
+                        </a:lnL>
+                        <a:lnR w="3175" cap="flat" cmpd="sng" algn="ctr">
+                          <a:noFill/>
+                          <a:prstDash val="solid"/>
+                          <a:round/>
+                          <a:headEnd type="none" w="med" len="med"/>
+                          <a:tailEnd type="none" w="med" len="med"/>
+                        </a:lnR>
+                        <a:lnT w="3175" cap="flat" cmpd="sng" algn="ctr">
+                          <a:noFill/>
+                          <a:prstDash val="solid"/>
+                          <a:round/>
+                          <a:headEnd type="none" w="med" len="med"/>
+                          <a:tailEnd type="none" w="med" len="med"/>
+                        </a:lnT>
+                        <a:lnB w="3175" cap="flat" cmpd="sng" algn="ctr">
+                          <a:noFill/>
+                          <a:prstDash val="solid"/>
+                          <a:round/>
+                          <a:headEnd type="none" w="med" len="med"/>
+                          <a:tailEnd type="none" w="med" len="med"/>
+                        </a:lnB>
+                        <a:lnTlToBr w="12700" cmpd="sng">
+                          <a:noFill/>
+                          <a:prstDash val="solid"/>
+                        </a:lnTlToBr>
+                        <a:lnBlToTr w="12700" cmpd="sng">
+                          <a:noFill/>
+                          <a:prstDash val="solid"/>
+                        </a:lnBlToTr>
+                        <a:noFill/>
+                      </a:tcPr>
+                    </a:tc>
+                    <a:tc>
+                      <a:txBody>
+                        <a:bodyPr/>
+                        <a:lstStyle/>
+                        <a:p>
+                          <a:pPr algn="ctr"/>
+                          <a:r>
+                            <a:rPr lang="fr-FR" sz="800" b="0" kern="1200" dirty="0" smtClean="0">
+                              <a:solidFill>
+                                <a:schemeClr val="dk1"/>
+                              </a:solidFill>
+                              <a:latin typeface="Times New Roman" panose="02020603050405020304" pitchFamily="18" charset="0"/>
+                              <a:ea typeface="+mn-ea"/>
+                              <a:cs typeface="Times New Roman" panose="02020603050405020304" pitchFamily="18" charset="0"/>
+                            </a:rPr>
+                            <a:t>74.3%</a:t>
+                          </a:r>
+                          <a:endParaRPr lang="fr-FR" sz="800" b="0" kern="1200" dirty="0">
+                            <a:solidFill>
+                              <a:schemeClr val="dk1"/>
+                            </a:solidFill>
+                            <a:latin typeface="Times New Roman" panose="02020603050405020304" pitchFamily="18" charset="0"/>
+                            <a:ea typeface="+mn-ea"/>
+                            <a:cs typeface="Times New Roman" panose="02020603050405020304" pitchFamily="18" charset="0"/>
+                          </a:endParaRPr>
+                        </a:p>
+                      </a:txBody>
+                      <a:tcPr marL="63305" marR="63305" marT="31652" marB="31652" anchor="ctr">
+                        <a:lnL w="3175" cap="flat" cmpd="sng" algn="ctr">
+                          <a:noFill/>
+                          <a:prstDash val="solid"/>
+                          <a:round/>
+                          <a:headEnd type="none" w="med" len="med"/>
+                          <a:tailEnd type="none" w="med" len="med"/>
+                        </a:lnL>
+                        <a:lnR w="3175" cap="flat" cmpd="sng" algn="ctr">
+                          <a:noFill/>
+                          <a:prstDash val="solid"/>
+                          <a:round/>
+                          <a:headEnd type="none" w="med" len="med"/>
+                          <a:tailEnd type="none" w="med" len="med"/>
+                        </a:lnR>
+                        <a:lnT w="3175" cap="flat" cmpd="sng" algn="ctr">
+                          <a:noFill/>
+                          <a:prstDash val="solid"/>
+                          <a:round/>
+                          <a:headEnd type="none" w="med" len="med"/>
+                          <a:tailEnd type="none" w="med" len="med"/>
+                        </a:lnT>
+                        <a:lnB w="3175" cap="flat" cmpd="sng" algn="ctr">
+                          <a:noFill/>
+                          <a:prstDash val="solid"/>
+                          <a:round/>
+                          <a:headEnd type="none" w="med" len="med"/>
+                          <a:tailEnd type="none" w="med" len="med"/>
+                        </a:lnB>
+                        <a:lnTlToBr w="12700" cmpd="sng">
+                          <a:noFill/>
+                          <a:prstDash val="solid"/>
+                        </a:lnTlToBr>
+                        <a:lnBlToTr w="12700" cmpd="sng">
+                          <a:noFill/>
+                          <a:prstDash val="solid"/>
+                        </a:lnBlToTr>
+                        <a:noFill/>
+                      </a:tcPr>
+                    </a:tc>
+                    <a:tc>
+                      <a:txBody>
+                        <a:bodyPr/>
+                        <a:lstStyle/>
+                        <a:p>
+                          <a:pPr algn="ctr"/>
+                          <a:r>
+                            <a:rPr lang="fr-FR" sz="800" b="0" kern="1200" dirty="0" smtClean="0">
+                              <a:solidFill>
+                                <a:schemeClr val="dk1"/>
+                              </a:solidFill>
+                              <a:latin typeface="Times New Roman" panose="02020603050405020304" pitchFamily="18" charset="0"/>
+                              <a:ea typeface="+mn-ea"/>
+                              <a:cs typeface="Times New Roman" panose="02020603050405020304" pitchFamily="18" charset="0"/>
+                            </a:rPr>
+                            <a:t>13.5%</a:t>
+                          </a:r>
+                          <a:endParaRPr lang="fr-FR" sz="800" b="0" kern="1200" dirty="0">
+                            <a:solidFill>
+                              <a:schemeClr val="dk1"/>
+                            </a:solidFill>
+                            <a:latin typeface="Times New Roman" panose="02020603050405020304" pitchFamily="18" charset="0"/>
+                            <a:ea typeface="+mn-ea"/>
+                            <a:cs typeface="Times New Roman" panose="02020603050405020304" pitchFamily="18" charset="0"/>
+                          </a:endParaRPr>
+                        </a:p>
+                      </a:txBody>
+                      <a:tcPr marL="63305" marR="63305" marT="31652" marB="31652" anchor="ctr">
+                        <a:lnL w="3175" cap="flat" cmpd="sng" algn="ctr">
+                          <a:noFill/>
+                          <a:prstDash val="solid"/>
+                          <a:round/>
+                          <a:headEnd type="none" w="med" len="med"/>
+                          <a:tailEnd type="none" w="med" len="med"/>
+                        </a:lnL>
+                        <a:lnR w="3175" cap="flat" cmpd="sng" algn="ctr">
+                          <a:noFill/>
+                          <a:prstDash val="solid"/>
+                          <a:round/>
+                          <a:headEnd type="none" w="med" len="med"/>
+                          <a:tailEnd type="none" w="med" len="med"/>
+                        </a:lnR>
+                        <a:lnT w="3175" cap="flat" cmpd="sng" algn="ctr">
+                          <a:noFill/>
+                          <a:prstDash val="solid"/>
+                          <a:round/>
+                          <a:headEnd type="none" w="med" len="med"/>
+                          <a:tailEnd type="none" w="med" len="med"/>
+                        </a:lnT>
+                        <a:lnB w="3175" cap="flat" cmpd="sng" algn="ctr">
+                          <a:noFill/>
+                          <a:prstDash val="solid"/>
+                          <a:round/>
+                          <a:headEnd type="none" w="med" len="med"/>
+                          <a:tailEnd type="none" w="med" len="med"/>
+                        </a:lnB>
+                        <a:lnTlToBr w="12700" cmpd="sng">
+                          <a:noFill/>
+                          <a:prstDash val="solid"/>
+                        </a:lnTlToBr>
+                        <a:lnBlToTr w="12700" cmpd="sng">
+                          <a:noFill/>
+                          <a:prstDash val="solid"/>
+                        </a:lnBlToTr>
+                        <a:noFill/>
+                      </a:tcPr>
+                    </a:tc>
+                    <a:tc>
+                      <a:txBody>
+                        <a:bodyPr/>
+                        <a:lstStyle/>
+                        <a:p>
+                          <a:pPr algn="ctr"/>
+                          <a:r>
+                            <a:rPr lang="fr-FR" sz="800" b="0" kern="1200" dirty="0" smtClean="0">
+                              <a:solidFill>
+                                <a:schemeClr val="dk1"/>
+                              </a:solidFill>
+                              <a:latin typeface="Times New Roman" panose="02020603050405020304" pitchFamily="18" charset="0"/>
+                              <a:ea typeface="+mn-ea"/>
+                              <a:cs typeface="Times New Roman" panose="02020603050405020304" pitchFamily="18" charset="0"/>
+                            </a:rPr>
+                            <a:t>7.7%</a:t>
+                          </a:r>
+                          <a:endParaRPr lang="fr-FR" sz="800" b="0" kern="1200" dirty="0">
+                            <a:solidFill>
+                              <a:schemeClr val="dk1"/>
+                            </a:solidFill>
+                            <a:latin typeface="Times New Roman" panose="02020603050405020304" pitchFamily="18" charset="0"/>
+                            <a:ea typeface="+mn-ea"/>
+                            <a:cs typeface="Times New Roman" panose="02020603050405020304" pitchFamily="18" charset="0"/>
+                          </a:endParaRPr>
+                        </a:p>
+                      </a:txBody>
+                      <a:tcPr marL="63305" marR="63305" marT="31652" marB="31652" anchor="ctr">
+                        <a:lnL w="3175" cap="flat" cmpd="sng" algn="ctr">
+                          <a:noFill/>
+                          <a:prstDash val="solid"/>
+                          <a:round/>
+                          <a:headEnd type="none" w="med" len="med"/>
+                          <a:tailEnd type="none" w="med" len="med"/>
+                        </a:lnL>
+                        <a:lnR w="3175" cap="flat" cmpd="sng" algn="ctr">
+                          <a:noFill/>
+                          <a:prstDash val="solid"/>
+                          <a:round/>
+                          <a:headEnd type="none" w="med" len="med"/>
+                          <a:tailEnd type="none" w="med" len="med"/>
+                        </a:lnR>
+                        <a:lnT w="3175" cap="flat" cmpd="sng" algn="ctr">
+                          <a:noFill/>
                           <a:prstDash val="solid"/>
                           <a:round/>
                           <a:headEnd type="none" w="med" len="med"/>
@@ -6931,9 +7765,73 @@
                           <a:tailEnd type="none" w="med" len="med"/>
                         </a:lnR>
                         <a:lnT w="3175" cap="flat" cmpd="sng" algn="ctr">
-                          <a:solidFill>
-                            <a:schemeClr val="tx1"/>
-                          </a:solidFill>
+                          <a:noFill/>
+                          <a:prstDash val="solid"/>
+                          <a:round/>
+                          <a:headEnd type="none" w="med" len="med"/>
+                          <a:tailEnd type="none" w="med" len="med"/>
+                        </a:lnT>
+                        <a:lnB w="3175" cap="flat" cmpd="sng" algn="ctr">
+                          <a:noFill/>
+                          <a:prstDash val="solid"/>
+                          <a:round/>
+                          <a:headEnd type="none" w="med" len="med"/>
+                          <a:tailEnd type="none" w="med" len="med"/>
+                        </a:lnB>
+                        <a:lnTlToBr w="12700" cmpd="sng">
+                          <a:noFill/>
+                          <a:prstDash val="solid"/>
+                        </a:lnTlToBr>
+                        <a:lnBlToTr w="12700" cmpd="sng">
+                          <a:noFill/>
+                          <a:prstDash val="solid"/>
+                        </a:lnBlToTr>
+                        <a:noFill/>
+                      </a:tcPr>
+                    </a:tc>
+                    <a:extLst>
+                      <a:ext uri="{0D108BD9-81ED-4DB2-BD59-A6C34878D82A}">
+                        <a16:rowId xmlns:a16="http://schemas.microsoft.com/office/drawing/2014/main" val="4105435536"/>
+                      </a:ext>
+                    </a:extLst>
+                  </a:tr>
+                  <a:tr h="224308">
+                    <a:tc>
+                      <a:txBody>
+                        <a:bodyPr/>
+                        <a:lstStyle/>
+                        <a:p>
+                          <a:r>
+                            <a:rPr lang="en-US" sz="800" b="1" dirty="0" smtClean="0">
+                              <a:latin typeface="Times New Roman" panose="02020603050405020304" pitchFamily="18" charset="0"/>
+                              <a:cs typeface="Times New Roman" panose="02020603050405020304" pitchFamily="18" charset="0"/>
+                            </a:rPr>
+                            <a:t>Species</a:t>
+                          </a:r>
+                          <a:endParaRPr lang="fr-FR" sz="800" b="1" dirty="0">
+                            <a:solidFill>
+                              <a:schemeClr val="tx1"/>
+                            </a:solidFill>
+                          </a:endParaRPr>
+                        </a:p>
+                      </a:txBody>
+                      <a:tcPr marL="63305" marR="63305" marT="31652" marB="31652" anchor="ctr">
+                        <a:lnL w="3175" cap="flat" cmpd="sng" algn="ctr">
+                          <a:noFill/>
+                          <a:prstDash val="solid"/>
+                          <a:round/>
+                          <a:headEnd type="none" w="med" len="med"/>
+                          <a:tailEnd type="none" w="med" len="med"/>
+                        </a:lnL>
+                        <a:lnR w="3175" cap="flat" cmpd="sng" algn="ctr">
+                          <a:noFill/>
+                          <a:prstDash val="solid"/>
+                          <a:round/>
+                          <a:headEnd type="none" w="med" len="med"/>
+                          <a:tailEnd type="none" w="med" len="med"/>
+                        </a:lnR>
+                        <a:lnT w="3175" cap="flat" cmpd="sng" algn="ctr">
+                          <a:noFill/>
                           <a:prstDash val="solid"/>
                           <a:round/>
                           <a:headEnd type="none" w="med" len="med"/>
@@ -6972,7 +7870,1110 @@
                               <a:ea typeface="+mn-ea"/>
                               <a:cs typeface="Times New Roman" panose="02020603050405020304" pitchFamily="18" charset="0"/>
                             </a:rPr>
-                            <a:t>3.5%</a:t>
+                            <a:t>393</a:t>
+                          </a:r>
+                          <a:endParaRPr lang="fr-FR" sz="800" b="0" kern="1200" dirty="0">
+                            <a:solidFill>
+                              <a:schemeClr val="dk1"/>
+                            </a:solidFill>
+                            <a:latin typeface="Times New Roman" panose="02020603050405020304" pitchFamily="18" charset="0"/>
+                            <a:ea typeface="+mn-ea"/>
+                            <a:cs typeface="Times New Roman" panose="02020603050405020304" pitchFamily="18" charset="0"/>
+                          </a:endParaRPr>
+                        </a:p>
+                      </a:txBody>
+                      <a:tcPr marL="63305" marR="63305" marT="31652" marB="31652" anchor="ctr">
+                        <a:lnL w="3175" cap="flat" cmpd="sng" algn="ctr">
+                          <a:noFill/>
+                          <a:prstDash val="solid"/>
+                          <a:round/>
+                          <a:headEnd type="none" w="med" len="med"/>
+                          <a:tailEnd type="none" w="med" len="med"/>
+                        </a:lnL>
+                        <a:lnR w="3175" cap="flat" cmpd="sng" algn="ctr">
+                          <a:noFill/>
+                          <a:prstDash val="solid"/>
+                          <a:round/>
+                          <a:headEnd type="none" w="med" len="med"/>
+                          <a:tailEnd type="none" w="med" len="med"/>
+                        </a:lnR>
+                        <a:lnT w="3175" cap="flat" cmpd="sng" algn="ctr">
+                          <a:noFill/>
+                          <a:prstDash val="solid"/>
+                          <a:round/>
+                          <a:headEnd type="none" w="med" len="med"/>
+                          <a:tailEnd type="none" w="med" len="med"/>
+                        </a:lnT>
+                        <a:lnB w="3175" cap="flat" cmpd="sng" algn="ctr">
+                          <a:noFill/>
+                          <a:prstDash val="solid"/>
+                          <a:round/>
+                          <a:headEnd type="none" w="med" len="med"/>
+                          <a:tailEnd type="none" w="med" len="med"/>
+                        </a:lnB>
+                        <a:lnTlToBr w="12700" cmpd="sng">
+                          <a:noFill/>
+                          <a:prstDash val="solid"/>
+                        </a:lnTlToBr>
+                        <a:lnBlToTr w="12700" cmpd="sng">
+                          <a:noFill/>
+                          <a:prstDash val="solid"/>
+                        </a:lnBlToTr>
+                        <a:noFill/>
+                      </a:tcPr>
+                    </a:tc>
+                    <a:tc>
+                      <a:txBody>
+                        <a:bodyPr/>
+                        <a:lstStyle/>
+                        <a:p>
+                          <a:pPr algn="ctr"/>
+                          <a:r>
+                            <a:rPr lang="fr-FR" sz="800" b="0" kern="1200" dirty="0" smtClean="0">
+                              <a:solidFill>
+                                <a:schemeClr val="dk1"/>
+                              </a:solidFill>
+                              <a:latin typeface="Times New Roman" panose="02020603050405020304" pitchFamily="18" charset="0"/>
+                              <a:ea typeface="+mn-ea"/>
+                              <a:cs typeface="Times New Roman" panose="02020603050405020304" pitchFamily="18" charset="0"/>
+                            </a:rPr>
+                            <a:t>69.5%</a:t>
+                          </a:r>
+                          <a:endParaRPr lang="fr-FR" sz="800" b="0" kern="1200" dirty="0">
+                            <a:solidFill>
+                              <a:schemeClr val="dk1"/>
+                            </a:solidFill>
+                            <a:latin typeface="Times New Roman" panose="02020603050405020304" pitchFamily="18" charset="0"/>
+                            <a:ea typeface="+mn-ea"/>
+                            <a:cs typeface="Times New Roman" panose="02020603050405020304" pitchFamily="18" charset="0"/>
+                          </a:endParaRPr>
+                        </a:p>
+                      </a:txBody>
+                      <a:tcPr marL="63305" marR="63305" marT="31652" marB="31652" anchor="ctr">
+                        <a:lnL w="3175" cap="flat" cmpd="sng" algn="ctr">
+                          <a:noFill/>
+                          <a:prstDash val="solid"/>
+                          <a:round/>
+                          <a:headEnd type="none" w="med" len="med"/>
+                          <a:tailEnd type="none" w="med" len="med"/>
+                        </a:lnL>
+                        <a:lnR w="3175" cap="flat" cmpd="sng" algn="ctr">
+                          <a:noFill/>
+                          <a:prstDash val="solid"/>
+                          <a:round/>
+                          <a:headEnd type="none" w="med" len="med"/>
+                          <a:tailEnd type="none" w="med" len="med"/>
+                        </a:lnR>
+                        <a:lnT w="3175" cap="flat" cmpd="sng" algn="ctr">
+                          <a:noFill/>
+                          <a:prstDash val="solid"/>
+                          <a:round/>
+                          <a:headEnd type="none" w="med" len="med"/>
+                          <a:tailEnd type="none" w="med" len="med"/>
+                        </a:lnT>
+                        <a:lnB w="3175" cap="flat" cmpd="sng" algn="ctr">
+                          <a:noFill/>
+                          <a:prstDash val="solid"/>
+                          <a:round/>
+                          <a:headEnd type="none" w="med" len="med"/>
+                          <a:tailEnd type="none" w="med" len="med"/>
+                        </a:lnB>
+                        <a:lnTlToBr w="12700" cmpd="sng">
+                          <a:noFill/>
+                          <a:prstDash val="solid"/>
+                        </a:lnTlToBr>
+                        <a:lnBlToTr w="12700" cmpd="sng">
+                          <a:noFill/>
+                          <a:prstDash val="solid"/>
+                        </a:lnBlToTr>
+                        <a:noFill/>
+                      </a:tcPr>
+                    </a:tc>
+                    <a:tc>
+                      <a:txBody>
+                        <a:bodyPr/>
+                        <a:lstStyle/>
+                        <a:p>
+                          <a:pPr algn="ctr"/>
+                          <a:r>
+                            <a:rPr lang="fr-FR" sz="800" b="0" kern="1200" dirty="0" smtClean="0">
+                              <a:solidFill>
+                                <a:schemeClr val="dk1"/>
+                              </a:solidFill>
+                              <a:latin typeface="Times New Roman" panose="02020603050405020304" pitchFamily="18" charset="0"/>
+                              <a:ea typeface="+mn-ea"/>
+                              <a:cs typeface="Times New Roman" panose="02020603050405020304" pitchFamily="18" charset="0"/>
+                            </a:rPr>
+                            <a:t>14.1%</a:t>
+                          </a:r>
+                          <a:endParaRPr lang="fr-FR" sz="800" b="0" kern="1200" dirty="0">
+                            <a:solidFill>
+                              <a:schemeClr val="dk1"/>
+                            </a:solidFill>
+                            <a:latin typeface="Times New Roman" panose="02020603050405020304" pitchFamily="18" charset="0"/>
+                            <a:ea typeface="+mn-ea"/>
+                            <a:cs typeface="Times New Roman" panose="02020603050405020304" pitchFamily="18" charset="0"/>
+                          </a:endParaRPr>
+                        </a:p>
+                      </a:txBody>
+                      <a:tcPr marL="63305" marR="63305" marT="31652" marB="31652" anchor="ctr">
+                        <a:lnL w="3175" cap="flat" cmpd="sng" algn="ctr">
+                          <a:noFill/>
+                          <a:prstDash val="solid"/>
+                          <a:round/>
+                          <a:headEnd type="none" w="med" len="med"/>
+                          <a:tailEnd type="none" w="med" len="med"/>
+                        </a:lnL>
+                        <a:lnR w="3175" cap="flat" cmpd="sng" algn="ctr">
+                          <a:noFill/>
+                          <a:prstDash val="solid"/>
+                          <a:round/>
+                          <a:headEnd type="none" w="med" len="med"/>
+                          <a:tailEnd type="none" w="med" len="med"/>
+                        </a:lnR>
+                        <a:lnT w="3175" cap="flat" cmpd="sng" algn="ctr">
+                          <a:noFill/>
+                          <a:prstDash val="solid"/>
+                          <a:round/>
+                          <a:headEnd type="none" w="med" len="med"/>
+                          <a:tailEnd type="none" w="med" len="med"/>
+                        </a:lnT>
+                        <a:lnB w="3175" cap="flat" cmpd="sng" algn="ctr">
+                          <a:noFill/>
+                          <a:prstDash val="solid"/>
+                          <a:round/>
+                          <a:headEnd type="none" w="med" len="med"/>
+                          <a:tailEnd type="none" w="med" len="med"/>
+                        </a:lnB>
+                        <a:lnTlToBr w="12700" cmpd="sng">
+                          <a:noFill/>
+                          <a:prstDash val="solid"/>
+                        </a:lnTlToBr>
+                        <a:lnBlToTr w="12700" cmpd="sng">
+                          <a:noFill/>
+                          <a:prstDash val="solid"/>
+                        </a:lnBlToTr>
+                        <a:noFill/>
+                      </a:tcPr>
+                    </a:tc>
+                    <a:tc>
+                      <a:txBody>
+                        <a:bodyPr/>
+                        <a:lstStyle/>
+                        <a:p>
+                          <a:pPr algn="ctr"/>
+                          <a:r>
+                            <a:rPr lang="fr-FR" sz="800" b="0" kern="1200" dirty="0" smtClean="0">
+                              <a:solidFill>
+                                <a:schemeClr val="dk1"/>
+                              </a:solidFill>
+                              <a:latin typeface="Times New Roman" panose="02020603050405020304" pitchFamily="18" charset="0"/>
+                              <a:ea typeface="+mn-ea"/>
+                              <a:cs typeface="Times New Roman" panose="02020603050405020304" pitchFamily="18" charset="0"/>
+                            </a:rPr>
+                            <a:t>9.4%</a:t>
+                          </a:r>
+                          <a:endParaRPr lang="fr-FR" sz="800" b="0" kern="1200" dirty="0">
+                            <a:solidFill>
+                              <a:schemeClr val="dk1"/>
+                            </a:solidFill>
+                            <a:latin typeface="Times New Roman" panose="02020603050405020304" pitchFamily="18" charset="0"/>
+                            <a:ea typeface="+mn-ea"/>
+                            <a:cs typeface="Times New Roman" panose="02020603050405020304" pitchFamily="18" charset="0"/>
+                          </a:endParaRPr>
+                        </a:p>
+                      </a:txBody>
+                      <a:tcPr marL="63305" marR="63305" marT="31652" marB="31652" anchor="ctr">
+                        <a:lnL w="3175" cap="flat" cmpd="sng" algn="ctr">
+                          <a:noFill/>
+                          <a:prstDash val="solid"/>
+                          <a:round/>
+                          <a:headEnd type="none" w="med" len="med"/>
+                          <a:tailEnd type="none" w="med" len="med"/>
+                        </a:lnL>
+                        <a:lnR w="3175" cap="flat" cmpd="sng" algn="ctr">
+                          <a:noFill/>
+                          <a:prstDash val="solid"/>
+                          <a:round/>
+                          <a:headEnd type="none" w="med" len="med"/>
+                          <a:tailEnd type="none" w="med" len="med"/>
+                        </a:lnR>
+                        <a:lnT w="3175" cap="flat" cmpd="sng" algn="ctr">
+                          <a:noFill/>
+                          <a:prstDash val="solid"/>
+                          <a:round/>
+                          <a:headEnd type="none" w="med" len="med"/>
+                          <a:tailEnd type="none" w="med" len="med"/>
+                        </a:lnT>
+                        <a:lnB w="3175" cap="flat" cmpd="sng" algn="ctr">
+                          <a:noFill/>
+                          <a:prstDash val="solid"/>
+                          <a:round/>
+                          <a:headEnd type="none" w="med" len="med"/>
+                          <a:tailEnd type="none" w="med" len="med"/>
+                        </a:lnB>
+                        <a:lnTlToBr w="12700" cmpd="sng">
+                          <a:noFill/>
+                          <a:prstDash val="solid"/>
+                        </a:lnTlToBr>
+                        <a:lnBlToTr w="12700" cmpd="sng">
+                          <a:noFill/>
+                          <a:prstDash val="solid"/>
+                        </a:lnBlToTr>
+                        <a:noFill/>
+                      </a:tcPr>
+                    </a:tc>
+                    <a:tc>
+                      <a:txBody>
+                        <a:bodyPr/>
+                        <a:lstStyle/>
+                        <a:p>
+                          <a:pPr algn="ctr"/>
+                          <a:r>
+                            <a:rPr lang="fr-FR" sz="800" b="0" kern="1200" dirty="0" smtClean="0">
+                              <a:solidFill>
+                                <a:schemeClr val="dk1"/>
+                              </a:solidFill>
+                              <a:latin typeface="Times New Roman" panose="02020603050405020304" pitchFamily="18" charset="0"/>
+                              <a:ea typeface="+mn-ea"/>
+                              <a:cs typeface="Times New Roman" panose="02020603050405020304" pitchFamily="18" charset="0"/>
+                            </a:rPr>
+                            <a:t>7%</a:t>
+                          </a:r>
+                          <a:endParaRPr lang="fr-FR" sz="800" b="0" kern="1200" dirty="0">
+                            <a:solidFill>
+                              <a:schemeClr val="dk1"/>
+                            </a:solidFill>
+                            <a:latin typeface="Times New Roman" panose="02020603050405020304" pitchFamily="18" charset="0"/>
+                            <a:ea typeface="+mn-ea"/>
+                            <a:cs typeface="Times New Roman" panose="02020603050405020304" pitchFamily="18" charset="0"/>
+                          </a:endParaRPr>
+                        </a:p>
+                      </a:txBody>
+                      <a:tcPr marL="63305" marR="63305" marT="31652" marB="31652" anchor="ctr">
+                        <a:lnL w="3175" cap="flat" cmpd="sng" algn="ctr">
+                          <a:noFill/>
+                          <a:prstDash val="solid"/>
+                          <a:round/>
+                          <a:headEnd type="none" w="med" len="med"/>
+                          <a:tailEnd type="none" w="med" len="med"/>
+                        </a:lnL>
+                        <a:lnR w="3175" cap="flat" cmpd="sng" algn="ctr">
+                          <a:noFill/>
+                          <a:prstDash val="solid"/>
+                          <a:round/>
+                          <a:headEnd type="none" w="med" len="med"/>
+                          <a:tailEnd type="none" w="med" len="med"/>
+                        </a:lnR>
+                        <a:lnT w="3175" cap="flat" cmpd="sng" algn="ctr">
+                          <a:noFill/>
+                          <a:prstDash val="solid"/>
+                          <a:round/>
+                          <a:headEnd type="none" w="med" len="med"/>
+                          <a:tailEnd type="none" w="med" len="med"/>
+                        </a:lnT>
+                        <a:lnB w="3175" cap="flat" cmpd="sng" algn="ctr">
+                          <a:noFill/>
+                          <a:prstDash val="solid"/>
+                          <a:round/>
+                          <a:headEnd type="none" w="med" len="med"/>
+                          <a:tailEnd type="none" w="med" len="med"/>
+                        </a:lnB>
+                        <a:lnTlToBr w="12700" cmpd="sng">
+                          <a:noFill/>
+                          <a:prstDash val="solid"/>
+                        </a:lnTlToBr>
+                        <a:lnBlToTr w="12700" cmpd="sng">
+                          <a:noFill/>
+                          <a:prstDash val="solid"/>
+                        </a:lnBlToTr>
+                        <a:noFill/>
+                      </a:tcPr>
+                    </a:tc>
+                    <a:extLst>
+                      <a:ext uri="{0D108BD9-81ED-4DB2-BD59-A6C34878D82A}">
+                        <a16:rowId xmlns:a16="http://schemas.microsoft.com/office/drawing/2014/main" val="3060182616"/>
+                      </a:ext>
+                    </a:extLst>
+                  </a:tr>
+                </a:tbl>
+              </a:graphicData>
+            </a:graphic>
+          </p:graphicFrame>
+        </mc:Choice>
+        <mc:Fallback>
+          <p:graphicFrame>
+            <p:nvGraphicFramePr>
+              <p:cNvPr id="2" name="Tableau 1"/>
+              <p:cNvGraphicFramePr>
+                <a:graphicFrameLocks noGrp="1"/>
+              </p:cNvGraphicFramePr>
+              <p:nvPr>
+                <p:extLst>
+                  <p:ext uri="{D42A27DB-BD31-4B8C-83A1-F6EECF244321}">
+                    <p14:modId xmlns:p14="http://schemas.microsoft.com/office/powerpoint/2010/main" val="3529283879"/>
+                  </p:ext>
+                </p:extLst>
+              </p:nvPr>
+            </p:nvGraphicFramePr>
+            <p:xfrm>
+              <a:off x="2313299" y="3726210"/>
+              <a:ext cx="4650980" cy="976449"/>
+            </p:xfrm>
+            <a:graphic>
+              <a:graphicData uri="http://schemas.openxmlformats.org/drawingml/2006/table">
+                <a:tbl>
+                  <a:tblPr firstRow="1" bandRow="1">
+                    <a:tableStyleId>{5C22544A-7EE6-4342-B048-85BDC9FD1C3A}</a:tableStyleId>
+                  </a:tblPr>
+                  <a:tblGrid>
+                    <a:gridCol w="1349860">
+                      <a:extLst>
+                        <a:ext uri="{9D8B030D-6E8A-4147-A177-3AD203B41FA5}">
+                          <a16:colId xmlns:a16="http://schemas.microsoft.com/office/drawing/2014/main" val="1067048240"/>
+                        </a:ext>
+                      </a:extLst>
+                    </a:gridCol>
+                    <a:gridCol w="660224">
+                      <a:extLst>
+                        <a:ext uri="{9D8B030D-6E8A-4147-A177-3AD203B41FA5}">
+                          <a16:colId xmlns:a16="http://schemas.microsoft.com/office/drawing/2014/main" val="1671461065"/>
+                        </a:ext>
+                      </a:extLst>
+                    </a:gridCol>
+                    <a:gridCol w="660224">
+                      <a:extLst>
+                        <a:ext uri="{9D8B030D-6E8A-4147-A177-3AD203B41FA5}">
+                          <a16:colId xmlns:a16="http://schemas.microsoft.com/office/drawing/2014/main" val="3084419488"/>
+                        </a:ext>
+                      </a:extLst>
+                    </a:gridCol>
+                    <a:gridCol w="660224">
+                      <a:extLst>
+                        <a:ext uri="{9D8B030D-6E8A-4147-A177-3AD203B41FA5}">
+                          <a16:colId xmlns:a16="http://schemas.microsoft.com/office/drawing/2014/main" val="3836093460"/>
+                        </a:ext>
+                      </a:extLst>
+                    </a:gridCol>
+                    <a:gridCol w="660224">
+                      <a:extLst>
+                        <a:ext uri="{9D8B030D-6E8A-4147-A177-3AD203B41FA5}">
+                          <a16:colId xmlns:a16="http://schemas.microsoft.com/office/drawing/2014/main" val="4109928961"/>
+                        </a:ext>
+                      </a:extLst>
+                    </a:gridCol>
+                    <a:gridCol w="660224">
+                      <a:extLst>
+                        <a:ext uri="{9D8B030D-6E8A-4147-A177-3AD203B41FA5}">
+                          <a16:colId xmlns:a16="http://schemas.microsoft.com/office/drawing/2014/main" val="2333253021"/>
+                        </a:ext>
+                      </a:extLst>
+                    </a:gridCol>
+                  </a:tblGrid>
+                  <a:tr h="303525">
+                    <a:tc>
+                      <a:txBody>
+                        <a:bodyPr/>
+                        <a:lstStyle/>
+                        <a:p>
+                          <a:r>
+                            <a:rPr lang="fr-FR" sz="800" b="1" i="0" kern="1200" dirty="0" smtClean="0">
+                              <a:solidFill>
+                                <a:schemeClr val="tx1"/>
+                              </a:solidFill>
+                              <a:latin typeface="Cambria Math" panose="02040503050406030204" pitchFamily="18" charset="0"/>
+                              <a:ea typeface="+mn-ea"/>
+                              <a:cs typeface="+mn-cs"/>
+                            </a:rPr>
+                            <a:t>MOTUs assigned to…</a:t>
+                          </a:r>
+                          <a:endParaRPr lang="fr-FR" sz="800" b="1" i="0" kern="1200" dirty="0">
+                            <a:solidFill>
+                              <a:schemeClr val="tx1"/>
+                            </a:solidFill>
+                            <a:latin typeface="Cambria Math" panose="02040503050406030204" pitchFamily="18" charset="0"/>
+                            <a:ea typeface="+mn-ea"/>
+                            <a:cs typeface="+mn-cs"/>
+                          </a:endParaRPr>
+                        </a:p>
+                      </a:txBody>
+                      <a:tcPr marL="63305" marR="63305" marT="31652" marB="31652" anchor="ctr">
+                        <a:lnL w="12700" cap="flat" cmpd="sng" algn="ctr">
+                          <a:noFill/>
+                          <a:prstDash val="solid"/>
+                          <a:round/>
+                          <a:headEnd type="none" w="med" len="med"/>
+                          <a:tailEnd type="none" w="med" len="med"/>
+                        </a:lnL>
+                        <a:lnR w="3175" cap="flat" cmpd="sng" algn="ctr">
+                          <a:noFill/>
+                          <a:prstDash val="solid"/>
+                          <a:round/>
+                          <a:headEnd type="none" w="med" len="med"/>
+                          <a:tailEnd type="none" w="med" len="med"/>
+                        </a:lnR>
+                        <a:lnT w="12700" cap="flat" cmpd="sng" algn="ctr">
+                          <a:noFill/>
+                          <a:prstDash val="solid"/>
+                          <a:round/>
+                          <a:headEnd type="none" w="med" len="med"/>
+                          <a:tailEnd type="none" w="med" len="med"/>
+                        </a:lnT>
+                        <a:lnB w="3175" cap="flat" cmpd="sng" algn="ctr">
+                          <a:solidFill>
+                            <a:schemeClr val="tx1"/>
+                          </a:solidFill>
+                          <a:prstDash val="solid"/>
+                          <a:round/>
+                          <a:headEnd type="none" w="med" len="med"/>
+                          <a:tailEnd type="none" w="med" len="med"/>
+                        </a:lnB>
+                        <a:lnTlToBr w="12700" cmpd="sng">
+                          <a:noFill/>
+                          <a:prstDash val="solid"/>
+                        </a:lnTlToBr>
+                        <a:lnBlToTr w="12700" cmpd="sng">
+                          <a:noFill/>
+                          <a:prstDash val="solid"/>
+                        </a:lnBlToTr>
+                        <a:noFill/>
+                      </a:tcPr>
+                    </a:tc>
+                    <a:tc>
+                      <a:txBody>
+                        <a:bodyPr/>
+                        <a:lstStyle/>
+                        <a:p>
+                          <a:endParaRPr lang="fr-FR"/>
+                        </a:p>
+                      </a:txBody>
+                      <a:tcPr marL="63305" marR="63305" marT="31652" marB="31652" anchor="ctr">
+                        <a:lnL w="3175" cap="flat" cmpd="sng" algn="ctr">
+                          <a:noFill/>
+                          <a:prstDash val="solid"/>
+                          <a:round/>
+                          <a:headEnd type="none" w="med" len="med"/>
+                          <a:tailEnd type="none" w="med" len="med"/>
+                        </a:lnL>
+                        <a:lnR w="3175" cap="flat" cmpd="sng" algn="ctr">
+                          <a:noFill/>
+                          <a:prstDash val="solid"/>
+                          <a:round/>
+                          <a:headEnd type="none" w="med" len="med"/>
+                          <a:tailEnd type="none" w="med" len="med"/>
+                        </a:lnR>
+                        <a:lnT w="3175" cap="flat" cmpd="sng" algn="ctr">
+                          <a:noFill/>
+                          <a:prstDash val="solid"/>
+                          <a:round/>
+                          <a:headEnd type="none" w="med" len="med"/>
+                          <a:tailEnd type="none" w="med" len="med"/>
+                        </a:lnT>
+                        <a:lnB w="3175" cap="flat" cmpd="sng" algn="ctr">
+                          <a:solidFill>
+                            <a:schemeClr val="tx1"/>
+                          </a:solidFill>
+                          <a:prstDash val="solid"/>
+                          <a:round/>
+                          <a:headEnd type="none" w="med" len="med"/>
+                          <a:tailEnd type="none" w="med" len="med"/>
+                        </a:lnB>
+                        <a:lnTlToBr w="12700" cmpd="sng">
+                          <a:noFill/>
+                          <a:prstDash val="solid"/>
+                        </a:lnTlToBr>
+                        <a:lnBlToTr w="12700" cmpd="sng">
+                          <a:noFill/>
+                          <a:prstDash val="solid"/>
+                        </a:lnBlToTr>
+                        <a:blipFill>
+                          <a:blip r:embed="rId21"/>
+                          <a:stretch>
+                            <a:fillRect l="-205556" r="-401852" b="-226000"/>
+                          </a:stretch>
+                        </a:blipFill>
+                      </a:tcPr>
+                    </a:tc>
+                    <a:tc>
+                      <a:txBody>
+                        <a:bodyPr/>
+                        <a:lstStyle/>
+                        <a:p>
+                          <a:endParaRPr lang="fr-FR"/>
+                        </a:p>
+                      </a:txBody>
+                      <a:tcPr marL="63305" marR="63305" marT="31652" marB="31652" anchor="ctr">
+                        <a:lnL w="3175" cap="flat" cmpd="sng" algn="ctr">
+                          <a:noFill/>
+                          <a:prstDash val="solid"/>
+                          <a:round/>
+                          <a:headEnd type="none" w="med" len="med"/>
+                          <a:tailEnd type="none" w="med" len="med"/>
+                        </a:lnL>
+                        <a:lnR w="3175" cap="flat" cmpd="sng" algn="ctr">
+                          <a:noFill/>
+                          <a:prstDash val="solid"/>
+                          <a:round/>
+                          <a:headEnd type="none" w="med" len="med"/>
+                          <a:tailEnd type="none" w="med" len="med"/>
+                        </a:lnR>
+                        <a:lnT w="3175" cap="flat" cmpd="sng" algn="ctr">
+                          <a:noFill/>
+                          <a:prstDash val="solid"/>
+                          <a:round/>
+                          <a:headEnd type="none" w="med" len="med"/>
+                          <a:tailEnd type="none" w="med" len="med"/>
+                        </a:lnT>
+                        <a:lnB w="3175" cap="flat" cmpd="sng" algn="ctr">
+                          <a:solidFill>
+                            <a:schemeClr val="tx1"/>
+                          </a:solidFill>
+                          <a:prstDash val="solid"/>
+                          <a:round/>
+                          <a:headEnd type="none" w="med" len="med"/>
+                          <a:tailEnd type="none" w="med" len="med"/>
+                        </a:lnB>
+                        <a:lnTlToBr w="12700" cmpd="sng">
+                          <a:noFill/>
+                          <a:prstDash val="solid"/>
+                        </a:lnTlToBr>
+                        <a:lnBlToTr w="12700" cmpd="sng">
+                          <a:noFill/>
+                          <a:prstDash val="solid"/>
+                        </a:lnBlToTr>
+                        <a:blipFill>
+                          <a:blip r:embed="rId21"/>
+                          <a:stretch>
+                            <a:fillRect l="-302752" r="-298165" b="-226000"/>
+                          </a:stretch>
+                        </a:blipFill>
+                      </a:tcPr>
+                    </a:tc>
+                    <a:tc>
+                      <a:txBody>
+                        <a:bodyPr/>
+                        <a:lstStyle/>
+                        <a:p>
+                          <a:endParaRPr lang="fr-FR"/>
+                        </a:p>
+                      </a:txBody>
+                      <a:tcPr marL="63305" marR="63305" marT="31652" marB="31652" anchor="ctr">
+                        <a:lnL w="3175" cap="flat" cmpd="sng" algn="ctr">
+                          <a:noFill/>
+                          <a:prstDash val="solid"/>
+                          <a:round/>
+                          <a:headEnd type="none" w="med" len="med"/>
+                          <a:tailEnd type="none" w="med" len="med"/>
+                        </a:lnL>
+                        <a:lnR w="3175" cap="flat" cmpd="sng" algn="ctr">
+                          <a:noFill/>
+                          <a:prstDash val="solid"/>
+                          <a:round/>
+                          <a:headEnd type="none" w="med" len="med"/>
+                          <a:tailEnd type="none" w="med" len="med"/>
+                        </a:lnR>
+                        <a:lnT w="3175" cap="flat" cmpd="sng" algn="ctr">
+                          <a:noFill/>
+                          <a:prstDash val="solid"/>
+                          <a:round/>
+                          <a:headEnd type="none" w="med" len="med"/>
+                          <a:tailEnd type="none" w="med" len="med"/>
+                        </a:lnT>
+                        <a:lnB w="3175" cap="flat" cmpd="sng" algn="ctr">
+                          <a:solidFill>
+                            <a:schemeClr val="tx1"/>
+                          </a:solidFill>
+                          <a:prstDash val="solid"/>
+                          <a:round/>
+                          <a:headEnd type="none" w="med" len="med"/>
+                          <a:tailEnd type="none" w="med" len="med"/>
+                        </a:lnB>
+                        <a:lnTlToBr w="12700" cmpd="sng">
+                          <a:noFill/>
+                          <a:prstDash val="solid"/>
+                        </a:lnTlToBr>
+                        <a:lnBlToTr w="12700" cmpd="sng">
+                          <a:noFill/>
+                          <a:prstDash val="solid"/>
+                        </a:lnBlToTr>
+                        <a:blipFill>
+                          <a:blip r:embed="rId21"/>
+                          <a:stretch>
+                            <a:fillRect l="-406481" r="-200926" b="-226000"/>
+                          </a:stretch>
+                        </a:blipFill>
+                      </a:tcPr>
+                    </a:tc>
+                    <a:tc>
+                      <a:txBody>
+                        <a:bodyPr/>
+                        <a:lstStyle/>
+                        <a:p>
+                          <a:endParaRPr lang="fr-FR"/>
+                        </a:p>
+                      </a:txBody>
+                      <a:tcPr marL="63305" marR="63305" marT="31652" marB="31652" anchor="ctr">
+                        <a:lnL w="3175" cap="flat" cmpd="sng" algn="ctr">
+                          <a:noFill/>
+                          <a:prstDash val="solid"/>
+                          <a:round/>
+                          <a:headEnd type="none" w="med" len="med"/>
+                          <a:tailEnd type="none" w="med" len="med"/>
+                        </a:lnL>
+                        <a:lnR w="3175" cap="flat" cmpd="sng" algn="ctr">
+                          <a:noFill/>
+                          <a:prstDash val="solid"/>
+                          <a:round/>
+                          <a:headEnd type="none" w="med" len="med"/>
+                          <a:tailEnd type="none" w="med" len="med"/>
+                        </a:lnR>
+                        <a:lnT w="3175" cap="flat" cmpd="sng" algn="ctr">
+                          <a:noFill/>
+                          <a:prstDash val="solid"/>
+                          <a:round/>
+                          <a:headEnd type="none" w="med" len="med"/>
+                          <a:tailEnd type="none" w="med" len="med"/>
+                        </a:lnT>
+                        <a:lnB w="3175" cap="flat" cmpd="sng" algn="ctr">
+                          <a:solidFill>
+                            <a:schemeClr val="tx1"/>
+                          </a:solidFill>
+                          <a:prstDash val="solid"/>
+                          <a:round/>
+                          <a:headEnd type="none" w="med" len="med"/>
+                          <a:tailEnd type="none" w="med" len="med"/>
+                        </a:lnB>
+                        <a:lnTlToBr w="12700" cmpd="sng">
+                          <a:noFill/>
+                          <a:prstDash val="solid"/>
+                        </a:lnTlToBr>
+                        <a:lnBlToTr w="12700" cmpd="sng">
+                          <a:noFill/>
+                          <a:prstDash val="solid"/>
+                        </a:lnBlToTr>
+                        <a:blipFill>
+                          <a:blip r:embed="rId21"/>
+                          <a:stretch>
+                            <a:fillRect l="-501835" r="-99083" b="-226000"/>
+                          </a:stretch>
+                        </a:blipFill>
+                      </a:tcPr>
+                    </a:tc>
+                    <a:tc>
+                      <a:txBody>
+                        <a:bodyPr/>
+                        <a:lstStyle/>
+                        <a:p>
+                          <a:endParaRPr lang="fr-FR"/>
+                        </a:p>
+                      </a:txBody>
+                      <a:tcPr marL="63305" marR="63305" marT="31652" marB="31652" anchor="ctr">
+                        <a:lnL w="3175" cap="flat" cmpd="sng" algn="ctr">
+                          <a:noFill/>
+                          <a:prstDash val="solid"/>
+                          <a:round/>
+                          <a:headEnd type="none" w="med" len="med"/>
+                          <a:tailEnd type="none" w="med" len="med"/>
+                        </a:lnL>
+                        <a:lnR w="3175" cap="flat" cmpd="sng" algn="ctr">
+                          <a:noFill/>
+                          <a:prstDash val="solid"/>
+                          <a:round/>
+                          <a:headEnd type="none" w="med" len="med"/>
+                          <a:tailEnd type="none" w="med" len="med"/>
+                        </a:lnR>
+                        <a:lnT w="3175" cap="flat" cmpd="sng" algn="ctr">
+                          <a:noFill/>
+                          <a:prstDash val="solid"/>
+                          <a:round/>
+                          <a:headEnd type="none" w="med" len="med"/>
+                          <a:tailEnd type="none" w="med" len="med"/>
+                        </a:lnT>
+                        <a:lnB w="3175" cap="flat" cmpd="sng" algn="ctr">
+                          <a:solidFill>
+                            <a:schemeClr val="tx1"/>
+                          </a:solidFill>
+                          <a:prstDash val="solid"/>
+                          <a:round/>
+                          <a:headEnd type="none" w="med" len="med"/>
+                          <a:tailEnd type="none" w="med" len="med"/>
+                        </a:lnB>
+                        <a:lnTlToBr w="12700" cmpd="sng">
+                          <a:noFill/>
+                          <a:prstDash val="solid"/>
+                        </a:lnTlToBr>
+                        <a:lnBlToTr w="12700" cmpd="sng">
+                          <a:noFill/>
+                          <a:prstDash val="solid"/>
+                        </a:lnBlToTr>
+                        <a:blipFill>
+                          <a:blip r:embed="rId21"/>
+                          <a:stretch>
+                            <a:fillRect l="-607407" b="-226000"/>
+                          </a:stretch>
+                        </a:blipFill>
+                      </a:tcPr>
+                    </a:tc>
+                    <a:extLst>
+                      <a:ext uri="{0D108BD9-81ED-4DB2-BD59-A6C34878D82A}">
+                        <a16:rowId xmlns:a16="http://schemas.microsoft.com/office/drawing/2014/main" val="3254895143"/>
+                      </a:ext>
+                    </a:extLst>
+                  </a:tr>
+                  <a:tr h="224308">
+                    <a:tc>
+                      <a:txBody>
+                        <a:bodyPr/>
+                        <a:lstStyle/>
+                        <a:p>
+                          <a:r>
+                            <a:rPr lang="en-US" sz="800" b="1" dirty="0" smtClean="0">
+                              <a:latin typeface="Times New Roman" panose="02020603050405020304" pitchFamily="18" charset="0"/>
+                              <a:cs typeface="Times New Roman" panose="02020603050405020304" pitchFamily="18" charset="0"/>
+                            </a:rPr>
+                            <a:t>Cryptobenthic families</a:t>
+                          </a:r>
+                          <a:endParaRPr lang="fr-FR" sz="800" b="1" dirty="0">
+                            <a:solidFill>
+                              <a:schemeClr val="tx1"/>
+                            </a:solidFill>
+                          </a:endParaRPr>
+                        </a:p>
+                      </a:txBody>
+                      <a:tcPr marL="63305" marR="63305" marT="31652" marB="31652" anchor="ctr">
+                        <a:lnL w="3175" cap="flat" cmpd="sng" algn="ctr">
+                          <a:noFill/>
+                          <a:prstDash val="solid"/>
+                          <a:round/>
+                          <a:headEnd type="none" w="med" len="med"/>
+                          <a:tailEnd type="none" w="med" len="med"/>
+                        </a:lnL>
+                        <a:lnR w="3175" cap="flat" cmpd="sng" algn="ctr">
+                          <a:noFill/>
+                          <a:prstDash val="solid"/>
+                          <a:round/>
+                          <a:headEnd type="none" w="med" len="med"/>
+                          <a:tailEnd type="none" w="med" len="med"/>
+                        </a:lnR>
+                        <a:lnT w="3175" cap="flat" cmpd="sng" algn="ctr">
+                          <a:solidFill>
+                            <a:schemeClr val="tx1"/>
+                          </a:solidFill>
+                          <a:prstDash val="solid"/>
+                          <a:round/>
+                          <a:headEnd type="none" w="med" len="med"/>
+                          <a:tailEnd type="none" w="med" len="med"/>
+                        </a:lnT>
+                        <a:lnB w="3175" cap="flat" cmpd="sng" algn="ctr">
+                          <a:noFill/>
+                          <a:prstDash val="solid"/>
+                          <a:round/>
+                          <a:headEnd type="none" w="med" len="med"/>
+                          <a:tailEnd type="none" w="med" len="med"/>
+                        </a:lnB>
+                        <a:lnTlToBr w="12700" cmpd="sng">
+                          <a:noFill/>
+                          <a:prstDash val="solid"/>
+                        </a:lnTlToBr>
+                        <a:lnBlToTr w="12700" cmpd="sng">
+                          <a:noFill/>
+                          <a:prstDash val="solid"/>
+                        </a:lnBlToTr>
+                        <a:noFill/>
+                      </a:tcPr>
+                    </a:tc>
+                    <a:tc>
+                      <a:txBody>
+                        <a:bodyPr/>
+                        <a:lstStyle/>
+                        <a:p>
+                          <a:pPr algn="ctr"/>
+                          <a:r>
+                            <a:rPr lang="fr-FR" sz="800" b="0" kern="1200" dirty="0" smtClean="0">
+                              <a:solidFill>
+                                <a:schemeClr val="dk1"/>
+                              </a:solidFill>
+                              <a:latin typeface="Times New Roman" panose="02020603050405020304" pitchFamily="18" charset="0"/>
+                              <a:ea typeface="+mn-ea"/>
+                              <a:cs typeface="Times New Roman" panose="02020603050405020304" pitchFamily="18" charset="0"/>
+                            </a:rPr>
+                            <a:t>275</a:t>
+                          </a:r>
+                          <a:endParaRPr lang="fr-FR" sz="800" b="0" kern="1200" dirty="0">
+                            <a:solidFill>
+                              <a:schemeClr val="dk1"/>
+                            </a:solidFill>
+                            <a:latin typeface="Times New Roman" panose="02020603050405020304" pitchFamily="18" charset="0"/>
+                            <a:ea typeface="+mn-ea"/>
+                            <a:cs typeface="Times New Roman" panose="02020603050405020304" pitchFamily="18" charset="0"/>
+                          </a:endParaRPr>
+                        </a:p>
+                      </a:txBody>
+                      <a:tcPr marL="63305" marR="63305" marT="31652" marB="31652" anchor="ctr">
+                        <a:lnL w="3175" cap="flat" cmpd="sng" algn="ctr">
+                          <a:noFill/>
+                          <a:prstDash val="solid"/>
+                          <a:round/>
+                          <a:headEnd type="none" w="med" len="med"/>
+                          <a:tailEnd type="none" w="med" len="med"/>
+                        </a:lnL>
+                        <a:lnR w="3175" cap="flat" cmpd="sng" algn="ctr">
+                          <a:noFill/>
+                          <a:prstDash val="solid"/>
+                          <a:round/>
+                          <a:headEnd type="none" w="med" len="med"/>
+                          <a:tailEnd type="none" w="med" len="med"/>
+                        </a:lnR>
+                        <a:lnT w="3175" cap="flat" cmpd="sng" algn="ctr">
+                          <a:solidFill>
+                            <a:schemeClr val="tx1"/>
+                          </a:solidFill>
+                          <a:prstDash val="solid"/>
+                          <a:round/>
+                          <a:headEnd type="none" w="med" len="med"/>
+                          <a:tailEnd type="none" w="med" len="med"/>
+                        </a:lnT>
+                        <a:lnB w="3175" cap="flat" cmpd="sng" algn="ctr">
+                          <a:noFill/>
+                          <a:prstDash val="solid"/>
+                          <a:round/>
+                          <a:headEnd type="none" w="med" len="med"/>
+                          <a:tailEnd type="none" w="med" len="med"/>
+                        </a:lnB>
+                        <a:lnTlToBr w="12700" cmpd="sng">
+                          <a:noFill/>
+                          <a:prstDash val="solid"/>
+                        </a:lnTlToBr>
+                        <a:lnBlToTr w="12700" cmpd="sng">
+                          <a:noFill/>
+                          <a:prstDash val="solid"/>
+                        </a:lnBlToTr>
+                        <a:noFill/>
+                      </a:tcPr>
+                    </a:tc>
+                    <a:tc>
+                      <a:txBody>
+                        <a:bodyPr/>
+                        <a:lstStyle/>
+                        <a:p>
+                          <a:pPr algn="ctr"/>
+                          <a:r>
+                            <a:rPr lang="fr-FR" sz="800" b="0" kern="1200" dirty="0" smtClean="0">
+                              <a:solidFill>
+                                <a:schemeClr val="dk1"/>
+                              </a:solidFill>
+                              <a:latin typeface="Times New Roman" panose="02020603050405020304" pitchFamily="18" charset="0"/>
+                              <a:ea typeface="+mn-ea"/>
+                              <a:cs typeface="Times New Roman" panose="02020603050405020304" pitchFamily="18" charset="0"/>
+                            </a:rPr>
+                            <a:t>77%</a:t>
+                          </a:r>
+                          <a:endParaRPr lang="fr-FR" sz="800" b="0" kern="1200" dirty="0">
+                            <a:solidFill>
+                              <a:schemeClr val="dk1"/>
+                            </a:solidFill>
+                            <a:latin typeface="Times New Roman" panose="02020603050405020304" pitchFamily="18" charset="0"/>
+                            <a:ea typeface="+mn-ea"/>
+                            <a:cs typeface="Times New Roman" panose="02020603050405020304" pitchFamily="18" charset="0"/>
+                          </a:endParaRPr>
+                        </a:p>
+                      </a:txBody>
+                      <a:tcPr marL="63305" marR="63305" marT="31652" marB="31652" anchor="ctr">
+                        <a:lnL w="3175" cap="flat" cmpd="sng" algn="ctr">
+                          <a:noFill/>
+                          <a:prstDash val="solid"/>
+                          <a:round/>
+                          <a:headEnd type="none" w="med" len="med"/>
+                          <a:tailEnd type="none" w="med" len="med"/>
+                        </a:lnL>
+                        <a:lnR w="3175" cap="flat" cmpd="sng" algn="ctr">
+                          <a:noFill/>
+                          <a:prstDash val="solid"/>
+                          <a:round/>
+                          <a:headEnd type="none" w="med" len="med"/>
+                          <a:tailEnd type="none" w="med" len="med"/>
+                        </a:lnR>
+                        <a:lnT w="3175" cap="flat" cmpd="sng" algn="ctr">
+                          <a:solidFill>
+                            <a:schemeClr val="tx1"/>
+                          </a:solidFill>
+                          <a:prstDash val="solid"/>
+                          <a:round/>
+                          <a:headEnd type="none" w="med" len="med"/>
+                          <a:tailEnd type="none" w="med" len="med"/>
+                        </a:lnT>
+                        <a:lnB w="3175" cap="flat" cmpd="sng" algn="ctr">
+                          <a:noFill/>
+                          <a:prstDash val="solid"/>
+                          <a:round/>
+                          <a:headEnd type="none" w="med" len="med"/>
+                          <a:tailEnd type="none" w="med" len="med"/>
+                        </a:lnB>
+                        <a:lnTlToBr w="12700" cmpd="sng">
+                          <a:noFill/>
+                          <a:prstDash val="solid"/>
+                        </a:lnTlToBr>
+                        <a:lnBlToTr w="12700" cmpd="sng">
+                          <a:noFill/>
+                          <a:prstDash val="solid"/>
+                        </a:lnBlToTr>
+                        <a:noFill/>
+                      </a:tcPr>
+                    </a:tc>
+                    <a:tc>
+                      <a:txBody>
+                        <a:bodyPr/>
+                        <a:lstStyle/>
+                        <a:p>
+                          <a:pPr algn="ctr"/>
+                          <a:r>
+                            <a:rPr lang="fr-FR" sz="800" b="0" kern="1200" dirty="0" smtClean="0">
+                              <a:solidFill>
+                                <a:schemeClr val="dk1"/>
+                              </a:solidFill>
+                              <a:latin typeface="Times New Roman" panose="02020603050405020304" pitchFamily="18" charset="0"/>
+                              <a:ea typeface="+mn-ea"/>
+                              <a:cs typeface="Times New Roman" panose="02020603050405020304" pitchFamily="18" charset="0"/>
+                            </a:rPr>
+                            <a:t>14.7%</a:t>
+                          </a:r>
+                          <a:endParaRPr lang="fr-FR" sz="800" b="0" kern="1200" dirty="0">
+                            <a:solidFill>
+                              <a:schemeClr val="dk1"/>
+                            </a:solidFill>
+                            <a:latin typeface="Times New Roman" panose="02020603050405020304" pitchFamily="18" charset="0"/>
+                            <a:ea typeface="+mn-ea"/>
+                            <a:cs typeface="Times New Roman" panose="02020603050405020304" pitchFamily="18" charset="0"/>
+                          </a:endParaRPr>
+                        </a:p>
+                      </a:txBody>
+                      <a:tcPr marL="63305" marR="63305" marT="31652" marB="31652" anchor="ctr">
+                        <a:lnL w="3175" cap="flat" cmpd="sng" algn="ctr">
+                          <a:noFill/>
+                          <a:prstDash val="solid"/>
+                          <a:round/>
+                          <a:headEnd type="none" w="med" len="med"/>
+                          <a:tailEnd type="none" w="med" len="med"/>
+                        </a:lnL>
+                        <a:lnR w="3175" cap="flat" cmpd="sng" algn="ctr">
+                          <a:noFill/>
+                          <a:prstDash val="solid"/>
+                          <a:round/>
+                          <a:headEnd type="none" w="med" len="med"/>
+                          <a:tailEnd type="none" w="med" len="med"/>
+                        </a:lnR>
+                        <a:lnT w="3175" cap="flat" cmpd="sng" algn="ctr">
+                          <a:solidFill>
+                            <a:schemeClr val="tx1"/>
+                          </a:solidFill>
+                          <a:prstDash val="solid"/>
+                          <a:round/>
+                          <a:headEnd type="none" w="med" len="med"/>
+                          <a:tailEnd type="none" w="med" len="med"/>
+                        </a:lnT>
+                        <a:lnB w="3175" cap="flat" cmpd="sng" algn="ctr">
+                          <a:noFill/>
+                          <a:prstDash val="solid"/>
+                          <a:round/>
+                          <a:headEnd type="none" w="med" len="med"/>
+                          <a:tailEnd type="none" w="med" len="med"/>
+                        </a:lnB>
+                        <a:lnTlToBr w="12700" cmpd="sng">
+                          <a:noFill/>
+                          <a:prstDash val="solid"/>
+                        </a:lnTlToBr>
+                        <a:lnBlToTr w="12700" cmpd="sng">
+                          <a:noFill/>
+                          <a:prstDash val="solid"/>
+                        </a:lnBlToTr>
+                        <a:noFill/>
+                      </a:tcPr>
+                    </a:tc>
+                    <a:tc>
+                      <a:txBody>
+                        <a:bodyPr/>
+                        <a:lstStyle/>
+                        <a:p>
+                          <a:pPr algn="ctr"/>
+                          <a:r>
+                            <a:rPr lang="fr-FR" sz="800" b="0" kern="1200" dirty="0" smtClean="0">
+                              <a:solidFill>
+                                <a:schemeClr val="dk1"/>
+                              </a:solidFill>
+                              <a:latin typeface="Times New Roman" panose="02020603050405020304" pitchFamily="18" charset="0"/>
+                              <a:ea typeface="+mn-ea"/>
+                              <a:cs typeface="Times New Roman" panose="02020603050405020304" pitchFamily="18" charset="0"/>
+                            </a:rPr>
+                            <a:t>5.5%</a:t>
+                          </a:r>
+                          <a:endParaRPr lang="fr-FR" sz="800" b="0" kern="1200" dirty="0">
+                            <a:solidFill>
+                              <a:schemeClr val="dk1"/>
+                            </a:solidFill>
+                            <a:latin typeface="Times New Roman" panose="02020603050405020304" pitchFamily="18" charset="0"/>
+                            <a:ea typeface="+mn-ea"/>
+                            <a:cs typeface="Times New Roman" panose="02020603050405020304" pitchFamily="18" charset="0"/>
+                          </a:endParaRPr>
+                        </a:p>
+                      </a:txBody>
+                      <a:tcPr marL="63305" marR="63305" marT="31652" marB="31652" anchor="ctr">
+                        <a:lnL w="3175" cap="flat" cmpd="sng" algn="ctr">
+                          <a:noFill/>
+                          <a:prstDash val="solid"/>
+                          <a:round/>
+                          <a:headEnd type="none" w="med" len="med"/>
+                          <a:tailEnd type="none" w="med" len="med"/>
+                        </a:lnL>
+                        <a:lnR w="3175" cap="flat" cmpd="sng" algn="ctr">
+                          <a:noFill/>
+                          <a:prstDash val="solid"/>
+                          <a:round/>
+                          <a:headEnd type="none" w="med" len="med"/>
+                          <a:tailEnd type="none" w="med" len="med"/>
+                        </a:lnR>
+                        <a:lnT w="3175" cap="flat" cmpd="sng" algn="ctr">
+                          <a:solidFill>
+                            <a:schemeClr val="tx1"/>
+                          </a:solidFill>
+                          <a:prstDash val="solid"/>
+                          <a:round/>
+                          <a:headEnd type="none" w="med" len="med"/>
+                          <a:tailEnd type="none" w="med" len="med"/>
+                        </a:lnT>
+                        <a:lnB w="3175" cap="flat" cmpd="sng" algn="ctr">
+                          <a:noFill/>
+                          <a:prstDash val="solid"/>
+                          <a:round/>
+                          <a:headEnd type="none" w="med" len="med"/>
+                          <a:tailEnd type="none" w="med" len="med"/>
+                        </a:lnB>
+                        <a:lnTlToBr w="12700" cmpd="sng">
+                          <a:noFill/>
+                          <a:prstDash val="solid"/>
+                        </a:lnTlToBr>
+                        <a:lnBlToTr w="12700" cmpd="sng">
+                          <a:noFill/>
+                          <a:prstDash val="solid"/>
+                        </a:lnBlToTr>
+                        <a:noFill/>
+                      </a:tcPr>
+                    </a:tc>
+                    <a:tc>
+                      <a:txBody>
+                        <a:bodyPr/>
+                        <a:lstStyle/>
+                        <a:p>
+                          <a:pPr algn="ctr"/>
+                          <a:r>
+                            <a:rPr lang="fr-FR" sz="800" b="0" kern="1200" dirty="0" smtClean="0">
+                              <a:solidFill>
+                                <a:schemeClr val="dk1"/>
+                              </a:solidFill>
+                              <a:latin typeface="Times New Roman" panose="02020603050405020304" pitchFamily="18" charset="0"/>
+                              <a:ea typeface="+mn-ea"/>
+                              <a:cs typeface="Times New Roman" panose="02020603050405020304" pitchFamily="18" charset="0"/>
+                            </a:rPr>
+                            <a:t>2.8%</a:t>
                           </a:r>
                           <a:endParaRPr lang="fr-FR" sz="800" b="0" kern="1200" dirty="0">
                             <a:solidFill>
@@ -7107,7 +9108,7 @@
                               <a:ea typeface="+mn-ea"/>
                               <a:cs typeface="Times New Roman" panose="02020603050405020304" pitchFamily="18" charset="0"/>
                             </a:rPr>
-                            <a:t>70.8%</a:t>
+                            <a:t>171</a:t>
                           </a:r>
                           <a:endParaRPr lang="fr-FR" sz="800" b="0" kern="1200" dirty="0">
                             <a:solidFill>
@@ -7174,7 +9175,7 @@
                               <a:ea typeface="+mn-ea"/>
                               <a:cs typeface="Times New Roman" panose="02020603050405020304" pitchFamily="18" charset="0"/>
                             </a:rPr>
-                            <a:t>15.8%</a:t>
+                            <a:t>74.3%</a:t>
                           </a:r>
                           <a:endParaRPr lang="fr-FR" sz="800" b="0" kern="1200" dirty="0">
                             <a:solidFill>
@@ -7241,7 +9242,7 @@
                               <a:ea typeface="+mn-ea"/>
                               <a:cs typeface="Times New Roman" panose="02020603050405020304" pitchFamily="18" charset="0"/>
                             </a:rPr>
-                            <a:t>7.8%</a:t>
+                            <a:t>13.5%</a:t>
                           </a:r>
                           <a:endParaRPr lang="fr-FR" sz="800" b="0" kern="1200" dirty="0">
                             <a:solidFill>
@@ -7308,7 +9309,7 @@
                               <a:ea typeface="+mn-ea"/>
                               <a:cs typeface="Times New Roman" panose="02020603050405020304" pitchFamily="18" charset="0"/>
                             </a:rPr>
-                            <a:t>5.6%</a:t>
+                            <a:t>7.7%</a:t>
                           </a:r>
                           <a:endParaRPr lang="fr-FR" sz="800" b="0" kern="1200" dirty="0">
                             <a:solidFill>
@@ -7337,894 +9338,6 @@
                         </a:lnR>
                         <a:lnT w="3175" cap="flat" cmpd="sng" algn="ctr">
                           <a:noFill/>
-                          <a:prstDash val="solid"/>
-                          <a:round/>
-                          <a:headEnd type="none" w="med" len="med"/>
-                          <a:tailEnd type="none" w="med" len="med"/>
-                        </a:lnT>
-                        <a:lnB w="3175" cap="flat" cmpd="sng" algn="ctr">
-                          <a:noFill/>
-                          <a:prstDash val="solid"/>
-                          <a:round/>
-                          <a:headEnd type="none" w="med" len="med"/>
-                          <a:tailEnd type="none" w="med" len="med"/>
-                        </a:lnB>
-                        <a:lnTlToBr w="12700" cmpd="sng">
-                          <a:noFill/>
-                          <a:prstDash val="solid"/>
-                        </a:lnTlToBr>
-                        <a:lnBlToTr w="12700" cmpd="sng">
-                          <a:noFill/>
-                          <a:prstDash val="solid"/>
-                        </a:lnBlToTr>
-                        <a:noFill/>
-                      </a:tcPr>
-                    </a:tc>
-                    <a:extLst>
-                      <a:ext uri="{0D108BD9-81ED-4DB2-BD59-A6C34878D82A}">
-                        <a16:rowId xmlns:a16="http://schemas.microsoft.com/office/drawing/2014/main" val="4105435536"/>
-                      </a:ext>
-                    </a:extLst>
-                  </a:tr>
-                  <a:tr h="224308">
-                    <a:tc>
-                      <a:txBody>
-                        <a:bodyPr/>
-                        <a:lstStyle/>
-                        <a:p>
-                          <a:r>
-                            <a:rPr lang="en-US" sz="800" b="1" dirty="0" smtClean="0">
-                              <a:latin typeface="Times New Roman" panose="02020603050405020304" pitchFamily="18" charset="0"/>
-                              <a:cs typeface="Times New Roman" panose="02020603050405020304" pitchFamily="18" charset="0"/>
-                            </a:rPr>
-                            <a:t>MOTUs assigned to species</a:t>
-                          </a:r>
-                          <a:endParaRPr lang="fr-FR" sz="800" b="1" dirty="0">
-                            <a:solidFill>
-                              <a:schemeClr val="tx1"/>
-                            </a:solidFill>
-                          </a:endParaRPr>
-                        </a:p>
-                      </a:txBody>
-                      <a:tcPr marL="63305" marR="63305" marT="31652" marB="31652" anchor="ctr">
-                        <a:lnL w="3175" cap="flat" cmpd="sng" algn="ctr">
-                          <a:noFill/>
-                          <a:prstDash val="solid"/>
-                          <a:round/>
-                          <a:headEnd type="none" w="med" len="med"/>
-                          <a:tailEnd type="none" w="med" len="med"/>
-                        </a:lnL>
-                        <a:lnR w="3175" cap="flat" cmpd="sng" algn="ctr">
-                          <a:noFill/>
-                          <a:prstDash val="solid"/>
-                          <a:round/>
-                          <a:headEnd type="none" w="med" len="med"/>
-                          <a:tailEnd type="none" w="med" len="med"/>
-                        </a:lnR>
-                        <a:lnT w="3175" cap="flat" cmpd="sng" algn="ctr">
-                          <a:noFill/>
-                          <a:prstDash val="solid"/>
-                          <a:round/>
-                          <a:headEnd type="none" w="med" len="med"/>
-                          <a:tailEnd type="none" w="med" len="med"/>
-                        </a:lnT>
-                        <a:lnB w="3175" cap="flat" cmpd="sng" algn="ctr">
-                          <a:noFill/>
-                          <a:prstDash val="solid"/>
-                          <a:round/>
-                          <a:headEnd type="none" w="med" len="med"/>
-                          <a:tailEnd type="none" w="med" len="med"/>
-                        </a:lnB>
-                        <a:lnTlToBr w="12700" cmpd="sng">
-                          <a:noFill/>
-                          <a:prstDash val="solid"/>
-                        </a:lnTlToBr>
-                        <a:lnBlToTr w="12700" cmpd="sng">
-                          <a:noFill/>
-                          <a:prstDash val="solid"/>
-                        </a:lnBlToTr>
-                        <a:noFill/>
-                      </a:tcPr>
-                    </a:tc>
-                    <a:tc>
-                      <a:txBody>
-                        <a:bodyPr/>
-                        <a:lstStyle/>
-                        <a:p>
-                          <a:pPr algn="ctr"/>
-                          <a:r>
-                            <a:rPr lang="fr-FR" sz="800" b="0" kern="1200" dirty="0" smtClean="0">
-                              <a:solidFill>
-                                <a:schemeClr val="dk1"/>
-                              </a:solidFill>
-                              <a:latin typeface="Times New Roman" panose="02020603050405020304" pitchFamily="18" charset="0"/>
-                              <a:ea typeface="+mn-ea"/>
-                              <a:cs typeface="Times New Roman" panose="02020603050405020304" pitchFamily="18" charset="0"/>
-                            </a:rPr>
-                            <a:t>68%</a:t>
-                          </a:r>
-                          <a:endParaRPr lang="fr-FR" sz="800" b="0" kern="1200" dirty="0">
-                            <a:solidFill>
-                              <a:schemeClr val="dk1"/>
-                            </a:solidFill>
-                            <a:latin typeface="Times New Roman" panose="02020603050405020304" pitchFamily="18" charset="0"/>
-                            <a:ea typeface="+mn-ea"/>
-                            <a:cs typeface="Times New Roman" panose="02020603050405020304" pitchFamily="18" charset="0"/>
-                          </a:endParaRPr>
-                        </a:p>
-                      </a:txBody>
-                      <a:tcPr marL="63305" marR="63305" marT="31652" marB="31652" anchor="ctr">
-                        <a:lnL w="3175" cap="flat" cmpd="sng" algn="ctr">
-                          <a:noFill/>
-                          <a:prstDash val="solid"/>
-                          <a:round/>
-                          <a:headEnd type="none" w="med" len="med"/>
-                          <a:tailEnd type="none" w="med" len="med"/>
-                        </a:lnL>
-                        <a:lnR w="3175" cap="flat" cmpd="sng" algn="ctr">
-                          <a:noFill/>
-                          <a:prstDash val="solid"/>
-                          <a:round/>
-                          <a:headEnd type="none" w="med" len="med"/>
-                          <a:tailEnd type="none" w="med" len="med"/>
-                        </a:lnR>
-                        <a:lnT w="3175" cap="flat" cmpd="sng" algn="ctr">
-                          <a:noFill/>
-                          <a:prstDash val="solid"/>
-                          <a:round/>
-                          <a:headEnd type="none" w="med" len="med"/>
-                          <a:tailEnd type="none" w="med" len="med"/>
-                        </a:lnT>
-                        <a:lnB w="3175" cap="flat" cmpd="sng" algn="ctr">
-                          <a:noFill/>
-                          <a:prstDash val="solid"/>
-                          <a:round/>
-                          <a:headEnd type="none" w="med" len="med"/>
-                          <a:tailEnd type="none" w="med" len="med"/>
-                        </a:lnB>
-                        <a:lnTlToBr w="12700" cmpd="sng">
-                          <a:noFill/>
-                          <a:prstDash val="solid"/>
-                        </a:lnTlToBr>
-                        <a:lnBlToTr w="12700" cmpd="sng">
-                          <a:noFill/>
-                          <a:prstDash val="solid"/>
-                        </a:lnBlToTr>
-                        <a:noFill/>
-                      </a:tcPr>
-                    </a:tc>
-                    <a:tc>
-                      <a:txBody>
-                        <a:bodyPr/>
-                        <a:lstStyle/>
-                        <a:p>
-                          <a:pPr algn="ctr"/>
-                          <a:r>
-                            <a:rPr lang="fr-FR" sz="800" b="0" kern="1200" dirty="0" smtClean="0">
-                              <a:solidFill>
-                                <a:schemeClr val="dk1"/>
-                              </a:solidFill>
-                              <a:latin typeface="Times New Roman" panose="02020603050405020304" pitchFamily="18" charset="0"/>
-                              <a:ea typeface="+mn-ea"/>
-                              <a:cs typeface="Times New Roman" panose="02020603050405020304" pitchFamily="18" charset="0"/>
-                            </a:rPr>
-                            <a:t>15.7%</a:t>
-                          </a:r>
-                          <a:endParaRPr lang="fr-FR" sz="800" b="0" kern="1200" dirty="0">
-                            <a:solidFill>
-                              <a:schemeClr val="dk1"/>
-                            </a:solidFill>
-                            <a:latin typeface="Times New Roman" panose="02020603050405020304" pitchFamily="18" charset="0"/>
-                            <a:ea typeface="+mn-ea"/>
-                            <a:cs typeface="Times New Roman" panose="02020603050405020304" pitchFamily="18" charset="0"/>
-                          </a:endParaRPr>
-                        </a:p>
-                      </a:txBody>
-                      <a:tcPr marL="63305" marR="63305" marT="31652" marB="31652" anchor="ctr">
-                        <a:lnL w="3175" cap="flat" cmpd="sng" algn="ctr">
-                          <a:noFill/>
-                          <a:prstDash val="solid"/>
-                          <a:round/>
-                          <a:headEnd type="none" w="med" len="med"/>
-                          <a:tailEnd type="none" w="med" len="med"/>
-                        </a:lnL>
-                        <a:lnR w="3175" cap="flat" cmpd="sng" algn="ctr">
-                          <a:noFill/>
-                          <a:prstDash val="solid"/>
-                          <a:round/>
-                          <a:headEnd type="none" w="med" len="med"/>
-                          <a:tailEnd type="none" w="med" len="med"/>
-                        </a:lnR>
-                        <a:lnT w="3175" cap="flat" cmpd="sng" algn="ctr">
-                          <a:noFill/>
-                          <a:prstDash val="solid"/>
-                          <a:round/>
-                          <a:headEnd type="none" w="med" len="med"/>
-                          <a:tailEnd type="none" w="med" len="med"/>
-                        </a:lnT>
-                        <a:lnB w="3175" cap="flat" cmpd="sng" algn="ctr">
-                          <a:noFill/>
-                          <a:prstDash val="solid"/>
-                          <a:round/>
-                          <a:headEnd type="none" w="med" len="med"/>
-                          <a:tailEnd type="none" w="med" len="med"/>
-                        </a:lnB>
-                        <a:lnTlToBr w="12700" cmpd="sng">
-                          <a:noFill/>
-                          <a:prstDash val="solid"/>
-                        </a:lnTlToBr>
-                        <a:lnBlToTr w="12700" cmpd="sng">
-                          <a:noFill/>
-                          <a:prstDash val="solid"/>
-                        </a:lnBlToTr>
-                        <a:noFill/>
-                      </a:tcPr>
-                    </a:tc>
-                    <a:tc>
-                      <a:txBody>
-                        <a:bodyPr/>
-                        <a:lstStyle/>
-                        <a:p>
-                          <a:pPr algn="ctr"/>
-                          <a:r>
-                            <a:rPr lang="fr-FR" sz="800" b="0" kern="1200" dirty="0" smtClean="0">
-                              <a:solidFill>
-                                <a:schemeClr val="dk1"/>
-                              </a:solidFill>
-                              <a:latin typeface="Times New Roman" panose="02020603050405020304" pitchFamily="18" charset="0"/>
-                              <a:ea typeface="+mn-ea"/>
-                              <a:cs typeface="Times New Roman" panose="02020603050405020304" pitchFamily="18" charset="0"/>
-                            </a:rPr>
-                            <a:t>8.3%</a:t>
-                          </a:r>
-                          <a:endParaRPr lang="fr-FR" sz="800" b="0" kern="1200" dirty="0">
-                            <a:solidFill>
-                              <a:schemeClr val="dk1"/>
-                            </a:solidFill>
-                            <a:latin typeface="Times New Roman" panose="02020603050405020304" pitchFamily="18" charset="0"/>
-                            <a:ea typeface="+mn-ea"/>
-                            <a:cs typeface="Times New Roman" panose="02020603050405020304" pitchFamily="18" charset="0"/>
-                          </a:endParaRPr>
-                        </a:p>
-                      </a:txBody>
-                      <a:tcPr marL="63305" marR="63305" marT="31652" marB="31652" anchor="ctr">
-                        <a:lnL w="3175" cap="flat" cmpd="sng" algn="ctr">
-                          <a:noFill/>
-                          <a:prstDash val="solid"/>
-                          <a:round/>
-                          <a:headEnd type="none" w="med" len="med"/>
-                          <a:tailEnd type="none" w="med" len="med"/>
-                        </a:lnL>
-                        <a:lnR w="3175" cap="flat" cmpd="sng" algn="ctr">
-                          <a:noFill/>
-                          <a:prstDash val="solid"/>
-                          <a:round/>
-                          <a:headEnd type="none" w="med" len="med"/>
-                          <a:tailEnd type="none" w="med" len="med"/>
-                        </a:lnR>
-                        <a:lnT w="3175" cap="flat" cmpd="sng" algn="ctr">
-                          <a:noFill/>
-                          <a:prstDash val="solid"/>
-                          <a:round/>
-                          <a:headEnd type="none" w="med" len="med"/>
-                          <a:tailEnd type="none" w="med" len="med"/>
-                        </a:lnT>
-                        <a:lnB w="3175" cap="flat" cmpd="sng" algn="ctr">
-                          <a:noFill/>
-                          <a:prstDash val="solid"/>
-                          <a:round/>
-                          <a:headEnd type="none" w="med" len="med"/>
-                          <a:tailEnd type="none" w="med" len="med"/>
-                        </a:lnB>
-                        <a:lnTlToBr w="12700" cmpd="sng">
-                          <a:noFill/>
-                          <a:prstDash val="solid"/>
-                        </a:lnTlToBr>
-                        <a:lnBlToTr w="12700" cmpd="sng">
-                          <a:noFill/>
-                          <a:prstDash val="solid"/>
-                        </a:lnBlToTr>
-                        <a:noFill/>
-                      </a:tcPr>
-                    </a:tc>
-                    <a:tc>
-                      <a:txBody>
-                        <a:bodyPr/>
-                        <a:lstStyle/>
-                        <a:p>
-                          <a:pPr algn="ctr"/>
-                          <a:r>
-                            <a:rPr lang="fr-FR" sz="800" b="0" kern="1200" dirty="0" smtClean="0">
-                              <a:solidFill>
-                                <a:schemeClr val="dk1"/>
-                              </a:solidFill>
-                              <a:latin typeface="Times New Roman" panose="02020603050405020304" pitchFamily="18" charset="0"/>
-                              <a:ea typeface="+mn-ea"/>
-                              <a:cs typeface="Times New Roman" panose="02020603050405020304" pitchFamily="18" charset="0"/>
-                            </a:rPr>
-                            <a:t>8%</a:t>
-                          </a:r>
-                          <a:endParaRPr lang="fr-FR" sz="800" b="0" kern="1200" dirty="0">
-                            <a:solidFill>
-                              <a:schemeClr val="dk1"/>
-                            </a:solidFill>
-                            <a:latin typeface="Times New Roman" panose="02020603050405020304" pitchFamily="18" charset="0"/>
-                            <a:ea typeface="+mn-ea"/>
-                            <a:cs typeface="Times New Roman" panose="02020603050405020304" pitchFamily="18" charset="0"/>
-                          </a:endParaRPr>
-                        </a:p>
-                      </a:txBody>
-                      <a:tcPr marL="63305" marR="63305" marT="31652" marB="31652" anchor="ctr">
-                        <a:lnL w="3175" cap="flat" cmpd="sng" algn="ctr">
-                          <a:noFill/>
-                          <a:prstDash val="solid"/>
-                          <a:round/>
-                          <a:headEnd type="none" w="med" len="med"/>
-                          <a:tailEnd type="none" w="med" len="med"/>
-                        </a:lnL>
-                        <a:lnR w="3175" cap="flat" cmpd="sng" algn="ctr">
-                          <a:noFill/>
-                          <a:prstDash val="solid"/>
-                          <a:round/>
-                          <a:headEnd type="none" w="med" len="med"/>
-                          <a:tailEnd type="none" w="med" len="med"/>
-                        </a:lnR>
-                        <a:lnT w="3175" cap="flat" cmpd="sng" algn="ctr">
-                          <a:noFill/>
-                          <a:prstDash val="solid"/>
-                          <a:round/>
-                          <a:headEnd type="none" w="med" len="med"/>
-                          <a:tailEnd type="none" w="med" len="med"/>
-                        </a:lnT>
-                        <a:lnB w="3175" cap="flat" cmpd="sng" algn="ctr">
-                          <a:noFill/>
-                          <a:prstDash val="solid"/>
-                          <a:round/>
-                          <a:headEnd type="none" w="med" len="med"/>
-                          <a:tailEnd type="none" w="med" len="med"/>
-                        </a:lnB>
-                        <a:lnTlToBr w="12700" cmpd="sng">
-                          <a:noFill/>
-                          <a:prstDash val="solid"/>
-                        </a:lnTlToBr>
-                        <a:lnBlToTr w="12700" cmpd="sng">
-                          <a:noFill/>
-                          <a:prstDash val="solid"/>
-                        </a:lnBlToTr>
-                        <a:noFill/>
-                      </a:tcPr>
-                    </a:tc>
-                    <a:extLst>
-                      <a:ext uri="{0D108BD9-81ED-4DB2-BD59-A6C34878D82A}">
-                        <a16:rowId xmlns:a16="http://schemas.microsoft.com/office/drawing/2014/main" val="3060182616"/>
-                      </a:ext>
-                    </a:extLst>
-                  </a:tr>
-                </a:tbl>
-              </a:graphicData>
-            </a:graphic>
-          </p:graphicFrame>
-        </mc:Choice>
-        <mc:Fallback xmlns="">
-          <p:graphicFrame>
-            <p:nvGraphicFramePr>
-              <p:cNvPr id="2" name="Tableau 1"/>
-              <p:cNvGraphicFramePr>
-                <a:graphicFrameLocks noGrp="1"/>
-              </p:cNvGraphicFramePr>
-              <p:nvPr>
-                <p:extLst>
-                  <p:ext uri="{D42A27DB-BD31-4B8C-83A1-F6EECF244321}">
-                    <p14:modId xmlns:p14="http://schemas.microsoft.com/office/powerpoint/2010/main" val="2247587491"/>
-                  </p:ext>
-                </p:extLst>
-              </p:nvPr>
-            </p:nvGraphicFramePr>
-            <p:xfrm>
-              <a:off x="2984031" y="3726210"/>
-              <a:ext cx="3980249" cy="897232"/>
-            </p:xfrm>
-            <a:graphic>
-              <a:graphicData uri="http://schemas.openxmlformats.org/drawingml/2006/table">
-                <a:tbl>
-                  <a:tblPr firstRow="1" bandRow="1">
-                    <a:tableStyleId>{5C22544A-7EE6-4342-B048-85BDC9FD1C3A}</a:tableStyleId>
-                  </a:tblPr>
-                  <a:tblGrid>
-                    <a:gridCol w="1346305">
-                      <a:extLst>
-                        <a:ext uri="{9D8B030D-6E8A-4147-A177-3AD203B41FA5}">
-                          <a16:colId xmlns:a16="http://schemas.microsoft.com/office/drawing/2014/main" val="1067048240"/>
-                        </a:ext>
-                      </a:extLst>
-                    </a:gridCol>
-                    <a:gridCol w="658486">
-                      <a:extLst>
-                        <a:ext uri="{9D8B030D-6E8A-4147-A177-3AD203B41FA5}">
-                          <a16:colId xmlns:a16="http://schemas.microsoft.com/office/drawing/2014/main" val="3084419488"/>
-                        </a:ext>
-                      </a:extLst>
-                    </a:gridCol>
-                    <a:gridCol w="658486">
-                      <a:extLst>
-                        <a:ext uri="{9D8B030D-6E8A-4147-A177-3AD203B41FA5}">
-                          <a16:colId xmlns:a16="http://schemas.microsoft.com/office/drawing/2014/main" val="3836093460"/>
-                        </a:ext>
-                      </a:extLst>
-                    </a:gridCol>
-                    <a:gridCol w="658486">
-                      <a:extLst>
-                        <a:ext uri="{9D8B030D-6E8A-4147-A177-3AD203B41FA5}">
-                          <a16:colId xmlns:a16="http://schemas.microsoft.com/office/drawing/2014/main" val="4109928961"/>
-                        </a:ext>
-                      </a:extLst>
-                    </a:gridCol>
-                    <a:gridCol w="658486">
-                      <a:extLst>
-                        <a:ext uri="{9D8B030D-6E8A-4147-A177-3AD203B41FA5}">
-                          <a16:colId xmlns:a16="http://schemas.microsoft.com/office/drawing/2014/main" val="2333253021"/>
-                        </a:ext>
-                      </a:extLst>
-                    </a:gridCol>
-                  </a:tblGrid>
-                  <a:tr h="224308">
-                    <a:tc>
-                      <a:txBody>
-                        <a:bodyPr/>
-                        <a:lstStyle/>
-                        <a:p>
-                          <a:endParaRPr lang="fr-FR" sz="800" b="0" dirty="0">
-                            <a:solidFill>
-                              <a:schemeClr val="tx1"/>
-                            </a:solidFill>
-                          </a:endParaRPr>
-                        </a:p>
-                      </a:txBody>
-                      <a:tcPr marL="63305" marR="63305" marT="31652" marB="31652" anchor="ctr">
-                        <a:lnL w="12700" cap="flat" cmpd="sng" algn="ctr">
-                          <a:noFill/>
-                          <a:prstDash val="solid"/>
-                          <a:round/>
-                          <a:headEnd type="none" w="med" len="med"/>
-                          <a:tailEnd type="none" w="med" len="med"/>
-                        </a:lnL>
-                        <a:lnR w="3175" cap="flat" cmpd="sng" algn="ctr">
-                          <a:noFill/>
-                          <a:prstDash val="solid"/>
-                          <a:round/>
-                          <a:headEnd type="none" w="med" len="med"/>
-                          <a:tailEnd type="none" w="med" len="med"/>
-                        </a:lnR>
-                        <a:lnT w="12700" cap="flat" cmpd="sng" algn="ctr">
-                          <a:noFill/>
-                          <a:prstDash val="solid"/>
-                          <a:round/>
-                          <a:headEnd type="none" w="med" len="med"/>
-                          <a:tailEnd type="none" w="med" len="med"/>
-                        </a:lnT>
-                        <a:lnB w="3175" cap="flat" cmpd="sng" algn="ctr">
-                          <a:solidFill>
-                            <a:schemeClr val="tx1"/>
-                          </a:solidFill>
-                          <a:prstDash val="solid"/>
-                          <a:round/>
-                          <a:headEnd type="none" w="med" len="med"/>
-                          <a:tailEnd type="none" w="med" len="med"/>
-                        </a:lnB>
-                        <a:lnTlToBr w="12700" cmpd="sng">
-                          <a:noFill/>
-                          <a:prstDash val="solid"/>
-                        </a:lnTlToBr>
-                        <a:lnBlToTr w="12700" cmpd="sng">
-                          <a:noFill/>
-                          <a:prstDash val="solid"/>
-                        </a:lnBlToTr>
-                        <a:noFill/>
-                      </a:tcPr>
-                    </a:tc>
-                    <a:tc>
-                      <a:txBody>
-                        <a:bodyPr/>
-                        <a:lstStyle/>
-                        <a:p>
-                          <a:endParaRPr lang="fr-FR"/>
-                        </a:p>
-                      </a:txBody>
-                      <a:tcPr marL="63305" marR="63305" marT="31652" marB="31652" anchor="ctr">
-                        <a:lnL w="3175" cap="flat" cmpd="sng" algn="ctr">
-                          <a:noFill/>
-                          <a:prstDash val="solid"/>
-                          <a:round/>
-                          <a:headEnd type="none" w="med" len="med"/>
-                          <a:tailEnd type="none" w="med" len="med"/>
-                        </a:lnL>
-                        <a:lnR w="3175" cap="flat" cmpd="sng" algn="ctr">
-                          <a:noFill/>
-                          <a:prstDash val="solid"/>
-                          <a:round/>
-                          <a:headEnd type="none" w="med" len="med"/>
-                          <a:tailEnd type="none" w="med" len="med"/>
-                        </a:lnR>
-                        <a:lnT w="3175" cap="flat" cmpd="sng" algn="ctr">
-                          <a:noFill/>
-                          <a:prstDash val="solid"/>
-                          <a:round/>
-                          <a:headEnd type="none" w="med" len="med"/>
-                          <a:tailEnd type="none" w="med" len="med"/>
-                        </a:lnT>
-                        <a:lnB w="3175" cap="flat" cmpd="sng" algn="ctr">
-                          <a:solidFill>
-                            <a:schemeClr val="tx1"/>
-                          </a:solidFill>
-                          <a:prstDash val="solid"/>
-                          <a:round/>
-                          <a:headEnd type="none" w="med" len="med"/>
-                          <a:tailEnd type="none" w="med" len="med"/>
-                        </a:lnB>
-                        <a:lnTlToBr w="12700" cmpd="sng">
-                          <a:noFill/>
-                          <a:prstDash val="solid"/>
-                        </a:lnTlToBr>
-                        <a:lnBlToTr w="12700" cmpd="sng">
-                          <a:noFill/>
-                          <a:prstDash val="solid"/>
-                        </a:lnBlToTr>
-                        <a:blipFill>
-                          <a:blip r:embed="rId21"/>
-                          <a:stretch>
-                            <a:fillRect l="-204630" r="-300926" b="-305405"/>
-                          </a:stretch>
-                        </a:blipFill>
-                      </a:tcPr>
-                    </a:tc>
-                    <a:tc>
-                      <a:txBody>
-                        <a:bodyPr/>
-                        <a:lstStyle/>
-                        <a:p>
-                          <a:endParaRPr lang="fr-FR"/>
-                        </a:p>
-                      </a:txBody>
-                      <a:tcPr marL="63305" marR="63305" marT="31652" marB="31652" anchor="ctr">
-                        <a:lnL w="3175" cap="flat" cmpd="sng" algn="ctr">
-                          <a:noFill/>
-                          <a:prstDash val="solid"/>
-                          <a:round/>
-                          <a:headEnd type="none" w="med" len="med"/>
-                          <a:tailEnd type="none" w="med" len="med"/>
-                        </a:lnL>
-                        <a:lnR w="3175" cap="flat" cmpd="sng" algn="ctr">
-                          <a:noFill/>
-                          <a:prstDash val="solid"/>
-                          <a:round/>
-                          <a:headEnd type="none" w="med" len="med"/>
-                          <a:tailEnd type="none" w="med" len="med"/>
-                        </a:lnR>
-                        <a:lnT w="3175" cap="flat" cmpd="sng" algn="ctr">
-                          <a:noFill/>
-                          <a:prstDash val="solid"/>
-                          <a:round/>
-                          <a:headEnd type="none" w="med" len="med"/>
-                          <a:tailEnd type="none" w="med" len="med"/>
-                        </a:lnT>
-                        <a:lnB w="3175" cap="flat" cmpd="sng" algn="ctr">
-                          <a:solidFill>
-                            <a:schemeClr val="tx1"/>
-                          </a:solidFill>
-                          <a:prstDash val="solid"/>
-                          <a:round/>
-                          <a:headEnd type="none" w="med" len="med"/>
-                          <a:tailEnd type="none" w="med" len="med"/>
-                        </a:lnB>
-                        <a:lnTlToBr w="12700" cmpd="sng">
-                          <a:noFill/>
-                          <a:prstDash val="solid"/>
-                        </a:lnTlToBr>
-                        <a:lnBlToTr w="12700" cmpd="sng">
-                          <a:noFill/>
-                          <a:prstDash val="solid"/>
-                        </a:lnBlToTr>
-                        <a:blipFill>
-                          <a:blip r:embed="rId21"/>
-                          <a:stretch>
-                            <a:fillRect l="-301835" r="-198165" b="-305405"/>
-                          </a:stretch>
-                        </a:blipFill>
-                      </a:tcPr>
-                    </a:tc>
-                    <a:tc>
-                      <a:txBody>
-                        <a:bodyPr/>
-                        <a:lstStyle/>
-                        <a:p>
-                          <a:endParaRPr lang="fr-FR"/>
-                        </a:p>
-                      </a:txBody>
-                      <a:tcPr marL="63305" marR="63305" marT="31652" marB="31652" anchor="ctr">
-                        <a:lnL w="3175" cap="flat" cmpd="sng" algn="ctr">
-                          <a:noFill/>
-                          <a:prstDash val="solid"/>
-                          <a:round/>
-                          <a:headEnd type="none" w="med" len="med"/>
-                          <a:tailEnd type="none" w="med" len="med"/>
-                        </a:lnL>
-                        <a:lnR w="3175" cap="flat" cmpd="sng" algn="ctr">
-                          <a:noFill/>
-                          <a:prstDash val="solid"/>
-                          <a:round/>
-                          <a:headEnd type="none" w="med" len="med"/>
-                          <a:tailEnd type="none" w="med" len="med"/>
-                        </a:lnR>
-                        <a:lnT w="3175" cap="flat" cmpd="sng" algn="ctr">
-                          <a:noFill/>
-                          <a:prstDash val="solid"/>
-                          <a:round/>
-                          <a:headEnd type="none" w="med" len="med"/>
-                          <a:tailEnd type="none" w="med" len="med"/>
-                        </a:lnT>
-                        <a:lnB w="3175" cap="flat" cmpd="sng" algn="ctr">
-                          <a:solidFill>
-                            <a:schemeClr val="tx1"/>
-                          </a:solidFill>
-                          <a:prstDash val="solid"/>
-                          <a:round/>
-                          <a:headEnd type="none" w="med" len="med"/>
-                          <a:tailEnd type="none" w="med" len="med"/>
-                        </a:lnB>
-                        <a:lnTlToBr w="12700" cmpd="sng">
-                          <a:noFill/>
-                          <a:prstDash val="solid"/>
-                        </a:lnTlToBr>
-                        <a:lnBlToTr w="12700" cmpd="sng">
-                          <a:noFill/>
-                          <a:prstDash val="solid"/>
-                        </a:lnBlToTr>
-                        <a:blipFill>
-                          <a:blip r:embed="rId21"/>
-                          <a:stretch>
-                            <a:fillRect l="-405556" r="-100000" b="-305405"/>
-                          </a:stretch>
-                        </a:blipFill>
-                      </a:tcPr>
-                    </a:tc>
-                    <a:tc>
-                      <a:txBody>
-                        <a:bodyPr/>
-                        <a:lstStyle/>
-                        <a:p>
-                          <a:endParaRPr lang="fr-FR"/>
-                        </a:p>
-                      </a:txBody>
-                      <a:tcPr marL="63305" marR="63305" marT="31652" marB="31652" anchor="ctr">
-                        <a:lnL w="3175" cap="flat" cmpd="sng" algn="ctr">
-                          <a:noFill/>
-                          <a:prstDash val="solid"/>
-                          <a:round/>
-                          <a:headEnd type="none" w="med" len="med"/>
-                          <a:tailEnd type="none" w="med" len="med"/>
-                        </a:lnL>
-                        <a:lnR w="3175" cap="flat" cmpd="sng" algn="ctr">
-                          <a:noFill/>
-                          <a:prstDash val="solid"/>
-                          <a:round/>
-                          <a:headEnd type="none" w="med" len="med"/>
-                          <a:tailEnd type="none" w="med" len="med"/>
-                        </a:lnR>
-                        <a:lnT w="3175" cap="flat" cmpd="sng" algn="ctr">
-                          <a:noFill/>
-                          <a:prstDash val="solid"/>
-                          <a:round/>
-                          <a:headEnd type="none" w="med" len="med"/>
-                          <a:tailEnd type="none" w="med" len="med"/>
-                        </a:lnT>
-                        <a:lnB w="3175" cap="flat" cmpd="sng" algn="ctr">
-                          <a:solidFill>
-                            <a:schemeClr val="tx1"/>
-                          </a:solidFill>
-                          <a:prstDash val="solid"/>
-                          <a:round/>
-                          <a:headEnd type="none" w="med" len="med"/>
-                          <a:tailEnd type="none" w="med" len="med"/>
-                        </a:lnB>
-                        <a:lnTlToBr w="12700" cmpd="sng">
-                          <a:noFill/>
-                          <a:prstDash val="solid"/>
-                        </a:lnTlToBr>
-                        <a:lnBlToTr w="12700" cmpd="sng">
-                          <a:noFill/>
-                          <a:prstDash val="solid"/>
-                        </a:lnBlToTr>
-                        <a:blipFill>
-                          <a:blip r:embed="rId21"/>
-                          <a:stretch>
-                            <a:fillRect l="-505556" b="-305405"/>
-                          </a:stretch>
-                        </a:blipFill>
-                      </a:tcPr>
-                    </a:tc>
-                    <a:extLst>
-                      <a:ext uri="{0D108BD9-81ED-4DB2-BD59-A6C34878D82A}">
-                        <a16:rowId xmlns:a16="http://schemas.microsoft.com/office/drawing/2014/main" val="3254895143"/>
-                      </a:ext>
-                    </a:extLst>
-                  </a:tr>
-                  <a:tr h="224308">
-                    <a:tc>
-                      <a:txBody>
-                        <a:bodyPr/>
-                        <a:lstStyle/>
-                        <a:p>
-                          <a:r>
-                            <a:rPr lang="en-US" sz="800" b="1" dirty="0" smtClean="0">
-                              <a:latin typeface="Times New Roman" panose="02020603050405020304" pitchFamily="18" charset="0"/>
-                              <a:cs typeface="Times New Roman" panose="02020603050405020304" pitchFamily="18" charset="0"/>
-                            </a:rPr>
-                            <a:t>Cryptobenthic families</a:t>
-                          </a:r>
-                          <a:endParaRPr lang="fr-FR" sz="800" b="1" dirty="0">
-                            <a:solidFill>
-                              <a:schemeClr val="tx1"/>
-                            </a:solidFill>
-                          </a:endParaRPr>
-                        </a:p>
-                      </a:txBody>
-                      <a:tcPr marL="63305" marR="63305" marT="31652" marB="31652" anchor="ctr">
-                        <a:lnL w="3175" cap="flat" cmpd="sng" algn="ctr">
-                          <a:noFill/>
-                          <a:prstDash val="solid"/>
-                          <a:round/>
-                          <a:headEnd type="none" w="med" len="med"/>
-                          <a:tailEnd type="none" w="med" len="med"/>
-                        </a:lnL>
-                        <a:lnR w="3175" cap="flat" cmpd="sng" algn="ctr">
-                          <a:noFill/>
-                          <a:prstDash val="solid"/>
-                          <a:round/>
-                          <a:headEnd type="none" w="med" len="med"/>
-                          <a:tailEnd type="none" w="med" len="med"/>
-                        </a:lnR>
-                        <a:lnT w="3175" cap="flat" cmpd="sng" algn="ctr">
-                          <a:solidFill>
-                            <a:schemeClr val="tx1"/>
-                          </a:solidFill>
-                          <a:prstDash val="solid"/>
-                          <a:round/>
-                          <a:headEnd type="none" w="med" len="med"/>
-                          <a:tailEnd type="none" w="med" len="med"/>
-                        </a:lnT>
-                        <a:lnB w="3175" cap="flat" cmpd="sng" algn="ctr">
-                          <a:noFill/>
-                          <a:prstDash val="solid"/>
-                          <a:round/>
-                          <a:headEnd type="none" w="med" len="med"/>
-                          <a:tailEnd type="none" w="med" len="med"/>
-                        </a:lnB>
-                        <a:lnTlToBr w="12700" cmpd="sng">
-                          <a:noFill/>
-                          <a:prstDash val="solid"/>
-                        </a:lnTlToBr>
-                        <a:lnBlToTr w="12700" cmpd="sng">
-                          <a:noFill/>
-                          <a:prstDash val="solid"/>
-                        </a:lnBlToTr>
-                        <a:noFill/>
-                      </a:tcPr>
-                    </a:tc>
-                    <a:tc>
-                      <a:txBody>
-                        <a:bodyPr/>
-                        <a:lstStyle/>
-                        <a:p>
-                          <a:pPr algn="ctr"/>
-                          <a:r>
-                            <a:rPr lang="fr-FR" sz="800" b="0" kern="1200" dirty="0" smtClean="0">
-                              <a:solidFill>
-                                <a:schemeClr val="dk1"/>
-                              </a:solidFill>
-                              <a:latin typeface="Times New Roman" panose="02020603050405020304" pitchFamily="18" charset="0"/>
-                              <a:ea typeface="+mn-ea"/>
-                              <a:cs typeface="Times New Roman" panose="02020603050405020304" pitchFamily="18" charset="0"/>
-                            </a:rPr>
-                            <a:t>74%</a:t>
-                          </a:r>
-                          <a:endParaRPr lang="fr-FR" sz="800" b="0" kern="1200" dirty="0">
-                            <a:solidFill>
-                              <a:schemeClr val="dk1"/>
-                            </a:solidFill>
-                            <a:latin typeface="Times New Roman" panose="02020603050405020304" pitchFamily="18" charset="0"/>
-                            <a:ea typeface="+mn-ea"/>
-                            <a:cs typeface="Times New Roman" panose="02020603050405020304" pitchFamily="18" charset="0"/>
-                          </a:endParaRPr>
-                        </a:p>
-                      </a:txBody>
-                      <a:tcPr marL="63305" marR="63305" marT="31652" marB="31652" anchor="ctr">
-                        <a:lnL w="3175" cap="flat" cmpd="sng" algn="ctr">
-                          <a:noFill/>
-                          <a:prstDash val="solid"/>
-                          <a:round/>
-                          <a:headEnd type="none" w="med" len="med"/>
-                          <a:tailEnd type="none" w="med" len="med"/>
-                        </a:lnL>
-                        <a:lnR w="3175" cap="flat" cmpd="sng" algn="ctr">
-                          <a:noFill/>
-                          <a:prstDash val="solid"/>
-                          <a:round/>
-                          <a:headEnd type="none" w="med" len="med"/>
-                          <a:tailEnd type="none" w="med" len="med"/>
-                        </a:lnR>
-                        <a:lnT w="3175" cap="flat" cmpd="sng" algn="ctr">
-                          <a:solidFill>
-                            <a:schemeClr val="tx1"/>
-                          </a:solidFill>
-                          <a:prstDash val="solid"/>
-                          <a:round/>
-                          <a:headEnd type="none" w="med" len="med"/>
-                          <a:tailEnd type="none" w="med" len="med"/>
-                        </a:lnT>
-                        <a:lnB w="3175" cap="flat" cmpd="sng" algn="ctr">
-                          <a:noFill/>
-                          <a:prstDash val="solid"/>
-                          <a:round/>
-                          <a:headEnd type="none" w="med" len="med"/>
-                          <a:tailEnd type="none" w="med" len="med"/>
-                        </a:lnB>
-                        <a:lnTlToBr w="12700" cmpd="sng">
-                          <a:noFill/>
-                          <a:prstDash val="solid"/>
-                        </a:lnTlToBr>
-                        <a:lnBlToTr w="12700" cmpd="sng">
-                          <a:noFill/>
-                          <a:prstDash val="solid"/>
-                        </a:lnBlToTr>
-                        <a:noFill/>
-                      </a:tcPr>
-                    </a:tc>
-                    <a:tc>
-                      <a:txBody>
-                        <a:bodyPr/>
-                        <a:lstStyle/>
-                        <a:p>
-                          <a:pPr algn="ctr"/>
-                          <a:r>
-                            <a:rPr lang="fr-FR" sz="800" b="0" kern="1200" dirty="0" smtClean="0">
-                              <a:solidFill>
-                                <a:schemeClr val="dk1"/>
-                              </a:solidFill>
-                              <a:latin typeface="Times New Roman" panose="02020603050405020304" pitchFamily="18" charset="0"/>
-                              <a:ea typeface="+mn-ea"/>
-                              <a:cs typeface="Times New Roman" panose="02020603050405020304" pitchFamily="18" charset="0"/>
-                            </a:rPr>
-                            <a:t>18%</a:t>
-                          </a:r>
-                          <a:endParaRPr lang="fr-FR" sz="800" b="0" kern="1200" dirty="0">
-                            <a:solidFill>
-                              <a:schemeClr val="dk1"/>
-                            </a:solidFill>
-                            <a:latin typeface="Times New Roman" panose="02020603050405020304" pitchFamily="18" charset="0"/>
-                            <a:ea typeface="+mn-ea"/>
-                            <a:cs typeface="Times New Roman" panose="02020603050405020304" pitchFamily="18" charset="0"/>
-                          </a:endParaRPr>
-                        </a:p>
-                      </a:txBody>
-                      <a:tcPr marL="63305" marR="63305" marT="31652" marB="31652" anchor="ctr">
-                        <a:lnL w="3175" cap="flat" cmpd="sng" algn="ctr">
-                          <a:noFill/>
-                          <a:prstDash val="solid"/>
-                          <a:round/>
-                          <a:headEnd type="none" w="med" len="med"/>
-                          <a:tailEnd type="none" w="med" len="med"/>
-                        </a:lnL>
-                        <a:lnR w="3175" cap="flat" cmpd="sng" algn="ctr">
-                          <a:noFill/>
-                          <a:prstDash val="solid"/>
-                          <a:round/>
-                          <a:headEnd type="none" w="med" len="med"/>
-                          <a:tailEnd type="none" w="med" len="med"/>
-                        </a:lnR>
-                        <a:lnT w="3175" cap="flat" cmpd="sng" algn="ctr">
-                          <a:solidFill>
-                            <a:schemeClr val="tx1"/>
-                          </a:solidFill>
                           <a:prstDash val="solid"/>
                           <a:round/>
                           <a:headEnd type="none" w="med" len="med"/>
@@ -8291,411 +9404,6 @@
                           <a:tailEnd type="none" w="med" len="med"/>
                         </a:lnR>
                         <a:lnT w="3175" cap="flat" cmpd="sng" algn="ctr">
-                          <a:solidFill>
-                            <a:schemeClr val="tx1"/>
-                          </a:solidFill>
-                          <a:prstDash val="solid"/>
-                          <a:round/>
-                          <a:headEnd type="none" w="med" len="med"/>
-                          <a:tailEnd type="none" w="med" len="med"/>
-                        </a:lnT>
-                        <a:lnB w="3175" cap="flat" cmpd="sng" algn="ctr">
-                          <a:noFill/>
-                          <a:prstDash val="solid"/>
-                          <a:round/>
-                          <a:headEnd type="none" w="med" len="med"/>
-                          <a:tailEnd type="none" w="med" len="med"/>
-                        </a:lnB>
-                        <a:lnTlToBr w="12700" cmpd="sng">
-                          <a:noFill/>
-                          <a:prstDash val="solid"/>
-                        </a:lnTlToBr>
-                        <a:lnBlToTr w="12700" cmpd="sng">
-                          <a:noFill/>
-                          <a:prstDash val="solid"/>
-                        </a:lnBlToTr>
-                        <a:noFill/>
-                      </a:tcPr>
-                    </a:tc>
-                    <a:tc>
-                      <a:txBody>
-                        <a:bodyPr/>
-                        <a:lstStyle/>
-                        <a:p>
-                          <a:pPr algn="ctr"/>
-                          <a:r>
-                            <a:rPr lang="fr-FR" sz="800" b="0" kern="1200" dirty="0" smtClean="0">
-                              <a:solidFill>
-                                <a:schemeClr val="dk1"/>
-                              </a:solidFill>
-                              <a:latin typeface="Times New Roman" panose="02020603050405020304" pitchFamily="18" charset="0"/>
-                              <a:ea typeface="+mn-ea"/>
-                              <a:cs typeface="Times New Roman" panose="02020603050405020304" pitchFamily="18" charset="0"/>
-                            </a:rPr>
-                            <a:t>3.5%</a:t>
-                          </a:r>
-                          <a:endParaRPr lang="fr-FR" sz="800" b="0" kern="1200" dirty="0">
-                            <a:solidFill>
-                              <a:schemeClr val="dk1"/>
-                            </a:solidFill>
-                            <a:latin typeface="Times New Roman" panose="02020603050405020304" pitchFamily="18" charset="0"/>
-                            <a:ea typeface="+mn-ea"/>
-                            <a:cs typeface="Times New Roman" panose="02020603050405020304" pitchFamily="18" charset="0"/>
-                          </a:endParaRPr>
-                        </a:p>
-                      </a:txBody>
-                      <a:tcPr marL="63305" marR="63305" marT="31652" marB="31652" anchor="ctr">
-                        <a:lnL w="3175" cap="flat" cmpd="sng" algn="ctr">
-                          <a:noFill/>
-                          <a:prstDash val="solid"/>
-                          <a:round/>
-                          <a:headEnd type="none" w="med" len="med"/>
-                          <a:tailEnd type="none" w="med" len="med"/>
-                        </a:lnL>
-                        <a:lnR w="3175" cap="flat" cmpd="sng" algn="ctr">
-                          <a:noFill/>
-                          <a:prstDash val="solid"/>
-                          <a:round/>
-                          <a:headEnd type="none" w="med" len="med"/>
-                          <a:tailEnd type="none" w="med" len="med"/>
-                        </a:lnR>
-                        <a:lnT w="3175" cap="flat" cmpd="sng" algn="ctr">
-                          <a:solidFill>
-                            <a:schemeClr val="tx1"/>
-                          </a:solidFill>
-                          <a:prstDash val="solid"/>
-                          <a:round/>
-                          <a:headEnd type="none" w="med" len="med"/>
-                          <a:tailEnd type="none" w="med" len="med"/>
-                        </a:lnT>
-                        <a:lnB w="3175" cap="flat" cmpd="sng" algn="ctr">
-                          <a:noFill/>
-                          <a:prstDash val="solid"/>
-                          <a:round/>
-                          <a:headEnd type="none" w="med" len="med"/>
-                          <a:tailEnd type="none" w="med" len="med"/>
-                        </a:lnB>
-                        <a:lnTlToBr w="12700" cmpd="sng">
-                          <a:noFill/>
-                          <a:prstDash val="solid"/>
-                        </a:lnTlToBr>
-                        <a:lnBlToTr w="12700" cmpd="sng">
-                          <a:noFill/>
-                          <a:prstDash val="solid"/>
-                        </a:lnBlToTr>
-                        <a:noFill/>
-                      </a:tcPr>
-                    </a:tc>
-                    <a:extLst>
-                      <a:ext uri="{0D108BD9-81ED-4DB2-BD59-A6C34878D82A}">
-                        <a16:rowId xmlns:a16="http://schemas.microsoft.com/office/drawing/2014/main" val="901899567"/>
-                      </a:ext>
-                    </a:extLst>
-                  </a:tr>
-                  <a:tr h="224308">
-                    <a:tc>
-                      <a:txBody>
-                        <a:bodyPr/>
-                        <a:lstStyle/>
-                        <a:p>
-                          <a:r>
-                            <a:rPr lang="en-US" sz="800" b="1" dirty="0" smtClean="0">
-                              <a:latin typeface="Times New Roman" panose="02020603050405020304" pitchFamily="18" charset="0"/>
-                              <a:cs typeface="Times New Roman" panose="02020603050405020304" pitchFamily="18" charset="0"/>
-                            </a:rPr>
-                            <a:t>Pelagic families</a:t>
-                          </a:r>
-                          <a:endParaRPr lang="fr-FR" sz="800" b="1" dirty="0">
-                            <a:solidFill>
-                              <a:schemeClr val="tx1"/>
-                            </a:solidFill>
-                          </a:endParaRPr>
-                        </a:p>
-                      </a:txBody>
-                      <a:tcPr marL="63305" marR="63305" marT="31652" marB="31652" anchor="ctr">
-                        <a:lnL w="3175" cap="flat" cmpd="sng" algn="ctr">
-                          <a:noFill/>
-                          <a:prstDash val="solid"/>
-                          <a:round/>
-                          <a:headEnd type="none" w="med" len="med"/>
-                          <a:tailEnd type="none" w="med" len="med"/>
-                        </a:lnL>
-                        <a:lnR w="3175" cap="flat" cmpd="sng" algn="ctr">
-                          <a:noFill/>
-                          <a:prstDash val="solid"/>
-                          <a:round/>
-                          <a:headEnd type="none" w="med" len="med"/>
-                          <a:tailEnd type="none" w="med" len="med"/>
-                        </a:lnR>
-                        <a:lnT w="3175" cap="flat" cmpd="sng" algn="ctr">
-                          <a:noFill/>
-                          <a:prstDash val="solid"/>
-                          <a:round/>
-                          <a:headEnd type="none" w="med" len="med"/>
-                          <a:tailEnd type="none" w="med" len="med"/>
-                        </a:lnT>
-                        <a:lnB w="3175" cap="flat" cmpd="sng" algn="ctr">
-                          <a:noFill/>
-                          <a:prstDash val="solid"/>
-                          <a:round/>
-                          <a:headEnd type="none" w="med" len="med"/>
-                          <a:tailEnd type="none" w="med" len="med"/>
-                        </a:lnB>
-                        <a:lnTlToBr w="12700" cmpd="sng">
-                          <a:noFill/>
-                          <a:prstDash val="solid"/>
-                        </a:lnTlToBr>
-                        <a:lnBlToTr w="12700" cmpd="sng">
-                          <a:noFill/>
-                          <a:prstDash val="solid"/>
-                        </a:lnBlToTr>
-                        <a:noFill/>
-                      </a:tcPr>
-                    </a:tc>
-                    <a:tc>
-                      <a:txBody>
-                        <a:bodyPr/>
-                        <a:lstStyle/>
-                        <a:p>
-                          <a:pPr algn="ctr"/>
-                          <a:r>
-                            <a:rPr lang="fr-FR" sz="800" b="0" kern="1200" dirty="0" smtClean="0">
-                              <a:solidFill>
-                                <a:schemeClr val="dk1"/>
-                              </a:solidFill>
-                              <a:latin typeface="Times New Roman" panose="02020603050405020304" pitchFamily="18" charset="0"/>
-                              <a:ea typeface="+mn-ea"/>
-                              <a:cs typeface="Times New Roman" panose="02020603050405020304" pitchFamily="18" charset="0"/>
-                            </a:rPr>
-                            <a:t>70.8%</a:t>
-                          </a:r>
-                          <a:endParaRPr lang="fr-FR" sz="800" b="0" kern="1200" dirty="0">
-                            <a:solidFill>
-                              <a:schemeClr val="dk1"/>
-                            </a:solidFill>
-                            <a:latin typeface="Times New Roman" panose="02020603050405020304" pitchFamily="18" charset="0"/>
-                            <a:ea typeface="+mn-ea"/>
-                            <a:cs typeface="Times New Roman" panose="02020603050405020304" pitchFamily="18" charset="0"/>
-                          </a:endParaRPr>
-                        </a:p>
-                      </a:txBody>
-                      <a:tcPr marL="63305" marR="63305" marT="31652" marB="31652" anchor="ctr">
-                        <a:lnL w="3175" cap="flat" cmpd="sng" algn="ctr">
-                          <a:noFill/>
-                          <a:prstDash val="solid"/>
-                          <a:round/>
-                          <a:headEnd type="none" w="med" len="med"/>
-                          <a:tailEnd type="none" w="med" len="med"/>
-                        </a:lnL>
-                        <a:lnR w="3175" cap="flat" cmpd="sng" algn="ctr">
-                          <a:noFill/>
-                          <a:prstDash val="solid"/>
-                          <a:round/>
-                          <a:headEnd type="none" w="med" len="med"/>
-                          <a:tailEnd type="none" w="med" len="med"/>
-                        </a:lnR>
-                        <a:lnT w="3175" cap="flat" cmpd="sng" algn="ctr">
-                          <a:noFill/>
-                          <a:prstDash val="solid"/>
-                          <a:round/>
-                          <a:headEnd type="none" w="med" len="med"/>
-                          <a:tailEnd type="none" w="med" len="med"/>
-                        </a:lnT>
-                        <a:lnB w="3175" cap="flat" cmpd="sng" algn="ctr">
-                          <a:noFill/>
-                          <a:prstDash val="solid"/>
-                          <a:round/>
-                          <a:headEnd type="none" w="med" len="med"/>
-                          <a:tailEnd type="none" w="med" len="med"/>
-                        </a:lnB>
-                        <a:lnTlToBr w="12700" cmpd="sng">
-                          <a:noFill/>
-                          <a:prstDash val="solid"/>
-                        </a:lnTlToBr>
-                        <a:lnBlToTr w="12700" cmpd="sng">
-                          <a:noFill/>
-                          <a:prstDash val="solid"/>
-                        </a:lnBlToTr>
-                        <a:noFill/>
-                      </a:tcPr>
-                    </a:tc>
-                    <a:tc>
-                      <a:txBody>
-                        <a:bodyPr/>
-                        <a:lstStyle/>
-                        <a:p>
-                          <a:pPr algn="ctr"/>
-                          <a:r>
-                            <a:rPr lang="fr-FR" sz="800" b="0" kern="1200" dirty="0" smtClean="0">
-                              <a:solidFill>
-                                <a:schemeClr val="dk1"/>
-                              </a:solidFill>
-                              <a:latin typeface="Times New Roman" panose="02020603050405020304" pitchFamily="18" charset="0"/>
-                              <a:ea typeface="+mn-ea"/>
-                              <a:cs typeface="Times New Roman" panose="02020603050405020304" pitchFamily="18" charset="0"/>
-                            </a:rPr>
-                            <a:t>15.8%</a:t>
-                          </a:r>
-                          <a:endParaRPr lang="fr-FR" sz="800" b="0" kern="1200" dirty="0">
-                            <a:solidFill>
-                              <a:schemeClr val="dk1"/>
-                            </a:solidFill>
-                            <a:latin typeface="Times New Roman" panose="02020603050405020304" pitchFamily="18" charset="0"/>
-                            <a:ea typeface="+mn-ea"/>
-                            <a:cs typeface="Times New Roman" panose="02020603050405020304" pitchFamily="18" charset="0"/>
-                          </a:endParaRPr>
-                        </a:p>
-                      </a:txBody>
-                      <a:tcPr marL="63305" marR="63305" marT="31652" marB="31652" anchor="ctr">
-                        <a:lnL w="3175" cap="flat" cmpd="sng" algn="ctr">
-                          <a:noFill/>
-                          <a:prstDash val="solid"/>
-                          <a:round/>
-                          <a:headEnd type="none" w="med" len="med"/>
-                          <a:tailEnd type="none" w="med" len="med"/>
-                        </a:lnL>
-                        <a:lnR w="3175" cap="flat" cmpd="sng" algn="ctr">
-                          <a:noFill/>
-                          <a:prstDash val="solid"/>
-                          <a:round/>
-                          <a:headEnd type="none" w="med" len="med"/>
-                          <a:tailEnd type="none" w="med" len="med"/>
-                        </a:lnR>
-                        <a:lnT w="3175" cap="flat" cmpd="sng" algn="ctr">
-                          <a:noFill/>
-                          <a:prstDash val="solid"/>
-                          <a:round/>
-                          <a:headEnd type="none" w="med" len="med"/>
-                          <a:tailEnd type="none" w="med" len="med"/>
-                        </a:lnT>
-                        <a:lnB w="3175" cap="flat" cmpd="sng" algn="ctr">
-                          <a:noFill/>
-                          <a:prstDash val="solid"/>
-                          <a:round/>
-                          <a:headEnd type="none" w="med" len="med"/>
-                          <a:tailEnd type="none" w="med" len="med"/>
-                        </a:lnB>
-                        <a:lnTlToBr w="12700" cmpd="sng">
-                          <a:noFill/>
-                          <a:prstDash val="solid"/>
-                        </a:lnTlToBr>
-                        <a:lnBlToTr w="12700" cmpd="sng">
-                          <a:noFill/>
-                          <a:prstDash val="solid"/>
-                        </a:lnBlToTr>
-                        <a:noFill/>
-                      </a:tcPr>
-                    </a:tc>
-                    <a:tc>
-                      <a:txBody>
-                        <a:bodyPr/>
-                        <a:lstStyle/>
-                        <a:p>
-                          <a:pPr algn="ctr"/>
-                          <a:r>
-                            <a:rPr lang="fr-FR" sz="800" b="0" kern="1200" dirty="0" smtClean="0">
-                              <a:solidFill>
-                                <a:schemeClr val="dk1"/>
-                              </a:solidFill>
-                              <a:latin typeface="Times New Roman" panose="02020603050405020304" pitchFamily="18" charset="0"/>
-                              <a:ea typeface="+mn-ea"/>
-                              <a:cs typeface="Times New Roman" panose="02020603050405020304" pitchFamily="18" charset="0"/>
-                            </a:rPr>
-                            <a:t>7.8%</a:t>
-                          </a:r>
-                          <a:endParaRPr lang="fr-FR" sz="800" b="0" kern="1200" dirty="0">
-                            <a:solidFill>
-                              <a:schemeClr val="dk1"/>
-                            </a:solidFill>
-                            <a:latin typeface="Times New Roman" panose="02020603050405020304" pitchFamily="18" charset="0"/>
-                            <a:ea typeface="+mn-ea"/>
-                            <a:cs typeface="Times New Roman" panose="02020603050405020304" pitchFamily="18" charset="0"/>
-                          </a:endParaRPr>
-                        </a:p>
-                      </a:txBody>
-                      <a:tcPr marL="63305" marR="63305" marT="31652" marB="31652" anchor="ctr">
-                        <a:lnL w="3175" cap="flat" cmpd="sng" algn="ctr">
-                          <a:noFill/>
-                          <a:prstDash val="solid"/>
-                          <a:round/>
-                          <a:headEnd type="none" w="med" len="med"/>
-                          <a:tailEnd type="none" w="med" len="med"/>
-                        </a:lnL>
-                        <a:lnR w="3175" cap="flat" cmpd="sng" algn="ctr">
-                          <a:noFill/>
-                          <a:prstDash val="solid"/>
-                          <a:round/>
-                          <a:headEnd type="none" w="med" len="med"/>
-                          <a:tailEnd type="none" w="med" len="med"/>
-                        </a:lnR>
-                        <a:lnT w="3175" cap="flat" cmpd="sng" algn="ctr">
-                          <a:noFill/>
-                          <a:prstDash val="solid"/>
-                          <a:round/>
-                          <a:headEnd type="none" w="med" len="med"/>
-                          <a:tailEnd type="none" w="med" len="med"/>
-                        </a:lnT>
-                        <a:lnB w="3175" cap="flat" cmpd="sng" algn="ctr">
-                          <a:noFill/>
-                          <a:prstDash val="solid"/>
-                          <a:round/>
-                          <a:headEnd type="none" w="med" len="med"/>
-                          <a:tailEnd type="none" w="med" len="med"/>
-                        </a:lnB>
-                        <a:lnTlToBr w="12700" cmpd="sng">
-                          <a:noFill/>
-                          <a:prstDash val="solid"/>
-                        </a:lnTlToBr>
-                        <a:lnBlToTr w="12700" cmpd="sng">
-                          <a:noFill/>
-                          <a:prstDash val="solid"/>
-                        </a:lnBlToTr>
-                        <a:noFill/>
-                      </a:tcPr>
-                    </a:tc>
-                    <a:tc>
-                      <a:txBody>
-                        <a:bodyPr/>
-                        <a:lstStyle/>
-                        <a:p>
-                          <a:pPr algn="ctr"/>
-                          <a:r>
-                            <a:rPr lang="fr-FR" sz="800" b="0" kern="1200" dirty="0" smtClean="0">
-                              <a:solidFill>
-                                <a:schemeClr val="dk1"/>
-                              </a:solidFill>
-                              <a:latin typeface="Times New Roman" panose="02020603050405020304" pitchFamily="18" charset="0"/>
-                              <a:ea typeface="+mn-ea"/>
-                              <a:cs typeface="Times New Roman" panose="02020603050405020304" pitchFamily="18" charset="0"/>
-                            </a:rPr>
-                            <a:t>5.6%</a:t>
-                          </a:r>
-                          <a:endParaRPr lang="fr-FR" sz="800" b="0" kern="1200" dirty="0">
-                            <a:solidFill>
-                              <a:schemeClr val="dk1"/>
-                            </a:solidFill>
-                            <a:latin typeface="Times New Roman" panose="02020603050405020304" pitchFamily="18" charset="0"/>
-                            <a:ea typeface="+mn-ea"/>
-                            <a:cs typeface="Times New Roman" panose="02020603050405020304" pitchFamily="18" charset="0"/>
-                          </a:endParaRPr>
-                        </a:p>
-                      </a:txBody>
-                      <a:tcPr marL="63305" marR="63305" marT="31652" marB="31652" anchor="ctr">
-                        <a:lnL w="3175" cap="flat" cmpd="sng" algn="ctr">
-                          <a:noFill/>
-                          <a:prstDash val="solid"/>
-                          <a:round/>
-                          <a:headEnd type="none" w="med" len="med"/>
-                          <a:tailEnd type="none" w="med" len="med"/>
-                        </a:lnL>
-                        <a:lnR w="3175" cap="flat" cmpd="sng" algn="ctr">
-                          <a:noFill/>
-                          <a:prstDash val="solid"/>
-                          <a:round/>
-                          <a:headEnd type="none" w="med" len="med"/>
-                          <a:tailEnd type="none" w="med" len="med"/>
-                        </a:lnR>
-                        <a:lnT w="3175" cap="flat" cmpd="sng" algn="ctr">
                           <a:noFill/>
                           <a:prstDash val="solid"/>
                           <a:round/>
@@ -8737,7 +9445,7 @@
                               <a:latin typeface="Times New Roman" panose="02020603050405020304" pitchFamily="18" charset="0"/>
                               <a:cs typeface="Times New Roman" panose="02020603050405020304" pitchFamily="18" charset="0"/>
                             </a:rPr>
-                            <a:t>MOTUs assigned to species</a:t>
+                            <a:t>Species</a:t>
                           </a:r>
                           <a:endParaRPr lang="fr-FR" sz="800" b="1" dirty="0">
                             <a:solidFill>
@@ -8801,7 +9509,7 @@
                               <a:ea typeface="+mn-ea"/>
                               <a:cs typeface="Times New Roman" panose="02020603050405020304" pitchFamily="18" charset="0"/>
                             </a:rPr>
-                            <a:t>68%</a:t>
+                            <a:t>393</a:t>
                           </a:r>
                           <a:endParaRPr lang="fr-FR" sz="800" b="0" kern="1200" dirty="0">
                             <a:solidFill>
@@ -8868,7 +9576,7 @@
                               <a:ea typeface="+mn-ea"/>
                               <a:cs typeface="Times New Roman" panose="02020603050405020304" pitchFamily="18" charset="0"/>
                             </a:rPr>
-                            <a:t>15.7%</a:t>
+                            <a:t>69.5%</a:t>
                           </a:r>
                           <a:endParaRPr lang="fr-FR" sz="800" b="0" kern="1200" dirty="0">
                             <a:solidFill>
@@ -8935,7 +9643,7 @@
                               <a:ea typeface="+mn-ea"/>
                               <a:cs typeface="Times New Roman" panose="02020603050405020304" pitchFamily="18" charset="0"/>
                             </a:rPr>
-                            <a:t>8.3%</a:t>
+                            <a:t>14.1%</a:t>
                           </a:r>
                           <a:endParaRPr lang="fr-FR" sz="800" b="0" kern="1200" dirty="0">
                             <a:solidFill>
@@ -9002,7 +9710,74 @@
                               <a:ea typeface="+mn-ea"/>
                               <a:cs typeface="Times New Roman" panose="02020603050405020304" pitchFamily="18" charset="0"/>
                             </a:rPr>
-                            <a:t>8%</a:t>
+                            <a:t>9.4%</a:t>
+                          </a:r>
+                          <a:endParaRPr lang="fr-FR" sz="800" b="0" kern="1200" dirty="0">
+                            <a:solidFill>
+                              <a:schemeClr val="dk1"/>
+                            </a:solidFill>
+                            <a:latin typeface="Times New Roman" panose="02020603050405020304" pitchFamily="18" charset="0"/>
+                            <a:ea typeface="+mn-ea"/>
+                            <a:cs typeface="Times New Roman" panose="02020603050405020304" pitchFamily="18" charset="0"/>
+                          </a:endParaRPr>
+                        </a:p>
+                      </a:txBody>
+                      <a:tcPr marL="63305" marR="63305" marT="31652" marB="31652" anchor="ctr">
+                        <a:lnL w="3175" cap="flat" cmpd="sng" algn="ctr">
+                          <a:noFill/>
+                          <a:prstDash val="solid"/>
+                          <a:round/>
+                          <a:headEnd type="none" w="med" len="med"/>
+                          <a:tailEnd type="none" w="med" len="med"/>
+                        </a:lnL>
+                        <a:lnR w="3175" cap="flat" cmpd="sng" algn="ctr">
+                          <a:noFill/>
+                          <a:prstDash val="solid"/>
+                          <a:round/>
+                          <a:headEnd type="none" w="med" len="med"/>
+                          <a:tailEnd type="none" w="med" len="med"/>
+                        </a:lnR>
+                        <a:lnT w="3175" cap="flat" cmpd="sng" algn="ctr">
+                          <a:noFill/>
+                          <a:prstDash val="solid"/>
+                          <a:round/>
+                          <a:headEnd type="none" w="med" len="med"/>
+                          <a:tailEnd type="none" w="med" len="med"/>
+                        </a:lnT>
+                        <a:lnB w="3175" cap="flat" cmpd="sng" algn="ctr">
+                          <a:noFill/>
+                          <a:prstDash val="solid"/>
+                          <a:round/>
+                          <a:headEnd type="none" w="med" len="med"/>
+                          <a:tailEnd type="none" w="med" len="med"/>
+                        </a:lnB>
+                        <a:lnTlToBr w="12700" cmpd="sng">
+                          <a:noFill/>
+                          <a:prstDash val="solid"/>
+                        </a:lnTlToBr>
+                        <a:lnBlToTr w="12700" cmpd="sng">
+                          <a:noFill/>
+                          <a:prstDash val="solid"/>
+                        </a:lnBlToTr>
+                        <a:noFill/>
+                      </a:tcPr>
+                    </a:tc>
+                    <a:tc>
+                      <a:txBody>
+                        <a:bodyPr/>
+                        <a:lstStyle/>
+                        <a:p>
+                          <a:pPr algn="ctr"/>
+                          <a:r>
+                            <a:rPr lang="fr-FR" sz="800" b="0" kern="1200" dirty="0" smtClean="0">
+                              <a:solidFill>
+                                <a:schemeClr val="dk1"/>
+                              </a:solidFill>
+                              <a:latin typeface="Times New Roman" panose="02020603050405020304" pitchFamily="18" charset="0"/>
+                              <a:ea typeface="+mn-ea"/>
+                              <a:cs typeface="Times New Roman" panose="02020603050405020304" pitchFamily="18" charset="0"/>
+                            </a:rPr>
+                            <a:t>7%</a:t>
                           </a:r>
                           <a:endParaRPr lang="fr-FR" sz="800" b="0" kern="1200" dirty="0">
                             <a:solidFill>
@@ -9137,8 +9912,8 @@
         </p:nvSpPr>
         <p:spPr>
           <a:xfrm>
-            <a:off x="2661019" y="2244647"/>
-            <a:ext cx="706004" cy="302647"/>
+            <a:off x="2631027" y="2244647"/>
+            <a:ext cx="770116" cy="302647"/>
           </a:xfrm>
           <a:prstGeom prst="ellipse">
             <a:avLst/>
@@ -9183,7 +9958,7 @@
             </p:nvSpPr>
             <p:spPr>
               <a:xfrm>
-                <a:off x="2531169" y="2214762"/>
+                <a:off x="2531169" y="2207938"/>
                 <a:ext cx="956855" cy="308033"/>
               </a:xfrm>
               <a:prstGeom prst="rect">
@@ -9264,7 +10039,7 @@
                 </a:r>
                 <a:r>
                   <a:rPr lang="fr-FR" sz="701" dirty="0" smtClean="0"/>
-                  <a:t>%</a:t>
+                  <a:t>18.3%</a:t>
                 </a:r>
                 <a:endParaRPr lang="fr-FR" sz="701" dirty="0"/>
               </a:p>
@@ -9282,7 +10057,7 @@
             </p:nvSpPr>
             <p:spPr>
               <a:xfrm>
-                <a:off x="2531169" y="2214762"/>
+                <a:off x="2531169" y="2207938"/>
                 <a:ext cx="956855" cy="308033"/>
               </a:xfrm>
               <a:prstGeom prst="rect">
@@ -9336,12 +10111,12 @@
               <a:p>
                 <a:pPr algn="ctr"/>
                 <a:r>
-                  <a:rPr lang="fr-FR" sz="701" dirty="0" smtClean="0"/>
-                  <a:t>18</a:t>
+                  <a:rPr lang="fr-FR" sz="701" dirty="0"/>
+                  <a:t>4</a:t>
                 </a:r>
                 <a:r>
                   <a:rPr lang="fr-FR" sz="701" dirty="0" smtClean="0"/>
-                  <a:t> </a:t>
+                  <a:t>8 </a:t>
                 </a:r>
                 <a:r>
                   <a:rPr lang="fr-FR" sz="701" dirty="0"/>
@@ -9410,7 +10185,7 @@
                 </a:r>
                 <a:r>
                   <a:rPr lang="fr-FR" sz="701" dirty="0" smtClean="0"/>
-                  <a:t>%</a:t>
+                  <a:t>14%</a:t>
                 </a:r>
                 <a:endParaRPr lang="fr-FR" sz="701" dirty="0"/>
               </a:p>
@@ -9464,7 +10239,7 @@
                 </a:r>
                 <a:r>
                   <a:rPr lang="fr-FR" sz="701" dirty="0" smtClean="0"/>
-                  <a:t>%</a:t>
+                  <a:t>5.4%</a:t>
                 </a:r>
                 <a:endParaRPr lang="fr-FR" sz="701" dirty="0"/>
               </a:p>
@@ -9522,7 +10297,7 @@
         <p:spPr>
           <a:xfrm flipH="1">
             <a:off x="3009597" y="1865932"/>
-            <a:ext cx="2306" cy="348830"/>
+            <a:ext cx="2306" cy="342006"/>
           </a:xfrm>
           <a:prstGeom prst="straightConnector1">
             <a:avLst/>
@@ -9557,8 +10332,8 @@
         </p:nvCxnSpPr>
         <p:spPr>
           <a:xfrm>
-            <a:off x="3014021" y="2547294"/>
-            <a:ext cx="3565" cy="420209"/>
+            <a:off x="3016085" y="2547294"/>
+            <a:ext cx="1501" cy="420209"/>
           </a:xfrm>
           <a:prstGeom prst="straightConnector1">
             <a:avLst/>
@@ -9662,6 +10437,42 @@
           </a:fontRef>
         </p:style>
       </p:cxnSp>
+      <p:sp>
+        <p:nvSpPr>
+          <p:cNvPr id="58" name="ZoneTexte 57"/>
+          <p:cNvSpPr txBox="1"/>
+          <p:nvPr/>
+        </p:nvSpPr>
+        <p:spPr>
+          <a:xfrm>
+            <a:off x="1836916" y="3767524"/>
+            <a:ext cx="269069" cy="212238"/>
+          </a:xfrm>
+          <a:prstGeom prst="rect">
+            <a:avLst/>
+          </a:prstGeom>
+          <a:noFill/>
+        </p:spPr>
+        <p:txBody>
+          <a:bodyPr wrap="square" rtlCol="0">
+            <a:spAutoFit/>
+          </a:bodyPr>
+          <a:lstStyle/>
+          <a:p>
+            <a:r>
+              <a:rPr lang="en-US" sz="779" b="1" dirty="0">
+                <a:latin typeface="Times New Roman" panose="02020603050405020304" pitchFamily="18" charset="0"/>
+                <a:cs typeface="Times New Roman" panose="02020603050405020304" pitchFamily="18" charset="0"/>
+              </a:rPr>
+              <a:t>B</a:t>
+            </a:r>
+            <a:endParaRPr lang="en-US" sz="779" b="1" dirty="0">
+              <a:latin typeface="Times New Roman" panose="02020603050405020304" pitchFamily="18" charset="0"/>
+              <a:cs typeface="Times New Roman" panose="02020603050405020304" pitchFamily="18" charset="0"/>
+            </a:endParaRPr>
+          </a:p>
+        </p:txBody>
+      </p:sp>
     </p:spTree>
     <p:extLst>
       <p:ext uri="{BB962C8B-B14F-4D97-AF65-F5344CB8AC3E}">

</xml_diff>